<commit_message>
Update of the files at 10/04/2017
New document: "Description..." and others
</commit_message>
<xml_diff>
--- a/docs/eidelyur/docs/magnetizedElectronFigures.pptx
+++ b/docs/eidelyur/docs/magnetizedElectronFigures.pptx
@@ -9,6 +9,8 @@
     <p:sldId id="257" r:id="rId3"/>
     <p:sldId id="258" r:id="rId4"/>
     <p:sldId id="259" r:id="rId5"/>
+    <p:sldId id="260" r:id="rId6"/>
+    <p:sldId id="261" r:id="rId7"/>
   </p:sldIdLst>
   <p:sldSz cx="12192000" cy="6858000"/>
   <p:notesSz cx="6858000" cy="9144000"/>
@@ -113,6 +115,10 @@
     </p:ext>
   </p:extLst>
 </p:presentation>
+</file>
+
+<file path=ppt/revisionInfo.xml><?xml version="1.0" encoding="utf-8"?>
+<p1510:revInfo xmlns:a="http://schemas.openxmlformats.org/drawingml/2006/main" xmlns:r="http://schemas.openxmlformats.org/officeDocument/2006/relationships" xmlns:p1510="http://schemas.microsoft.com/office/powerpoint/2015/10/main"/>
 </file>
 
 <file path=ppt/slideLayouts/slideLayout1.xml><?xml version="1.0" encoding="utf-8"?>
@@ -244,7 +250,7 @@
           <a:p>
             <a:fld id="{2B89F7DB-6B41-4B29-95B0-982C6A923CF9}" type="datetimeFigureOut">
               <a:rPr lang="en-US" smtClean="0"/>
-              <a:t>8/18/2017</a:t>
+              <a:t>10/3/2017</a:t>
             </a:fld>
             <a:endParaRPr lang="en-US"/>
           </a:p>
@@ -412,7 +418,7 @@
           <a:p>
             <a:fld id="{2B89F7DB-6B41-4B29-95B0-982C6A923CF9}" type="datetimeFigureOut">
               <a:rPr lang="en-US" smtClean="0"/>
-              <a:t>8/18/2017</a:t>
+              <a:t>10/3/2017</a:t>
             </a:fld>
             <a:endParaRPr lang="en-US"/>
           </a:p>
@@ -590,7 +596,7 @@
           <a:p>
             <a:fld id="{2B89F7DB-6B41-4B29-95B0-982C6A923CF9}" type="datetimeFigureOut">
               <a:rPr lang="en-US" smtClean="0"/>
-              <a:t>8/18/2017</a:t>
+              <a:t>10/3/2017</a:t>
             </a:fld>
             <a:endParaRPr lang="en-US"/>
           </a:p>
@@ -758,7 +764,7 @@
           <a:p>
             <a:fld id="{2B89F7DB-6B41-4B29-95B0-982C6A923CF9}" type="datetimeFigureOut">
               <a:rPr lang="en-US" smtClean="0"/>
-              <a:t>8/18/2017</a:t>
+              <a:t>10/3/2017</a:t>
             </a:fld>
             <a:endParaRPr lang="en-US"/>
           </a:p>
@@ -1003,7 +1009,7 @@
           <a:p>
             <a:fld id="{2B89F7DB-6B41-4B29-95B0-982C6A923CF9}" type="datetimeFigureOut">
               <a:rPr lang="en-US" smtClean="0"/>
-              <a:t>8/18/2017</a:t>
+              <a:t>10/3/2017</a:t>
             </a:fld>
             <a:endParaRPr lang="en-US"/>
           </a:p>
@@ -1232,7 +1238,7 @@
           <a:p>
             <a:fld id="{2B89F7DB-6B41-4B29-95B0-982C6A923CF9}" type="datetimeFigureOut">
               <a:rPr lang="en-US" smtClean="0"/>
-              <a:t>8/18/2017</a:t>
+              <a:t>10/3/2017</a:t>
             </a:fld>
             <a:endParaRPr lang="en-US"/>
           </a:p>
@@ -1596,7 +1602,7 @@
           <a:p>
             <a:fld id="{2B89F7DB-6B41-4B29-95B0-982C6A923CF9}" type="datetimeFigureOut">
               <a:rPr lang="en-US" smtClean="0"/>
-              <a:t>8/18/2017</a:t>
+              <a:t>10/3/2017</a:t>
             </a:fld>
             <a:endParaRPr lang="en-US"/>
           </a:p>
@@ -1713,7 +1719,7 @@
           <a:p>
             <a:fld id="{2B89F7DB-6B41-4B29-95B0-982C6A923CF9}" type="datetimeFigureOut">
               <a:rPr lang="en-US" smtClean="0"/>
-              <a:t>8/18/2017</a:t>
+              <a:t>10/3/2017</a:t>
             </a:fld>
             <a:endParaRPr lang="en-US"/>
           </a:p>
@@ -1808,7 +1814,7 @@
           <a:p>
             <a:fld id="{2B89F7DB-6B41-4B29-95B0-982C6A923CF9}" type="datetimeFigureOut">
               <a:rPr lang="en-US" smtClean="0"/>
-              <a:t>8/18/2017</a:t>
+              <a:t>10/3/2017</a:t>
             </a:fld>
             <a:endParaRPr lang="en-US"/>
           </a:p>
@@ -2083,7 +2089,7 @@
           <a:p>
             <a:fld id="{2B89F7DB-6B41-4B29-95B0-982C6A923CF9}" type="datetimeFigureOut">
               <a:rPr lang="en-US" smtClean="0"/>
-              <a:t>8/18/2017</a:t>
+              <a:t>10/3/2017</a:t>
             </a:fld>
             <a:endParaRPr lang="en-US"/>
           </a:p>
@@ -2335,7 +2341,7 @@
           <a:p>
             <a:fld id="{2B89F7DB-6B41-4B29-95B0-982C6A923CF9}" type="datetimeFigureOut">
               <a:rPr lang="en-US" smtClean="0"/>
-              <a:t>8/18/2017</a:t>
+              <a:t>10/3/2017</a:t>
             </a:fld>
             <a:endParaRPr lang="en-US"/>
           </a:p>
@@ -2546,7 +2552,7 @@
           <a:p>
             <a:fld id="{2B89F7DB-6B41-4B29-95B0-982C6A923CF9}" type="datetimeFigureOut">
               <a:rPr lang="en-US" smtClean="0"/>
-              <a:t>8/18/2017</a:t>
+              <a:t>10/3/2017</a:t>
             </a:fld>
             <a:endParaRPr lang="en-US"/>
           </a:p>
@@ -3453,7 +3459,7 @@
           <a:graphicData uri="http://schemas.openxmlformats.org/presentationml/2006/ole">
             <mc:AlternateContent xmlns:mc="http://schemas.openxmlformats.org/markup-compatibility/2006">
               <mc:Choice xmlns:v="urn:schemas-microsoft-com:vml" Requires="v">
-                <p:oleObj spid="_x0000_s1181" name="Equation" r:id="rId3" imgW="139680" imgH="228600" progId="Equation.DSMT4">
+                <p:oleObj spid="_x0000_s1265" name="Equation" r:id="rId3" imgW="139680" imgH="228600" progId="Equation.DSMT4">
                   <p:embed/>
                 </p:oleObj>
               </mc:Choice>
@@ -3510,7 +3516,7 @@
           <a:graphicData uri="http://schemas.openxmlformats.org/presentationml/2006/ole">
             <mc:AlternateContent xmlns:mc="http://schemas.openxmlformats.org/markup-compatibility/2006">
               <mc:Choice xmlns:v="urn:schemas-microsoft-com:vml" Requires="v">
-                <p:oleObj spid="_x0000_s1182" name="Equation" r:id="rId5" imgW="126720" imgH="228600" progId="Equation.DSMT4">
+                <p:oleObj spid="_x0000_s1266" name="Equation" r:id="rId5" imgW="126720" imgH="228600" progId="Equation.DSMT4">
                   <p:embed/>
                 </p:oleObj>
               </mc:Choice>
@@ -3567,7 +3573,7 @@
           <a:graphicData uri="http://schemas.openxmlformats.org/presentationml/2006/ole">
             <mc:AlternateContent xmlns:mc="http://schemas.openxmlformats.org/markup-compatibility/2006">
               <mc:Choice xmlns:v="urn:schemas-microsoft-com:vml" Requires="v">
-                <p:oleObj spid="_x0000_s1183" name="Equation" r:id="rId7" imgW="152280" imgH="228600" progId="Equation.DSMT4">
+                <p:oleObj spid="_x0000_s1267" name="Equation" r:id="rId7" imgW="152280" imgH="228600" progId="Equation.DSMT4">
                   <p:embed/>
                 </p:oleObj>
               </mc:Choice>
@@ -3624,7 +3630,7 @@
           <a:graphicData uri="http://schemas.openxmlformats.org/presentationml/2006/ole">
             <mc:AlternateContent xmlns:mc="http://schemas.openxmlformats.org/markup-compatibility/2006">
               <mc:Choice xmlns:v="urn:schemas-microsoft-com:vml" Requires="v">
-                <p:oleObj spid="_x0000_s1184" name="Equation" r:id="rId9" imgW="139680" imgH="228600" progId="Equation.DSMT4">
+                <p:oleObj spid="_x0000_s1268" name="Equation" r:id="rId9" imgW="139680" imgH="228600" progId="Equation.DSMT4">
                   <p:embed/>
                 </p:oleObj>
               </mc:Choice>
@@ -3681,7 +3687,7 @@
           <a:graphicData uri="http://schemas.openxmlformats.org/presentationml/2006/ole">
             <mc:AlternateContent xmlns:mc="http://schemas.openxmlformats.org/markup-compatibility/2006">
               <mc:Choice xmlns:v="urn:schemas-microsoft-com:vml" Requires="v">
-                <p:oleObj spid="_x0000_s1185" name="Equation" r:id="rId11" imgW="126720" imgH="164880" progId="Equation.DSMT4">
+                <p:oleObj spid="_x0000_s1269" name="Equation" r:id="rId11" imgW="126720" imgH="164880" progId="Equation.DSMT4">
                   <p:embed/>
                 </p:oleObj>
               </mc:Choice>
@@ -3738,7 +3744,7 @@
           <a:graphicData uri="http://schemas.openxmlformats.org/presentationml/2006/ole">
             <mc:AlternateContent xmlns:mc="http://schemas.openxmlformats.org/markup-compatibility/2006">
               <mc:Choice xmlns:v="urn:schemas-microsoft-com:vml" Requires="v">
-                <p:oleObj spid="_x0000_s1186" name="Equation" r:id="rId13" imgW="152280" imgH="228600" progId="Equation.DSMT4">
+                <p:oleObj spid="_x0000_s1270" name="Equation" r:id="rId13" imgW="152280" imgH="228600" progId="Equation.DSMT4">
                   <p:embed/>
                 </p:oleObj>
               </mc:Choice>
@@ -3795,7 +3801,7 @@
           <a:graphicData uri="http://schemas.openxmlformats.org/presentationml/2006/ole">
             <mc:AlternateContent xmlns:mc="http://schemas.openxmlformats.org/markup-compatibility/2006">
               <mc:Choice xmlns:v="urn:schemas-microsoft-com:vml" Requires="v">
-                <p:oleObj spid="_x0000_s1187" name="Equation" r:id="rId15" imgW="507960" imgH="253800" progId="Equation.DSMT4">
+                <p:oleObj spid="_x0000_s1271" name="Equation" r:id="rId15" imgW="507960" imgH="253800" progId="Equation.DSMT4">
                   <p:embed/>
                 </p:oleObj>
               </mc:Choice>
@@ -3852,7 +3858,7 @@
           <a:graphicData uri="http://schemas.openxmlformats.org/presentationml/2006/ole">
             <mc:AlternateContent xmlns:mc="http://schemas.openxmlformats.org/markup-compatibility/2006">
               <mc:Choice xmlns:v="urn:schemas-microsoft-com:vml" Requires="v">
-                <p:oleObj spid="_x0000_s1188" name="Equation" r:id="rId17" imgW="152280" imgH="253800" progId="Equation.DSMT4">
+                <p:oleObj spid="_x0000_s1272" name="Equation" r:id="rId17" imgW="152280" imgH="253800" progId="Equation.DSMT4">
                   <p:embed/>
                 </p:oleObj>
               </mc:Choice>
@@ -3909,7 +3915,7 @@
           <a:graphicData uri="http://schemas.openxmlformats.org/presentationml/2006/ole">
             <mc:AlternateContent xmlns:mc="http://schemas.openxmlformats.org/markup-compatibility/2006">
               <mc:Choice xmlns:v="urn:schemas-microsoft-com:vml" Requires="v">
-                <p:oleObj spid="_x0000_s1189" name="Equation" r:id="rId19" imgW="139680" imgH="164880" progId="Equation.DSMT4">
+                <p:oleObj spid="_x0000_s1273" name="Equation" r:id="rId19" imgW="139680" imgH="164880" progId="Equation.DSMT4">
                   <p:embed/>
                 </p:oleObj>
               </mc:Choice>
@@ -3966,7 +3972,7 @@
           <a:graphicData uri="http://schemas.openxmlformats.org/presentationml/2006/ole">
             <mc:AlternateContent xmlns:mc="http://schemas.openxmlformats.org/markup-compatibility/2006">
               <mc:Choice xmlns:v="urn:schemas-microsoft-com:vml" Requires="v">
-                <p:oleObj spid="_x0000_s1190" name="Equation" r:id="rId21" imgW="126720" imgH="139680" progId="Equation.DSMT4">
+                <p:oleObj spid="_x0000_s1274" name="Equation" r:id="rId21" imgW="126720" imgH="139680" progId="Equation.DSMT4">
                   <p:embed/>
                 </p:oleObj>
               </mc:Choice>
@@ -4023,7 +4029,7 @@
           <a:graphicData uri="http://schemas.openxmlformats.org/presentationml/2006/ole">
             <mc:AlternateContent xmlns:mc="http://schemas.openxmlformats.org/markup-compatibility/2006">
               <mc:Choice xmlns:v="urn:schemas-microsoft-com:vml" Requires="v">
-                <p:oleObj spid="_x0000_s1191" name="Equation" r:id="rId23" imgW="126720" imgH="126720" progId="Equation.DSMT4">
+                <p:oleObj spid="_x0000_s1275" name="Equation" r:id="rId23" imgW="126720" imgH="126720" progId="Equation.DSMT4">
                   <p:embed/>
                 </p:oleObj>
               </mc:Choice>
@@ -4080,7 +4086,7 @@
           <a:graphicData uri="http://schemas.openxmlformats.org/presentationml/2006/ole">
             <mc:AlternateContent xmlns:mc="http://schemas.openxmlformats.org/markup-compatibility/2006">
               <mc:Choice xmlns:v="urn:schemas-microsoft-com:vml" Requires="v">
-                <p:oleObj spid="_x0000_s1192" name="Equation" r:id="rId25" imgW="152280" imgH="177480" progId="Equation.DSMT4">
+                <p:oleObj spid="_x0000_s1276" name="Equation" r:id="rId25" imgW="152280" imgH="177480" progId="Equation.DSMT4">
                   <p:embed/>
                 </p:oleObj>
               </mc:Choice>
@@ -4708,7 +4714,7 @@
             <a:graphicData uri="http://schemas.openxmlformats.org/presentationml/2006/ole">
               <mc:AlternateContent xmlns:mc="http://schemas.openxmlformats.org/markup-compatibility/2006">
                 <mc:Choice xmlns:v="urn:schemas-microsoft-com:vml" Requires="v">
-                  <p:oleObj spid="_x0000_s2211" name="Equation" r:id="rId3" imgW="152280" imgH="228600" progId="Equation.DSMT4">
+                  <p:oleObj spid="_x0000_s2379" name="Equation" r:id="rId3" imgW="152280" imgH="228600" progId="Equation.DSMT4">
                     <p:embed/>
                   </p:oleObj>
                 </mc:Choice>
@@ -4864,7 +4870,7 @@
               <a:graphicData uri="http://schemas.openxmlformats.org/presentationml/2006/ole">
                 <mc:AlternateContent xmlns:mc="http://schemas.openxmlformats.org/markup-compatibility/2006">
                   <mc:Choice xmlns:v="urn:schemas-microsoft-com:vml" Requires="v">
-                    <p:oleObj spid="_x0000_s2212" name="Equation" r:id="rId5" imgW="241200" imgH="164880" progId="Equation.DSMT4">
+                    <p:oleObj spid="_x0000_s2380" name="Equation" r:id="rId5" imgW="241200" imgH="164880" progId="Equation.DSMT4">
                       <p:embed/>
                     </p:oleObj>
                   </mc:Choice>
@@ -5071,7 +5077,7 @@
                 <a:graphicData uri="http://schemas.openxmlformats.org/presentationml/2006/ole">
                   <mc:AlternateContent xmlns:mc="http://schemas.openxmlformats.org/markup-compatibility/2006">
                     <mc:Choice xmlns:v="urn:schemas-microsoft-com:vml" Requires="v">
-                      <p:oleObj spid="_x0000_s2213" name="Equation" r:id="rId7" imgW="419040" imgH="177480" progId="Equation.DSMT4">
+                      <p:oleObj spid="_x0000_s2381" name="Equation" r:id="rId7" imgW="419040" imgH="177480" progId="Equation.DSMT4">
                         <p:embed/>
                       </p:oleObj>
                     </mc:Choice>
@@ -5128,7 +5134,7 @@
                 <a:graphicData uri="http://schemas.openxmlformats.org/presentationml/2006/ole">
                   <mc:AlternateContent xmlns:mc="http://schemas.openxmlformats.org/markup-compatibility/2006">
                     <mc:Choice xmlns:v="urn:schemas-microsoft-com:vml" Requires="v">
-                      <p:oleObj spid="_x0000_s2214" name="Equation" r:id="rId9" imgW="419040" imgH="177480" progId="Equation.DSMT4">
+                      <p:oleObj spid="_x0000_s2382" name="Equation" r:id="rId9" imgW="419040" imgH="177480" progId="Equation.DSMT4">
                         <p:embed/>
                       </p:oleObj>
                     </mc:Choice>
@@ -5185,7 +5191,7 @@
                 <a:graphicData uri="http://schemas.openxmlformats.org/presentationml/2006/ole">
                   <mc:AlternateContent xmlns:mc="http://schemas.openxmlformats.org/markup-compatibility/2006">
                     <mc:Choice xmlns:v="urn:schemas-microsoft-com:vml" Requires="v">
-                      <p:oleObj spid="_x0000_s2215" name="Equation" r:id="rId11" imgW="241200" imgH="164880" progId="Equation.DSMT4">
+                      <p:oleObj spid="_x0000_s2383" name="Equation" r:id="rId11" imgW="241200" imgH="164880" progId="Equation.DSMT4">
                         <p:embed/>
                       </p:oleObj>
                     </mc:Choice>
@@ -5242,7 +5248,7 @@
                 <a:graphicData uri="http://schemas.openxmlformats.org/presentationml/2006/ole">
                   <mc:AlternateContent xmlns:mc="http://schemas.openxmlformats.org/markup-compatibility/2006">
                     <mc:Choice xmlns:v="urn:schemas-microsoft-com:vml" Requires="v">
-                      <p:oleObj spid="_x0000_s2216" name="Equation" r:id="rId13" imgW="241200" imgH="164880" progId="Equation.DSMT4">
+                      <p:oleObj spid="_x0000_s2384" name="Equation" r:id="rId13" imgW="241200" imgH="164880" progId="Equation.DSMT4">
                         <p:embed/>
                       </p:oleObj>
                     </mc:Choice>
@@ -5299,7 +5305,7 @@
                 <a:graphicData uri="http://schemas.openxmlformats.org/presentationml/2006/ole">
                   <mc:AlternateContent xmlns:mc="http://schemas.openxmlformats.org/markup-compatibility/2006">
                     <mc:Choice xmlns:v="urn:schemas-microsoft-com:vml" Requires="v">
-                      <p:oleObj spid="_x0000_s2217" name="Equation" r:id="rId15" imgW="419040" imgH="177480" progId="Equation.DSMT4">
+                      <p:oleObj spid="_x0000_s2385" name="Equation" r:id="rId15" imgW="419040" imgH="177480" progId="Equation.DSMT4">
                         <p:embed/>
                       </p:oleObj>
                     </mc:Choice>
@@ -5356,7 +5362,7 @@
                 <a:graphicData uri="http://schemas.openxmlformats.org/presentationml/2006/ole">
                   <mc:AlternateContent xmlns:mc="http://schemas.openxmlformats.org/markup-compatibility/2006">
                     <mc:Choice xmlns:v="urn:schemas-microsoft-com:vml" Requires="v">
-                      <p:oleObj spid="_x0000_s2218" name="Equation" r:id="rId17" imgW="419040" imgH="177480" progId="Equation.DSMT4">
+                      <p:oleObj spid="_x0000_s2386" name="Equation" r:id="rId17" imgW="419040" imgH="177480" progId="Equation.DSMT4">
                         <p:embed/>
                       </p:oleObj>
                     </mc:Choice>
@@ -5413,7 +5419,7 @@
                 <a:graphicData uri="http://schemas.openxmlformats.org/presentationml/2006/ole">
                   <mc:AlternateContent xmlns:mc="http://schemas.openxmlformats.org/markup-compatibility/2006">
                     <mc:Choice xmlns:v="urn:schemas-microsoft-com:vml" Requires="v">
-                      <p:oleObj spid="_x0000_s2219" name="Equation" r:id="rId18" imgW="139680" imgH="164880" progId="Equation.DSMT4">
+                      <p:oleObj spid="_x0000_s2387" name="Equation" r:id="rId18" imgW="139680" imgH="164880" progId="Equation.DSMT4">
                         <p:embed/>
                       </p:oleObj>
                     </mc:Choice>
@@ -5470,7 +5476,7 @@
                 <a:graphicData uri="http://schemas.openxmlformats.org/presentationml/2006/ole">
                   <mc:AlternateContent xmlns:mc="http://schemas.openxmlformats.org/markup-compatibility/2006">
                     <mc:Choice xmlns:v="urn:schemas-microsoft-com:vml" Requires="v">
-                      <p:oleObj spid="_x0000_s2220" name="Equation" r:id="rId20" imgW="241200" imgH="228600" progId="Equation.DSMT4">
+                      <p:oleObj spid="_x0000_s2388" name="Equation" r:id="rId20" imgW="241200" imgH="228600" progId="Equation.DSMT4">
                         <p:embed/>
                       </p:oleObj>
                     </mc:Choice>
@@ -5530,7 +5536,7 @@
           <a:graphicData uri="http://schemas.openxmlformats.org/presentationml/2006/ole">
             <mc:AlternateContent xmlns:mc="http://schemas.openxmlformats.org/markup-compatibility/2006">
               <mc:Choice xmlns:v="urn:schemas-microsoft-com:vml" Requires="v">
-                <p:oleObj spid="_x0000_s2221" name="Equation" r:id="rId22" imgW="152280" imgH="164880" progId="Equation.DSMT4">
+                <p:oleObj spid="_x0000_s2389" name="Equation" r:id="rId22" imgW="152280" imgH="164880" progId="Equation.DSMT4">
                   <p:embed/>
                 </p:oleObj>
               </mc:Choice>
@@ -5587,7 +5593,7 @@
           <a:graphicData uri="http://schemas.openxmlformats.org/presentationml/2006/ole">
             <mc:AlternateContent xmlns:mc="http://schemas.openxmlformats.org/markup-compatibility/2006">
               <mc:Choice xmlns:v="urn:schemas-microsoft-com:vml" Requires="v">
-                <p:oleObj spid="_x0000_s2222" name="Equation" r:id="rId24" imgW="177480" imgH="228600" progId="Equation.DSMT4">
+                <p:oleObj spid="_x0000_s2390" name="Equation" r:id="rId24" imgW="177480" imgH="228600" progId="Equation.DSMT4">
                   <p:embed/>
                 </p:oleObj>
               </mc:Choice>
@@ -5692,7 +5698,7 @@
             <a:graphicData uri="http://schemas.openxmlformats.org/presentationml/2006/ole">
               <mc:AlternateContent xmlns:mc="http://schemas.openxmlformats.org/markup-compatibility/2006">
                 <mc:Choice xmlns:v="urn:schemas-microsoft-com:vml" Requires="v">
-                  <p:oleObj spid="_x0000_s2223" name="Equation" r:id="rId26" imgW="241200" imgH="228600" progId="Equation.DSMT4">
+                  <p:oleObj spid="_x0000_s2391" name="Equation" r:id="rId26" imgW="241200" imgH="228600" progId="Equation.DSMT4">
                     <p:embed/>
                   </p:oleObj>
                 </mc:Choice>
@@ -5749,7 +5755,7 @@
             <a:graphicData uri="http://schemas.openxmlformats.org/presentationml/2006/ole">
               <mc:AlternateContent xmlns:mc="http://schemas.openxmlformats.org/markup-compatibility/2006">
                 <mc:Choice xmlns:v="urn:schemas-microsoft-com:vml" Requires="v">
-                  <p:oleObj spid="_x0000_s2224" name="Equation" r:id="rId28" imgW="152280" imgH="241200" progId="Equation.DSMT4">
+                  <p:oleObj spid="_x0000_s2392" name="Equation" r:id="rId28" imgW="152280" imgH="241200" progId="Equation.DSMT4">
                     <p:embed/>
                   </p:oleObj>
                 </mc:Choice>
@@ -5855,7 +5861,7 @@
             <a:graphicData uri="http://schemas.openxmlformats.org/presentationml/2006/ole">
               <mc:AlternateContent xmlns:mc="http://schemas.openxmlformats.org/markup-compatibility/2006">
                 <mc:Choice xmlns:v="urn:schemas-microsoft-com:vml" Requires="v">
-                  <p:oleObj spid="_x0000_s2225" name="Equation" r:id="rId30" imgW="241200" imgH="228600" progId="Equation.DSMT4">
+                  <p:oleObj spid="_x0000_s2393" name="Equation" r:id="rId30" imgW="241200" imgH="228600" progId="Equation.DSMT4">
                     <p:embed/>
                   </p:oleObj>
                 </mc:Choice>
@@ -5912,7 +5918,7 @@
             <a:graphicData uri="http://schemas.openxmlformats.org/presentationml/2006/ole">
               <mc:AlternateContent xmlns:mc="http://schemas.openxmlformats.org/markup-compatibility/2006">
                 <mc:Choice xmlns:v="urn:schemas-microsoft-com:vml" Requires="v">
-                  <p:oleObj spid="_x0000_s2226" name="Equation" r:id="rId31" imgW="152280" imgH="164880" progId="Equation.DSMT4">
+                  <p:oleObj spid="_x0000_s2394" name="Equation" r:id="rId31" imgW="152280" imgH="164880" progId="Equation.DSMT4">
                     <p:embed/>
                   </p:oleObj>
                 </mc:Choice>
@@ -6018,7 +6024,7 @@
             <a:graphicData uri="http://schemas.openxmlformats.org/presentationml/2006/ole">
               <mc:AlternateContent xmlns:mc="http://schemas.openxmlformats.org/markup-compatibility/2006">
                 <mc:Choice xmlns:v="urn:schemas-microsoft-com:vml" Requires="v">
-                  <p:oleObj spid="_x0000_s2227" name="Equation" r:id="rId33" imgW="241200" imgH="228600" progId="Equation.DSMT4">
+                  <p:oleObj spid="_x0000_s2395" name="Equation" r:id="rId33" imgW="241200" imgH="228600" progId="Equation.DSMT4">
                     <p:embed/>
                   </p:oleObj>
                 </mc:Choice>
@@ -6075,7 +6081,7 @@
             <a:graphicData uri="http://schemas.openxmlformats.org/presentationml/2006/ole">
               <mc:AlternateContent xmlns:mc="http://schemas.openxmlformats.org/markup-compatibility/2006">
                 <mc:Choice xmlns:v="urn:schemas-microsoft-com:vml" Requires="v">
-                  <p:oleObj spid="_x0000_s2228" name="Equation" r:id="rId34" imgW="177480" imgH="228600" progId="Equation.DSMT4">
+                  <p:oleObj spid="_x0000_s2396" name="Equation" r:id="rId34" imgW="177480" imgH="228600" progId="Equation.DSMT4">
                     <p:embed/>
                   </p:oleObj>
                 </mc:Choice>
@@ -6133,7 +6139,7 @@
           <a:graphicData uri="http://schemas.openxmlformats.org/presentationml/2006/ole">
             <mc:AlternateContent xmlns:mc="http://schemas.openxmlformats.org/markup-compatibility/2006">
               <mc:Choice xmlns:v="urn:schemas-microsoft-com:vml" Requires="v">
-                <p:oleObj spid="_x0000_s2229" name="Equation" r:id="rId36" imgW="291960" imgH="228600" progId="Equation.DSMT4">
+                <p:oleObj spid="_x0000_s2397" name="Equation" r:id="rId36" imgW="291960" imgH="228600" progId="Equation.DSMT4">
                   <p:embed/>
                 </p:oleObj>
               </mc:Choice>
@@ -6190,7 +6196,7 @@
           <a:graphicData uri="http://schemas.openxmlformats.org/presentationml/2006/ole">
             <mc:AlternateContent xmlns:mc="http://schemas.openxmlformats.org/markup-compatibility/2006">
               <mc:Choice xmlns:v="urn:schemas-microsoft-com:vml" Requires="v">
-                <p:oleObj spid="_x0000_s2230" name="Equation" r:id="rId38" imgW="241200" imgH="203040" progId="Equation.DSMT4">
+                <p:oleObj spid="_x0000_s2398" name="Equation" r:id="rId38" imgW="241200" imgH="203040" progId="Equation.DSMT4">
                   <p:embed/>
                 </p:oleObj>
               </mc:Choice>
@@ -6247,7 +6253,7 @@
           <a:graphicData uri="http://schemas.openxmlformats.org/presentationml/2006/ole">
             <mc:AlternateContent xmlns:mc="http://schemas.openxmlformats.org/markup-compatibility/2006">
               <mc:Choice xmlns:v="urn:schemas-microsoft-com:vml" Requires="v">
-                <p:oleObj spid="_x0000_s2231" name="Equation" r:id="rId40" imgW="152280" imgH="241200" progId="Equation.DSMT4">
+                <p:oleObj spid="_x0000_s2399" name="Equation" r:id="rId40" imgW="152280" imgH="241200" progId="Equation.DSMT4">
                   <p:embed/>
                 </p:oleObj>
               </mc:Choice>
@@ -6304,7 +6310,7 @@
           <a:graphicData uri="http://schemas.openxmlformats.org/presentationml/2006/ole">
             <mc:AlternateContent xmlns:mc="http://schemas.openxmlformats.org/markup-compatibility/2006">
               <mc:Choice xmlns:v="urn:schemas-microsoft-com:vml" Requires="v">
-                <p:oleObj spid="_x0000_s2232" name="Equation" r:id="rId42" imgW="253800" imgH="241200" progId="Equation.DSMT4">
+                <p:oleObj spid="_x0000_s2400" name="Equation" r:id="rId42" imgW="253800" imgH="241200" progId="Equation.DSMT4">
                   <p:embed/>
                 </p:oleObj>
               </mc:Choice>
@@ -6361,7 +6367,7 @@
           <a:graphicData uri="http://schemas.openxmlformats.org/presentationml/2006/ole">
             <mc:AlternateContent xmlns:mc="http://schemas.openxmlformats.org/markup-compatibility/2006">
               <mc:Choice xmlns:v="urn:schemas-microsoft-com:vml" Requires="v">
-                <p:oleObj spid="_x0000_s2233" name="Equation" r:id="rId44" imgW="139680" imgH="164880" progId="Equation.DSMT4">
+                <p:oleObj spid="_x0000_s2401" name="Equation" r:id="rId44" imgW="139680" imgH="164880" progId="Equation.DSMT4">
                   <p:embed/>
                 </p:oleObj>
               </mc:Choice>
@@ -6923,7 +6929,7 @@
             <a:graphicData uri="http://schemas.openxmlformats.org/presentationml/2006/ole">
               <mc:AlternateContent xmlns:mc="http://schemas.openxmlformats.org/markup-compatibility/2006">
                 <mc:Choice xmlns:v="urn:schemas-microsoft-com:vml" Requires="v">
-                  <p:oleObj spid="_x0000_s2234" name="Equation" r:id="rId46" imgW="545760" imgH="266400" progId="Equation.DSMT4">
+                  <p:oleObj spid="_x0000_s2402" name="Equation" r:id="rId46" imgW="545760" imgH="266400" progId="Equation.DSMT4">
                     <p:embed/>
                   </p:oleObj>
                 </mc:Choice>
@@ -7033,6 +7039,3121 @@
     <p:extLst>
       <p:ext uri="{BB962C8B-B14F-4D97-AF65-F5344CB8AC3E}">
         <p14:creationId xmlns:p14="http://schemas.microsoft.com/office/powerpoint/2010/main" val="1398945364"/>
+      </p:ext>
+    </p:extLst>
+  </p:cSld>
+  <p:clrMapOvr>
+    <a:masterClrMapping/>
+  </p:clrMapOvr>
+</p:sld>
+</file>
+
+<file path=ppt/slides/slide5.xml><?xml version="1.0" encoding="utf-8"?>
+<p:sld xmlns:a="http://schemas.openxmlformats.org/drawingml/2006/main" xmlns:r="http://schemas.openxmlformats.org/officeDocument/2006/relationships" xmlns:p="http://schemas.openxmlformats.org/presentationml/2006/main">
+  <p:cSld>
+    <p:spTree>
+      <p:nvGrpSpPr>
+        <p:cNvPr id="1" name=""/>
+        <p:cNvGrpSpPr/>
+        <p:nvPr/>
+      </p:nvGrpSpPr>
+      <p:grpSpPr>
+        <a:xfrm>
+          <a:off x="0" y="0"/>
+          <a:ext cx="0" cy="0"/>
+          <a:chOff x="0" y="0"/>
+          <a:chExt cx="0" cy="0"/>
+        </a:xfrm>
+      </p:grpSpPr>
+      <p:grpSp>
+        <p:nvGrpSpPr>
+          <p:cNvPr id="140" name="Group 139">
+            <a:extLst>
+              <a:ext uri="{FF2B5EF4-FFF2-40B4-BE49-F238E27FC236}">
+                <a16:creationId xmlns:a16="http://schemas.microsoft.com/office/drawing/2014/main" id="{85C4A3FC-7C8D-46BA-B7FF-560FC6E34638}"/>
+              </a:ext>
+            </a:extLst>
+          </p:cNvPr>
+          <p:cNvGrpSpPr/>
+          <p:nvPr/>
+        </p:nvGrpSpPr>
+        <p:grpSpPr>
+          <a:xfrm>
+            <a:off x="1588262" y="871508"/>
+            <a:ext cx="8423414" cy="5247236"/>
+            <a:chOff x="1588262" y="871508"/>
+            <a:chExt cx="8423414" cy="5247236"/>
+          </a:xfrm>
+        </p:grpSpPr>
+        <p:grpSp>
+          <p:nvGrpSpPr>
+            <p:cNvPr id="78" name="Group 77">
+              <a:extLst>
+                <a:ext uri="{FF2B5EF4-FFF2-40B4-BE49-F238E27FC236}">
+                  <a16:creationId xmlns:a16="http://schemas.microsoft.com/office/drawing/2014/main" id="{81461298-B428-4AC8-B2B9-308947AED538}"/>
+                </a:ext>
+              </a:extLst>
+            </p:cNvPr>
+            <p:cNvGrpSpPr/>
+            <p:nvPr/>
+          </p:nvGrpSpPr>
+          <p:grpSpPr>
+            <a:xfrm>
+              <a:off x="2091736" y="1791340"/>
+              <a:ext cx="7530730" cy="681038"/>
+              <a:chOff x="4789715" y="-62680"/>
+              <a:chExt cx="7530730" cy="681038"/>
+            </a:xfrm>
+          </p:grpSpPr>
+          <p:sp>
+            <p:nvSpPr>
+              <p:cNvPr id="81" name="TextBox 80">
+                <a:extLst>
+                  <a:ext uri="{FF2B5EF4-FFF2-40B4-BE49-F238E27FC236}">
+                    <a16:creationId xmlns:a16="http://schemas.microsoft.com/office/drawing/2014/main" id="{54851CCF-110C-432C-97C2-BEAD2375F5C5}"/>
+                  </a:ext>
+                </a:extLst>
+              </p:cNvPr>
+              <p:cNvSpPr txBox="1"/>
+              <p:nvPr/>
+            </p:nvSpPr>
+            <p:spPr>
+              <a:xfrm>
+                <a:off x="4789715" y="78377"/>
+                <a:ext cx="7530730" cy="369332"/>
+              </a:xfrm>
+              <a:prstGeom prst="rect">
+                <a:avLst/>
+              </a:prstGeom>
+              <a:noFill/>
+              <a:ln>
+                <a:noFill/>
+              </a:ln>
+            </p:spPr>
+            <p:txBody>
+              <a:bodyPr wrap="square" rtlCol="0">
+                <a:spAutoFit/>
+              </a:bodyPr>
+              <a:lstStyle/>
+              <a:p>
+                <a:r>
+                  <a:rPr lang="en-US" dirty="0"/>
+                  <a:t>Loop for value                                      in range                          with                  steps  </a:t>
+                </a:r>
+              </a:p>
+            </p:txBody>
+          </p:sp>
+          <p:graphicFrame>
+            <p:nvGraphicFramePr>
+              <p:cNvPr id="82" name="Object 81">
+                <a:extLst>
+                  <a:ext uri="{FF2B5EF4-FFF2-40B4-BE49-F238E27FC236}">
+                    <a16:creationId xmlns:a16="http://schemas.microsoft.com/office/drawing/2014/main" id="{F06BBD13-94CE-4DBD-8F41-0F06AB6F7474}"/>
+                  </a:ext>
+                </a:extLst>
+              </p:cNvPr>
+              <p:cNvGraphicFramePr>
+                <a:graphicFrameLocks noChangeAspect="1"/>
+              </p:cNvGraphicFramePr>
+              <p:nvPr>
+                <p:extLst>
+                  <p:ext uri="{D42A27DB-BD31-4B8C-83A1-F6EECF244321}">
+                    <p14:modId xmlns:p14="http://schemas.microsoft.com/office/powerpoint/2010/main" val="495772052"/>
+                  </p:ext>
+                </p:extLst>
+              </p:nvPr>
+            </p:nvGraphicFramePr>
+            <p:xfrm>
+              <a:off x="6220250" y="-62680"/>
+              <a:ext cx="1931987" cy="681038"/>
+            </p:xfrm>
+            <a:graphic>
+              <a:graphicData uri="http://schemas.openxmlformats.org/presentationml/2006/ole">
+                <mc:AlternateContent xmlns:mc="http://schemas.openxmlformats.org/markup-compatibility/2006">
+                  <mc:Choice xmlns:v="urn:schemas-microsoft-com:vml" Requires="v">
+                    <p:oleObj spid="_x0000_s3361" name="Equation" r:id="rId3" imgW="1117440" imgH="393480" progId="Equation.DSMT4">
+                      <p:embed/>
+                    </p:oleObj>
+                  </mc:Choice>
+                  <mc:Fallback>
+                    <p:oleObj name="Equation" r:id="rId3" imgW="1117440" imgH="393480" progId="Equation.DSMT4">
+                      <p:embed/>
+                      <p:pic>
+                        <p:nvPicPr>
+                          <p:cNvPr id="13" name="Object 12">
+                            <a:extLst>
+                              <a:ext uri="{FF2B5EF4-FFF2-40B4-BE49-F238E27FC236}">
+                                <a16:creationId xmlns:a16="http://schemas.microsoft.com/office/drawing/2014/main" id="{099E243C-1F21-4408-9C60-4C220182492C}"/>
+                              </a:ext>
+                            </a:extLst>
+                          </p:cNvPr>
+                          <p:cNvPicPr/>
+                          <p:nvPr/>
+                        </p:nvPicPr>
+                        <p:blipFill>
+                          <a:blip r:embed="rId4"/>
+                          <a:stretch>
+                            <a:fillRect/>
+                          </a:stretch>
+                        </p:blipFill>
+                        <p:spPr>
+                          <a:xfrm>
+                            <a:off x="6220250" y="-62680"/>
+                            <a:ext cx="1931987" cy="681038"/>
+                          </a:xfrm>
+                          <a:prstGeom prst="rect">
+                            <a:avLst/>
+                          </a:prstGeom>
+                        </p:spPr>
+                      </p:pic>
+                    </p:oleObj>
+                  </mc:Fallback>
+                </mc:AlternateContent>
+              </a:graphicData>
+            </a:graphic>
+          </p:graphicFrame>
+        </p:grpSp>
+        <p:graphicFrame>
+          <p:nvGraphicFramePr>
+            <p:cNvPr id="79" name="Object 78">
+              <a:extLst>
+                <a:ext uri="{FF2B5EF4-FFF2-40B4-BE49-F238E27FC236}">
+                  <a16:creationId xmlns:a16="http://schemas.microsoft.com/office/drawing/2014/main" id="{6E3284EA-F6B7-47B7-9A25-F3B26314BACF}"/>
+                </a:ext>
+              </a:extLst>
+            </p:cNvPr>
+            <p:cNvGraphicFramePr>
+              <a:graphicFrameLocks noChangeAspect="1"/>
+            </p:cNvGraphicFramePr>
+            <p:nvPr>
+              <p:extLst>
+                <p:ext uri="{D42A27DB-BD31-4B8C-83A1-F6EECF244321}">
+                  <p14:modId xmlns:p14="http://schemas.microsoft.com/office/powerpoint/2010/main" val="65214628"/>
+                </p:ext>
+              </p:extLst>
+            </p:nvPr>
+          </p:nvGraphicFramePr>
+          <p:xfrm>
+            <a:off x="6347281" y="1946212"/>
+            <a:ext cx="1247775" cy="306388"/>
+          </p:xfrm>
+          <a:graphic>
+            <a:graphicData uri="http://schemas.openxmlformats.org/presentationml/2006/ole">
+              <mc:AlternateContent xmlns:mc="http://schemas.openxmlformats.org/markup-compatibility/2006">
+                <mc:Choice xmlns:v="urn:schemas-microsoft-com:vml" Requires="v">
+                  <p:oleObj spid="_x0000_s3362" name="Equation" r:id="rId5" imgW="723600" imgH="177480" progId="Equation.DSMT4">
+                    <p:embed/>
+                  </p:oleObj>
+                </mc:Choice>
+                <mc:Fallback>
+                  <p:oleObj name="Equation" r:id="rId5" imgW="723600" imgH="177480" progId="Equation.DSMT4">
+                    <p:embed/>
+                    <p:pic>
+                      <p:nvPicPr>
+                        <p:cNvPr id="69" name="Object 68">
+                          <a:extLst>
+                            <a:ext uri="{FF2B5EF4-FFF2-40B4-BE49-F238E27FC236}">
+                              <a16:creationId xmlns:a16="http://schemas.microsoft.com/office/drawing/2014/main" id="{2C8CA670-137A-4BEE-B97C-888ACD591832}"/>
+                            </a:ext>
+                          </a:extLst>
+                        </p:cNvPr>
+                        <p:cNvPicPr/>
+                        <p:nvPr/>
+                      </p:nvPicPr>
+                      <p:blipFill>
+                        <a:blip r:embed="rId6"/>
+                        <a:stretch>
+                          <a:fillRect/>
+                        </a:stretch>
+                      </p:blipFill>
+                      <p:spPr>
+                        <a:xfrm>
+                          <a:off x="6347281" y="1946212"/>
+                          <a:ext cx="1247775" cy="306388"/>
+                        </a:xfrm>
+                        <a:prstGeom prst="rect">
+                          <a:avLst/>
+                        </a:prstGeom>
+                      </p:spPr>
+                    </p:pic>
+                  </p:oleObj>
+                </mc:Fallback>
+              </mc:AlternateContent>
+            </a:graphicData>
+          </a:graphic>
+        </p:graphicFrame>
+        <p:graphicFrame>
+          <p:nvGraphicFramePr>
+            <p:cNvPr id="80" name="Object 79">
+              <a:extLst>
+                <a:ext uri="{FF2B5EF4-FFF2-40B4-BE49-F238E27FC236}">
+                  <a16:creationId xmlns:a16="http://schemas.microsoft.com/office/drawing/2014/main" id="{2F107422-5EB3-4CEF-99DA-C09875CFC405}"/>
+                </a:ext>
+              </a:extLst>
+            </p:cNvPr>
+            <p:cNvGraphicFramePr>
+              <a:graphicFrameLocks noChangeAspect="1"/>
+            </p:cNvGraphicFramePr>
+            <p:nvPr>
+              <p:extLst>
+                <p:ext uri="{D42A27DB-BD31-4B8C-83A1-F6EECF244321}">
+                  <p14:modId xmlns:p14="http://schemas.microsoft.com/office/powerpoint/2010/main" val="1894238754"/>
+                </p:ext>
+              </p:extLst>
+            </p:nvPr>
+          </p:nvGraphicFramePr>
+          <p:xfrm>
+            <a:off x="8046401" y="1946212"/>
+            <a:ext cx="919162" cy="306387"/>
+          </p:xfrm>
+          <a:graphic>
+            <a:graphicData uri="http://schemas.openxmlformats.org/presentationml/2006/ole">
+              <mc:AlternateContent xmlns:mc="http://schemas.openxmlformats.org/markup-compatibility/2006">
+                <mc:Choice xmlns:v="urn:schemas-microsoft-com:vml" Requires="v">
+                  <p:oleObj spid="_x0000_s3363" name="Equation" r:id="rId7" imgW="533160" imgH="177480" progId="Equation.DSMT4">
+                    <p:embed/>
+                  </p:oleObj>
+                </mc:Choice>
+                <mc:Fallback>
+                  <p:oleObj name="Equation" r:id="rId7" imgW="533160" imgH="177480" progId="Equation.DSMT4">
+                    <p:embed/>
+                    <p:pic>
+                      <p:nvPicPr>
+                        <p:cNvPr id="70" name="Object 69">
+                          <a:extLst>
+                            <a:ext uri="{FF2B5EF4-FFF2-40B4-BE49-F238E27FC236}">
+                              <a16:creationId xmlns:a16="http://schemas.microsoft.com/office/drawing/2014/main" id="{372D09C3-76E9-4AC7-AFC6-249B5395122E}"/>
+                            </a:ext>
+                          </a:extLst>
+                        </p:cNvPr>
+                        <p:cNvPicPr/>
+                        <p:nvPr/>
+                      </p:nvPicPr>
+                      <p:blipFill>
+                        <a:blip r:embed="rId8"/>
+                        <a:stretch>
+                          <a:fillRect/>
+                        </a:stretch>
+                      </p:blipFill>
+                      <p:spPr>
+                        <a:xfrm>
+                          <a:off x="8046401" y="1946212"/>
+                          <a:ext cx="919162" cy="306387"/>
+                        </a:xfrm>
+                        <a:prstGeom prst="rect">
+                          <a:avLst/>
+                        </a:prstGeom>
+                      </p:spPr>
+                    </p:pic>
+                  </p:oleObj>
+                </mc:Fallback>
+              </mc:AlternateContent>
+            </a:graphicData>
+          </a:graphic>
+        </p:graphicFrame>
+        <p:sp>
+          <p:nvSpPr>
+            <p:cNvPr id="77" name="Rectangle 76">
+              <a:extLst>
+                <a:ext uri="{FF2B5EF4-FFF2-40B4-BE49-F238E27FC236}">
+                  <a16:creationId xmlns:a16="http://schemas.microsoft.com/office/drawing/2014/main" id="{0806358E-D24E-4A60-8BBE-0F0F32575425}"/>
+                </a:ext>
+              </a:extLst>
+            </p:cNvPr>
+            <p:cNvSpPr/>
+            <p:nvPr/>
+          </p:nvSpPr>
+          <p:spPr>
+            <a:xfrm>
+              <a:off x="2118134" y="1735866"/>
+              <a:ext cx="7385132" cy="769917"/>
+            </a:xfrm>
+            <a:prstGeom prst="rect">
+              <a:avLst/>
+            </a:prstGeom>
+            <a:noFill/>
+            <a:ln w="12700">
+              <a:solidFill>
+                <a:schemeClr val="tx1"/>
+              </a:solidFill>
+            </a:ln>
+          </p:spPr>
+          <p:style>
+            <a:lnRef idx="2">
+              <a:schemeClr val="accent1">
+                <a:shade val="50000"/>
+              </a:schemeClr>
+            </a:lnRef>
+            <a:fillRef idx="1">
+              <a:schemeClr val="accent1"/>
+            </a:fillRef>
+            <a:effectRef idx="0">
+              <a:schemeClr val="accent1"/>
+            </a:effectRef>
+            <a:fontRef idx="minor">
+              <a:schemeClr val="lt1"/>
+            </a:fontRef>
+          </p:style>
+          <p:txBody>
+            <a:bodyPr rtlCol="0" anchor="ctr"/>
+            <a:lstStyle/>
+            <a:p>
+              <a:pPr algn="ctr"/>
+              <a:endParaRPr lang="en-US"/>
+            </a:p>
+          </p:txBody>
+        </p:sp>
+        <p:sp>
+          <p:nvSpPr>
+            <p:cNvPr id="43" name="TextBox 42">
+              <a:extLst>
+                <a:ext uri="{FF2B5EF4-FFF2-40B4-BE49-F238E27FC236}">
+                  <a16:creationId xmlns:a16="http://schemas.microsoft.com/office/drawing/2014/main" id="{6D1CB728-8502-43A9-9CD0-ED7E0F346767}"/>
+                </a:ext>
+              </a:extLst>
+            </p:cNvPr>
+            <p:cNvSpPr txBox="1"/>
+            <p:nvPr/>
+          </p:nvSpPr>
+          <p:spPr>
+            <a:xfrm>
+              <a:off x="2296817" y="2649017"/>
+              <a:ext cx="7681453" cy="369332"/>
+            </a:xfrm>
+            <a:prstGeom prst="rect">
+              <a:avLst/>
+            </a:prstGeom>
+            <a:noFill/>
+            <a:ln>
+              <a:noFill/>
+            </a:ln>
+          </p:spPr>
+          <p:txBody>
+            <a:bodyPr wrap="square" rtlCol="0">
+              <a:spAutoFit/>
+            </a:bodyPr>
+            <a:lstStyle/>
+            <a:p>
+              <a:r>
+                <a:rPr lang="en-US" dirty="0"/>
+                <a:t>Solution of the cubic equation for value                          for selected values of </a:t>
+              </a:r>
+            </a:p>
+          </p:txBody>
+        </p:sp>
+        <p:graphicFrame>
+          <p:nvGraphicFramePr>
+            <p:cNvPr id="46" name="Object 45">
+              <a:extLst>
+                <a:ext uri="{FF2B5EF4-FFF2-40B4-BE49-F238E27FC236}">
+                  <a16:creationId xmlns:a16="http://schemas.microsoft.com/office/drawing/2014/main" id="{410E8D12-B3DE-4AD1-B654-1E7CD1F98426}"/>
+                </a:ext>
+              </a:extLst>
+            </p:cNvPr>
+            <p:cNvGraphicFramePr>
+              <a:graphicFrameLocks noChangeAspect="1"/>
+            </p:cNvGraphicFramePr>
+            <p:nvPr>
+              <p:extLst>
+                <p:ext uri="{D42A27DB-BD31-4B8C-83A1-F6EECF244321}">
+                  <p14:modId xmlns:p14="http://schemas.microsoft.com/office/powerpoint/2010/main" val="2981137912"/>
+                </p:ext>
+              </p:extLst>
+            </p:nvPr>
+          </p:nvGraphicFramePr>
+          <p:xfrm>
+            <a:off x="9421126" y="2691187"/>
+            <a:ext cx="590550" cy="328612"/>
+          </p:xfrm>
+          <a:graphic>
+            <a:graphicData uri="http://schemas.openxmlformats.org/presentationml/2006/ole">
+              <mc:AlternateContent xmlns:mc="http://schemas.openxmlformats.org/markup-compatibility/2006">
+                <mc:Choice xmlns:v="urn:schemas-microsoft-com:vml" Requires="v">
+                  <p:oleObj spid="_x0000_s3364" name="Equation" r:id="rId9" imgW="342720" imgH="190440" progId="Equation.DSMT4">
+                    <p:embed/>
+                  </p:oleObj>
+                </mc:Choice>
+                <mc:Fallback>
+                  <p:oleObj name="Equation" r:id="rId9" imgW="342720" imgH="190440" progId="Equation.DSMT4">
+                    <p:embed/>
+                    <p:pic>
+                      <p:nvPicPr>
+                        <p:cNvPr id="60" name="Object 59"/>
+                        <p:cNvPicPr/>
+                        <p:nvPr/>
+                      </p:nvPicPr>
+                      <p:blipFill>
+                        <a:blip r:embed="rId10"/>
+                        <a:stretch>
+                          <a:fillRect/>
+                        </a:stretch>
+                      </p:blipFill>
+                      <p:spPr>
+                        <a:xfrm>
+                          <a:off x="9421126" y="2691187"/>
+                          <a:ext cx="590550" cy="328612"/>
+                        </a:xfrm>
+                        <a:prstGeom prst="rect">
+                          <a:avLst/>
+                        </a:prstGeom>
+                      </p:spPr>
+                    </p:pic>
+                  </p:oleObj>
+                </mc:Fallback>
+              </mc:AlternateContent>
+            </a:graphicData>
+          </a:graphic>
+        </p:graphicFrame>
+        <p:graphicFrame>
+          <p:nvGraphicFramePr>
+            <p:cNvPr id="85" name="Object 84">
+              <a:extLst>
+                <a:ext uri="{FF2B5EF4-FFF2-40B4-BE49-F238E27FC236}">
+                  <a16:creationId xmlns:a16="http://schemas.microsoft.com/office/drawing/2014/main" id="{895FBD1F-3F4B-4653-B1E6-F1E9E4F71BB8}"/>
+                </a:ext>
+              </a:extLst>
+            </p:cNvPr>
+            <p:cNvGraphicFramePr>
+              <a:graphicFrameLocks noChangeAspect="1"/>
+            </p:cNvGraphicFramePr>
+            <p:nvPr>
+              <p:extLst>
+                <p:ext uri="{D42A27DB-BD31-4B8C-83A1-F6EECF244321}">
+                  <p14:modId xmlns:p14="http://schemas.microsoft.com/office/powerpoint/2010/main" val="1712929757"/>
+                </p:ext>
+              </p:extLst>
+            </p:nvPr>
+          </p:nvGraphicFramePr>
+          <p:xfrm>
+            <a:off x="6087415" y="2636359"/>
+            <a:ext cx="1241425" cy="415925"/>
+          </p:xfrm>
+          <a:graphic>
+            <a:graphicData uri="http://schemas.openxmlformats.org/presentationml/2006/ole">
+              <mc:AlternateContent xmlns:mc="http://schemas.openxmlformats.org/markup-compatibility/2006">
+                <mc:Choice xmlns:v="urn:schemas-microsoft-com:vml" Requires="v">
+                  <p:oleObj spid="_x0000_s3365" name="Equation" r:id="rId11" imgW="723600" imgH="241200" progId="Equation.DSMT4">
+                    <p:embed/>
+                  </p:oleObj>
+                </mc:Choice>
+                <mc:Fallback>
+                  <p:oleObj name="Equation" r:id="rId11" imgW="723600" imgH="241200" progId="Equation.DSMT4">
+                    <p:embed/>
+                    <p:pic>
+                      <p:nvPicPr>
+                        <p:cNvPr id="45" name="Object 44">
+                          <a:extLst>
+                            <a:ext uri="{FF2B5EF4-FFF2-40B4-BE49-F238E27FC236}">
+                              <a16:creationId xmlns:a16="http://schemas.microsoft.com/office/drawing/2014/main" id="{DD8C9306-A0F9-41AD-9BCA-663A30552DC4}"/>
+                            </a:ext>
+                          </a:extLst>
+                        </p:cNvPr>
+                        <p:cNvPicPr/>
+                        <p:nvPr/>
+                      </p:nvPicPr>
+                      <p:blipFill>
+                        <a:blip r:embed="rId12"/>
+                        <a:stretch>
+                          <a:fillRect/>
+                        </a:stretch>
+                      </p:blipFill>
+                      <p:spPr>
+                        <a:xfrm>
+                          <a:off x="6087415" y="2636359"/>
+                          <a:ext cx="1241425" cy="415925"/>
+                        </a:xfrm>
+                        <a:prstGeom prst="rect">
+                          <a:avLst/>
+                        </a:prstGeom>
+                      </p:spPr>
+                    </p:pic>
+                  </p:oleObj>
+                </mc:Fallback>
+              </mc:AlternateContent>
+            </a:graphicData>
+          </a:graphic>
+        </p:graphicFrame>
+        <p:sp>
+          <p:nvSpPr>
+            <p:cNvPr id="86" name="Rectangle 85">
+              <a:extLst>
+                <a:ext uri="{FF2B5EF4-FFF2-40B4-BE49-F238E27FC236}">
+                  <a16:creationId xmlns:a16="http://schemas.microsoft.com/office/drawing/2014/main" id="{999E9BD2-BAF2-4B6B-86F2-4706F8F13BA9}"/>
+                </a:ext>
+              </a:extLst>
+            </p:cNvPr>
+            <p:cNvSpPr/>
+            <p:nvPr/>
+          </p:nvSpPr>
+          <p:spPr>
+            <a:xfrm>
+              <a:off x="2296817" y="2593111"/>
+              <a:ext cx="7681453" cy="471831"/>
+            </a:xfrm>
+            <a:prstGeom prst="rect">
+              <a:avLst/>
+            </a:prstGeom>
+            <a:noFill/>
+          </p:spPr>
+          <p:style>
+            <a:lnRef idx="2">
+              <a:schemeClr val="accent1">
+                <a:shade val="50000"/>
+              </a:schemeClr>
+            </a:lnRef>
+            <a:fillRef idx="1">
+              <a:schemeClr val="accent1"/>
+            </a:fillRef>
+            <a:effectRef idx="0">
+              <a:schemeClr val="accent1"/>
+            </a:effectRef>
+            <a:fontRef idx="minor">
+              <a:schemeClr val="lt1"/>
+            </a:fontRef>
+          </p:style>
+          <p:txBody>
+            <a:bodyPr rtlCol="0" anchor="ctr"/>
+            <a:lstStyle/>
+            <a:p>
+              <a:pPr algn="ctr"/>
+              <a:endParaRPr lang="en-US"/>
+            </a:p>
+          </p:txBody>
+        </p:sp>
+        <p:cxnSp>
+          <p:nvCxnSpPr>
+            <p:cNvPr id="51" name="Straight Connector 50">
+              <a:extLst>
+                <a:ext uri="{FF2B5EF4-FFF2-40B4-BE49-F238E27FC236}">
+                  <a16:creationId xmlns:a16="http://schemas.microsoft.com/office/drawing/2014/main" id="{5A1F8529-B477-436D-B001-4B30C3924E8C}"/>
+                </a:ext>
+              </a:extLst>
+            </p:cNvPr>
+            <p:cNvCxnSpPr>
+              <a:cxnSpLocks/>
+            </p:cNvCxnSpPr>
+            <p:nvPr/>
+          </p:nvCxnSpPr>
+          <p:spPr>
+            <a:xfrm flipH="1">
+              <a:off x="1966838" y="2128813"/>
+              <a:ext cx="161234" cy="6091"/>
+            </a:xfrm>
+            <a:prstGeom prst="line">
+              <a:avLst/>
+            </a:prstGeom>
+            <a:ln w="19050">
+              <a:solidFill>
+                <a:schemeClr val="tx1"/>
+              </a:solidFill>
+            </a:ln>
+          </p:spPr>
+          <p:style>
+            <a:lnRef idx="1">
+              <a:schemeClr val="accent1"/>
+            </a:lnRef>
+            <a:fillRef idx="0">
+              <a:schemeClr val="accent1"/>
+            </a:fillRef>
+            <a:effectRef idx="0">
+              <a:schemeClr val="accent1"/>
+            </a:effectRef>
+            <a:fontRef idx="minor">
+              <a:schemeClr val="tx1"/>
+            </a:fontRef>
+          </p:style>
+        </p:cxnSp>
+        <p:cxnSp>
+          <p:nvCxnSpPr>
+            <p:cNvPr id="52" name="Straight Connector 51">
+              <a:extLst>
+                <a:ext uri="{FF2B5EF4-FFF2-40B4-BE49-F238E27FC236}">
+                  <a16:creationId xmlns:a16="http://schemas.microsoft.com/office/drawing/2014/main" id="{2D0E4444-1055-4929-94E3-E29065B977AB}"/>
+                </a:ext>
+              </a:extLst>
+            </p:cNvPr>
+            <p:cNvCxnSpPr>
+              <a:cxnSpLocks/>
+            </p:cNvCxnSpPr>
+            <p:nvPr/>
+          </p:nvCxnSpPr>
+          <p:spPr>
+            <a:xfrm flipV="1">
+              <a:off x="1921351" y="2128815"/>
+              <a:ext cx="34715" cy="3897228"/>
+            </a:xfrm>
+            <a:prstGeom prst="line">
+              <a:avLst/>
+            </a:prstGeom>
+            <a:ln w="19050">
+              <a:solidFill>
+                <a:schemeClr val="tx1"/>
+              </a:solidFill>
+            </a:ln>
+          </p:spPr>
+          <p:style>
+            <a:lnRef idx="1">
+              <a:schemeClr val="accent1"/>
+            </a:lnRef>
+            <a:fillRef idx="0">
+              <a:schemeClr val="accent1"/>
+            </a:fillRef>
+            <a:effectRef idx="0">
+              <a:schemeClr val="accent1"/>
+            </a:effectRef>
+            <a:fontRef idx="minor">
+              <a:schemeClr val="tx1"/>
+            </a:fontRef>
+          </p:style>
+        </p:cxnSp>
+        <p:cxnSp>
+          <p:nvCxnSpPr>
+            <p:cNvPr id="54" name="Straight Connector 53">
+              <a:extLst>
+                <a:ext uri="{FF2B5EF4-FFF2-40B4-BE49-F238E27FC236}">
+                  <a16:creationId xmlns:a16="http://schemas.microsoft.com/office/drawing/2014/main" id="{33B79DF5-4C43-4199-A7AF-BC549DE07771}"/>
+                </a:ext>
+              </a:extLst>
+            </p:cNvPr>
+            <p:cNvCxnSpPr/>
+            <p:nvPr/>
+          </p:nvCxnSpPr>
+          <p:spPr>
+            <a:xfrm flipH="1">
+              <a:off x="1928188" y="6026043"/>
+              <a:ext cx="277283" cy="1310"/>
+            </a:xfrm>
+            <a:prstGeom prst="line">
+              <a:avLst/>
+            </a:prstGeom>
+            <a:ln w="19050">
+              <a:solidFill>
+                <a:schemeClr val="tx1"/>
+              </a:solidFill>
+            </a:ln>
+          </p:spPr>
+          <p:style>
+            <a:lnRef idx="1">
+              <a:schemeClr val="accent1"/>
+            </a:lnRef>
+            <a:fillRef idx="0">
+              <a:schemeClr val="accent1"/>
+            </a:fillRef>
+            <a:effectRef idx="0">
+              <a:schemeClr val="accent1"/>
+            </a:effectRef>
+            <a:fontRef idx="minor">
+              <a:schemeClr val="tx1"/>
+            </a:fontRef>
+          </p:style>
+        </p:cxnSp>
+        <p:cxnSp>
+          <p:nvCxnSpPr>
+            <p:cNvPr id="61" name="Straight Connector 60">
+              <a:extLst>
+                <a:ext uri="{FF2B5EF4-FFF2-40B4-BE49-F238E27FC236}">
+                  <a16:creationId xmlns:a16="http://schemas.microsoft.com/office/drawing/2014/main" id="{660EBF90-1EB2-4DA1-AC9B-A61A7792E68F}"/>
+                </a:ext>
+              </a:extLst>
+            </p:cNvPr>
+            <p:cNvCxnSpPr>
+              <a:cxnSpLocks/>
+            </p:cNvCxnSpPr>
+            <p:nvPr/>
+          </p:nvCxnSpPr>
+          <p:spPr>
+            <a:xfrm flipH="1" flipV="1">
+              <a:off x="1601011" y="1263192"/>
+              <a:ext cx="3528" cy="4855552"/>
+            </a:xfrm>
+            <a:prstGeom prst="line">
+              <a:avLst/>
+            </a:prstGeom>
+            <a:ln w="19050">
+              <a:solidFill>
+                <a:schemeClr val="tx1"/>
+              </a:solidFill>
+            </a:ln>
+          </p:spPr>
+          <p:style>
+            <a:lnRef idx="1">
+              <a:schemeClr val="accent1"/>
+            </a:lnRef>
+            <a:fillRef idx="0">
+              <a:schemeClr val="accent1"/>
+            </a:fillRef>
+            <a:effectRef idx="0">
+              <a:schemeClr val="accent1"/>
+            </a:effectRef>
+            <a:fontRef idx="minor">
+              <a:schemeClr val="tx1"/>
+            </a:fontRef>
+          </p:style>
+        </p:cxnSp>
+        <p:cxnSp>
+          <p:nvCxnSpPr>
+            <p:cNvPr id="63" name="Straight Connector 62">
+              <a:extLst>
+                <a:ext uri="{FF2B5EF4-FFF2-40B4-BE49-F238E27FC236}">
+                  <a16:creationId xmlns:a16="http://schemas.microsoft.com/office/drawing/2014/main" id="{4D83C9E4-E488-4FD3-B3B7-03CD78AFB585}"/>
+                </a:ext>
+              </a:extLst>
+            </p:cNvPr>
+            <p:cNvCxnSpPr>
+              <a:cxnSpLocks/>
+            </p:cNvCxnSpPr>
+            <p:nvPr/>
+          </p:nvCxnSpPr>
+          <p:spPr>
+            <a:xfrm flipH="1">
+              <a:off x="1588262" y="6118743"/>
+              <a:ext cx="601922" cy="0"/>
+            </a:xfrm>
+            <a:prstGeom prst="line">
+              <a:avLst/>
+            </a:prstGeom>
+            <a:ln w="19050">
+              <a:solidFill>
+                <a:schemeClr val="tx1"/>
+              </a:solidFill>
+            </a:ln>
+          </p:spPr>
+          <p:style>
+            <a:lnRef idx="1">
+              <a:schemeClr val="accent1"/>
+            </a:lnRef>
+            <a:fillRef idx="0">
+              <a:schemeClr val="accent1"/>
+            </a:fillRef>
+            <a:effectRef idx="0">
+              <a:schemeClr val="accent1"/>
+            </a:effectRef>
+            <a:fontRef idx="minor">
+              <a:schemeClr val="tx1"/>
+            </a:fontRef>
+          </p:style>
+        </p:cxnSp>
+        <p:grpSp>
+          <p:nvGrpSpPr>
+            <p:cNvPr id="74" name="Group 73">
+              <a:extLst>
+                <a:ext uri="{FF2B5EF4-FFF2-40B4-BE49-F238E27FC236}">
+                  <a16:creationId xmlns:a16="http://schemas.microsoft.com/office/drawing/2014/main" id="{4CC329EE-BDF2-4428-A60A-E580A5C37E28}"/>
+                </a:ext>
+              </a:extLst>
+            </p:cNvPr>
+            <p:cNvGrpSpPr/>
+            <p:nvPr/>
+          </p:nvGrpSpPr>
+          <p:grpSpPr>
+            <a:xfrm>
+              <a:off x="1967230" y="871508"/>
+              <a:ext cx="7529739" cy="790883"/>
+              <a:chOff x="1609011" y="136217"/>
+              <a:chExt cx="7529739" cy="790883"/>
+            </a:xfrm>
+          </p:grpSpPr>
+          <p:grpSp>
+            <p:nvGrpSpPr>
+              <p:cNvPr id="71" name="Group 70">
+                <a:extLst>
+                  <a:ext uri="{FF2B5EF4-FFF2-40B4-BE49-F238E27FC236}">
+                    <a16:creationId xmlns:a16="http://schemas.microsoft.com/office/drawing/2014/main" id="{07E7F227-0EE3-4C0C-8102-BD637C8B829F}"/>
+                  </a:ext>
+                </a:extLst>
+              </p:cNvPr>
+              <p:cNvGrpSpPr/>
+              <p:nvPr/>
+            </p:nvGrpSpPr>
+            <p:grpSpPr>
+              <a:xfrm>
+                <a:off x="1609011" y="136525"/>
+                <a:ext cx="7529739" cy="790575"/>
+                <a:chOff x="1647530" y="-80960"/>
+                <a:chExt cx="7529739" cy="790575"/>
+              </a:xfrm>
+            </p:grpSpPr>
+            <p:grpSp>
+              <p:nvGrpSpPr>
+                <p:cNvPr id="11" name="Group 10">
+                  <a:extLst>
+                    <a:ext uri="{FF2B5EF4-FFF2-40B4-BE49-F238E27FC236}">
+                      <a16:creationId xmlns:a16="http://schemas.microsoft.com/office/drawing/2014/main" id="{043C2479-82DD-4BE6-B71C-57795C528028}"/>
+                    </a:ext>
+                  </a:extLst>
+                </p:cNvPr>
+                <p:cNvGrpSpPr/>
+                <p:nvPr/>
+              </p:nvGrpSpPr>
+              <p:grpSpPr>
+                <a:xfrm>
+                  <a:off x="1647530" y="-80960"/>
+                  <a:ext cx="7529739" cy="790575"/>
+                  <a:chOff x="4789714" y="-108514"/>
+                  <a:chExt cx="7529739" cy="790575"/>
+                </a:xfrm>
+              </p:grpSpPr>
+              <p:sp>
+                <p:nvSpPr>
+                  <p:cNvPr id="12" name="TextBox 11">
+                    <a:extLst>
+                      <a:ext uri="{FF2B5EF4-FFF2-40B4-BE49-F238E27FC236}">
+                        <a16:creationId xmlns:a16="http://schemas.microsoft.com/office/drawing/2014/main" id="{7844C074-6EB0-4548-BBB6-C785DA9BB5BF}"/>
+                      </a:ext>
+                    </a:extLst>
+                  </p:cNvPr>
+                  <p:cNvSpPr txBox="1"/>
+                  <p:nvPr/>
+                </p:nvSpPr>
+                <p:spPr>
+                  <a:xfrm>
+                    <a:off x="4789714" y="78377"/>
+                    <a:ext cx="7529739" cy="369332"/>
+                  </a:xfrm>
+                  <a:prstGeom prst="rect">
+                    <a:avLst/>
+                  </a:prstGeom>
+                  <a:noFill/>
+                  <a:ln>
+                    <a:noFill/>
+                  </a:ln>
+                </p:spPr>
+                <p:txBody>
+                  <a:bodyPr wrap="square" rtlCol="0">
+                    <a:spAutoFit/>
+                  </a:bodyPr>
+                  <a:lstStyle/>
+                  <a:p>
+                    <a:r>
+                      <a:rPr lang="en-US" dirty="0"/>
+                      <a:t>Loop for value                                           in range                      with                  steps  </a:t>
+                    </a:r>
+                  </a:p>
+                </p:txBody>
+              </p:sp>
+              <p:graphicFrame>
+                <p:nvGraphicFramePr>
+                  <p:cNvPr id="13" name="Object 12">
+                    <a:extLst>
+                      <a:ext uri="{FF2B5EF4-FFF2-40B4-BE49-F238E27FC236}">
+                        <a16:creationId xmlns:a16="http://schemas.microsoft.com/office/drawing/2014/main" id="{099E243C-1F21-4408-9C60-4C220182492C}"/>
+                      </a:ext>
+                    </a:extLst>
+                  </p:cNvPr>
+                  <p:cNvGraphicFramePr>
+                    <a:graphicFrameLocks noChangeAspect="1"/>
+                  </p:cNvGraphicFramePr>
+                  <p:nvPr>
+                    <p:extLst>
+                      <p:ext uri="{D42A27DB-BD31-4B8C-83A1-F6EECF244321}">
+                        <p14:modId xmlns:p14="http://schemas.microsoft.com/office/powerpoint/2010/main" val="1905871021"/>
+                      </p:ext>
+                    </p:extLst>
+                  </p:nvPr>
+                </p:nvGraphicFramePr>
+                <p:xfrm>
+                  <a:off x="6231878" y="-108514"/>
+                  <a:ext cx="2173288" cy="790575"/>
+                </p:xfrm>
+                <a:graphic>
+                  <a:graphicData uri="http://schemas.openxmlformats.org/presentationml/2006/ole">
+                    <mc:AlternateContent xmlns:mc="http://schemas.openxmlformats.org/markup-compatibility/2006">
+                      <mc:Choice xmlns:v="urn:schemas-microsoft-com:vml" Requires="v">
+                        <p:oleObj spid="_x0000_s3366" name="Equation" r:id="rId13" imgW="1257120" imgH="457200" progId="Equation.DSMT4">
+                          <p:embed/>
+                        </p:oleObj>
+                      </mc:Choice>
+                      <mc:Fallback>
+                        <p:oleObj name="Equation" r:id="rId13" imgW="1257120" imgH="457200" progId="Equation.DSMT4">
+                          <p:embed/>
+                          <p:pic>
+                            <p:nvPicPr>
+                              <p:cNvPr id="21" name="Object 20"/>
+                              <p:cNvPicPr/>
+                              <p:nvPr/>
+                            </p:nvPicPr>
+                            <p:blipFill>
+                              <a:blip r:embed="rId14"/>
+                              <a:stretch>
+                                <a:fillRect/>
+                              </a:stretch>
+                            </p:blipFill>
+                            <p:spPr>
+                              <a:xfrm>
+                                <a:off x="6231878" y="-108514"/>
+                                <a:ext cx="2173288" cy="790575"/>
+                              </a:xfrm>
+                              <a:prstGeom prst="rect">
+                                <a:avLst/>
+                              </a:prstGeom>
+                            </p:spPr>
+                          </p:pic>
+                        </p:oleObj>
+                      </mc:Fallback>
+                    </mc:AlternateContent>
+                  </a:graphicData>
+                </a:graphic>
+              </p:graphicFrame>
+            </p:grpSp>
+            <p:graphicFrame>
+              <p:nvGraphicFramePr>
+                <p:cNvPr id="69" name="Object 68">
+                  <a:extLst>
+                    <a:ext uri="{FF2B5EF4-FFF2-40B4-BE49-F238E27FC236}">
+                      <a16:creationId xmlns:a16="http://schemas.microsoft.com/office/drawing/2014/main" id="{2C8CA670-137A-4BEE-B97C-888ACD591832}"/>
+                    </a:ext>
+                  </a:extLst>
+                </p:cNvPr>
+                <p:cNvGraphicFramePr>
+                  <a:graphicFrameLocks noChangeAspect="1"/>
+                </p:cNvGraphicFramePr>
+                <p:nvPr>
+                  <p:extLst>
+                    <p:ext uri="{D42A27DB-BD31-4B8C-83A1-F6EECF244321}">
+                      <p14:modId xmlns:p14="http://schemas.microsoft.com/office/powerpoint/2010/main" val="4115112793"/>
+                    </p:ext>
+                  </p:extLst>
+                </p:nvPr>
+              </p:nvGraphicFramePr>
+              <p:xfrm>
+                <a:off x="6094103" y="145081"/>
+                <a:ext cx="1093787" cy="306387"/>
+              </p:xfrm>
+              <a:graphic>
+                <a:graphicData uri="http://schemas.openxmlformats.org/presentationml/2006/ole">
+                  <mc:AlternateContent xmlns:mc="http://schemas.openxmlformats.org/markup-compatibility/2006">
+                    <mc:Choice xmlns:v="urn:schemas-microsoft-com:vml" Requires="v">
+                      <p:oleObj spid="_x0000_s3367" name="Equation" r:id="rId15" imgW="634680" imgH="177480" progId="Equation.DSMT4">
+                        <p:embed/>
+                      </p:oleObj>
+                    </mc:Choice>
+                    <mc:Fallback>
+                      <p:oleObj name="Equation" r:id="rId15" imgW="634680" imgH="177480" progId="Equation.DSMT4">
+                        <p:embed/>
+                        <p:pic>
+                          <p:nvPicPr>
+                            <p:cNvPr id="33" name="Object 32">
+                              <a:extLst>
+                                <a:ext uri="{FF2B5EF4-FFF2-40B4-BE49-F238E27FC236}">
+                                  <a16:creationId xmlns:a16="http://schemas.microsoft.com/office/drawing/2014/main" id="{5E583790-2809-418D-88C8-4D96C3C07CDF}"/>
+                                </a:ext>
+                              </a:extLst>
+                            </p:cNvPr>
+                            <p:cNvPicPr/>
+                            <p:nvPr/>
+                          </p:nvPicPr>
+                          <p:blipFill>
+                            <a:blip r:embed="rId16"/>
+                            <a:stretch>
+                              <a:fillRect/>
+                            </a:stretch>
+                          </p:blipFill>
+                          <p:spPr>
+                            <a:xfrm>
+                              <a:off x="6094103" y="145081"/>
+                              <a:ext cx="1093787" cy="306387"/>
+                            </a:xfrm>
+                            <a:prstGeom prst="rect">
+                              <a:avLst/>
+                            </a:prstGeom>
+                          </p:spPr>
+                        </p:pic>
+                      </p:oleObj>
+                    </mc:Fallback>
+                  </mc:AlternateContent>
+                </a:graphicData>
+              </a:graphic>
+            </p:graphicFrame>
+            <p:graphicFrame>
+              <p:nvGraphicFramePr>
+                <p:cNvPr id="70" name="Object 69">
+                  <a:extLst>
+                    <a:ext uri="{FF2B5EF4-FFF2-40B4-BE49-F238E27FC236}">
+                      <a16:creationId xmlns:a16="http://schemas.microsoft.com/office/drawing/2014/main" id="{372D09C3-76E9-4AC7-AFC6-249B5395122E}"/>
+                    </a:ext>
+                  </a:extLst>
+                </p:cNvPr>
+                <p:cNvGraphicFramePr>
+                  <a:graphicFrameLocks noChangeAspect="1"/>
+                </p:cNvGraphicFramePr>
+                <p:nvPr>
+                  <p:extLst>
+                    <p:ext uri="{D42A27DB-BD31-4B8C-83A1-F6EECF244321}">
+                      <p14:modId xmlns:p14="http://schemas.microsoft.com/office/powerpoint/2010/main" val="4148110207"/>
+                    </p:ext>
+                  </p:extLst>
+                </p:nvPr>
+              </p:nvGraphicFramePr>
+              <p:xfrm>
+                <a:off x="7614069" y="128590"/>
+                <a:ext cx="962025" cy="306388"/>
+              </p:xfrm>
+              <a:graphic>
+                <a:graphicData uri="http://schemas.openxmlformats.org/presentationml/2006/ole">
+                  <mc:AlternateContent xmlns:mc="http://schemas.openxmlformats.org/markup-compatibility/2006">
+                    <mc:Choice xmlns:v="urn:schemas-microsoft-com:vml" Requires="v">
+                      <p:oleObj spid="_x0000_s3368" name="Equation" r:id="rId17" imgW="558720" imgH="177480" progId="Equation.DSMT4">
+                        <p:embed/>
+                      </p:oleObj>
+                    </mc:Choice>
+                    <mc:Fallback>
+                      <p:oleObj name="Equation" r:id="rId17" imgW="558720" imgH="177480" progId="Equation.DSMT4">
+                        <p:embed/>
+                        <p:pic>
+                          <p:nvPicPr>
+                            <p:cNvPr id="33" name="Object 32">
+                              <a:extLst>
+                                <a:ext uri="{FF2B5EF4-FFF2-40B4-BE49-F238E27FC236}">
+                                  <a16:creationId xmlns:a16="http://schemas.microsoft.com/office/drawing/2014/main" id="{5E583790-2809-418D-88C8-4D96C3C07CDF}"/>
+                                </a:ext>
+                              </a:extLst>
+                            </p:cNvPr>
+                            <p:cNvPicPr/>
+                            <p:nvPr/>
+                          </p:nvPicPr>
+                          <p:blipFill>
+                            <a:blip r:embed="rId18"/>
+                            <a:stretch>
+                              <a:fillRect/>
+                            </a:stretch>
+                          </p:blipFill>
+                          <p:spPr>
+                            <a:xfrm>
+                              <a:off x="7614069" y="128590"/>
+                              <a:ext cx="962025" cy="306388"/>
+                            </a:xfrm>
+                            <a:prstGeom prst="rect">
+                              <a:avLst/>
+                            </a:prstGeom>
+                          </p:spPr>
+                        </p:pic>
+                      </p:oleObj>
+                    </mc:Fallback>
+                  </mc:AlternateContent>
+                </a:graphicData>
+              </a:graphic>
+            </p:graphicFrame>
+          </p:grpSp>
+          <p:sp>
+            <p:nvSpPr>
+              <p:cNvPr id="72" name="Rectangle 71">
+                <a:extLst>
+                  <a:ext uri="{FF2B5EF4-FFF2-40B4-BE49-F238E27FC236}">
+                    <a16:creationId xmlns:a16="http://schemas.microsoft.com/office/drawing/2014/main" id="{51D17A4F-DA57-48E6-B04C-F3F596C2ADF0}"/>
+                  </a:ext>
+                </a:extLst>
+              </p:cNvPr>
+              <p:cNvSpPr/>
+              <p:nvPr/>
+            </p:nvSpPr>
+            <p:spPr>
+              <a:xfrm>
+                <a:off x="1609011" y="136217"/>
+                <a:ext cx="7484007" cy="769917"/>
+              </a:xfrm>
+              <a:prstGeom prst="rect">
+                <a:avLst/>
+              </a:prstGeom>
+              <a:noFill/>
+              <a:ln w="12700">
+                <a:solidFill>
+                  <a:schemeClr val="tx1"/>
+                </a:solidFill>
+              </a:ln>
+            </p:spPr>
+            <p:style>
+              <a:lnRef idx="2">
+                <a:schemeClr val="accent1">
+                  <a:shade val="50000"/>
+                </a:schemeClr>
+              </a:lnRef>
+              <a:fillRef idx="1">
+                <a:schemeClr val="accent1"/>
+              </a:fillRef>
+              <a:effectRef idx="0">
+                <a:schemeClr val="accent1"/>
+              </a:effectRef>
+              <a:fontRef idx="minor">
+                <a:schemeClr val="lt1"/>
+              </a:fontRef>
+            </p:style>
+            <p:txBody>
+              <a:bodyPr rtlCol="0" anchor="ctr"/>
+              <a:lstStyle/>
+              <a:p>
+                <a:pPr algn="ctr"/>
+                <a:endParaRPr lang="en-US"/>
+              </a:p>
+            </p:txBody>
+          </p:sp>
+        </p:grpSp>
+        <p:sp>
+          <p:nvSpPr>
+            <p:cNvPr id="90" name="TextBox 89">
+              <a:extLst>
+                <a:ext uri="{FF2B5EF4-FFF2-40B4-BE49-F238E27FC236}">
+                  <a16:creationId xmlns:a16="http://schemas.microsoft.com/office/drawing/2014/main" id="{B8528C13-05AF-48EA-BF60-D12C25C1F8B9}"/>
+                </a:ext>
+              </a:extLst>
+            </p:cNvPr>
+            <p:cNvSpPr txBox="1"/>
+            <p:nvPr/>
+          </p:nvSpPr>
+          <p:spPr>
+            <a:xfrm>
+              <a:off x="2296817" y="3225270"/>
+              <a:ext cx="7681453" cy="646331"/>
+            </a:xfrm>
+            <a:prstGeom prst="rect">
+              <a:avLst/>
+            </a:prstGeom>
+            <a:noFill/>
+            <a:ln>
+              <a:noFill/>
+            </a:ln>
+          </p:spPr>
+          <p:txBody>
+            <a:bodyPr wrap="square" rtlCol="0">
+              <a:spAutoFit/>
+            </a:bodyPr>
+            <a:lstStyle/>
+            <a:p>
+              <a:r>
+                <a:rPr lang="en-US" dirty="0"/>
+                <a:t>Calculation of the initial parameters                                                                             </a:t>
+              </a:r>
+            </a:p>
+            <a:p>
+              <a:r>
+                <a:rPr lang="en-US" dirty="0"/>
+                <a:t>for found value of                       </a:t>
+              </a:r>
+            </a:p>
+          </p:txBody>
+        </p:sp>
+        <p:graphicFrame>
+          <p:nvGraphicFramePr>
+            <p:cNvPr id="91" name="Object 90">
+              <a:extLst>
+                <a:ext uri="{FF2B5EF4-FFF2-40B4-BE49-F238E27FC236}">
+                  <a16:creationId xmlns:a16="http://schemas.microsoft.com/office/drawing/2014/main" id="{1FA9EC91-F4AB-436C-9069-8EAFFBEF14CA}"/>
+                </a:ext>
+              </a:extLst>
+            </p:cNvPr>
+            <p:cNvGraphicFramePr>
+              <a:graphicFrameLocks noChangeAspect="1"/>
+            </p:cNvGraphicFramePr>
+            <p:nvPr>
+              <p:extLst>
+                <p:ext uri="{D42A27DB-BD31-4B8C-83A1-F6EECF244321}">
+                  <p14:modId xmlns:p14="http://schemas.microsoft.com/office/powerpoint/2010/main" val="623049965"/>
+                </p:ext>
+              </p:extLst>
+            </p:nvPr>
+          </p:nvGraphicFramePr>
+          <p:xfrm>
+            <a:off x="3968616" y="3557550"/>
+            <a:ext cx="606985" cy="285750"/>
+          </p:xfrm>
+          <a:graphic>
+            <a:graphicData uri="http://schemas.openxmlformats.org/presentationml/2006/ole">
+              <mc:AlternateContent xmlns:mc="http://schemas.openxmlformats.org/markup-compatibility/2006">
+                <mc:Choice xmlns:v="urn:schemas-microsoft-com:vml" Requires="v">
+                  <p:oleObj spid="_x0000_s3369" name="Equation" r:id="rId19" imgW="139680" imgH="164880" progId="Equation.DSMT4">
+                    <p:embed/>
+                  </p:oleObj>
+                </mc:Choice>
+                <mc:Fallback>
+                  <p:oleObj name="Equation" r:id="rId19" imgW="139680" imgH="164880" progId="Equation.DSMT4">
+                    <p:embed/>
+                    <p:pic>
+                      <p:nvPicPr>
+                        <p:cNvPr id="46" name="Object 45">
+                          <a:extLst>
+                            <a:ext uri="{FF2B5EF4-FFF2-40B4-BE49-F238E27FC236}">
+                              <a16:creationId xmlns:a16="http://schemas.microsoft.com/office/drawing/2014/main" id="{410E8D12-B3DE-4AD1-B654-1E7CD1F98426}"/>
+                            </a:ext>
+                          </a:extLst>
+                        </p:cNvPr>
+                        <p:cNvPicPr/>
+                        <p:nvPr/>
+                      </p:nvPicPr>
+                      <p:blipFill>
+                        <a:blip r:embed="rId20"/>
+                        <a:stretch>
+                          <a:fillRect/>
+                        </a:stretch>
+                      </p:blipFill>
+                      <p:spPr>
+                        <a:xfrm>
+                          <a:off x="3968616" y="3557550"/>
+                          <a:ext cx="606985" cy="285750"/>
+                        </a:xfrm>
+                        <a:prstGeom prst="rect">
+                          <a:avLst/>
+                        </a:prstGeom>
+                      </p:spPr>
+                    </p:pic>
+                  </p:oleObj>
+                </mc:Fallback>
+              </mc:AlternateContent>
+            </a:graphicData>
+          </a:graphic>
+        </p:graphicFrame>
+        <p:graphicFrame>
+          <p:nvGraphicFramePr>
+            <p:cNvPr id="92" name="Object 91">
+              <a:extLst>
+                <a:ext uri="{FF2B5EF4-FFF2-40B4-BE49-F238E27FC236}">
+                  <a16:creationId xmlns:a16="http://schemas.microsoft.com/office/drawing/2014/main" id="{3A072DA4-BB7A-49C3-AFE6-7D7ADD5699E4}"/>
+                </a:ext>
+              </a:extLst>
+            </p:cNvPr>
+            <p:cNvGraphicFramePr>
+              <a:graphicFrameLocks noChangeAspect="1"/>
+            </p:cNvGraphicFramePr>
+            <p:nvPr>
+              <p:extLst>
+                <p:ext uri="{D42A27DB-BD31-4B8C-83A1-F6EECF244321}">
+                  <p14:modId xmlns:p14="http://schemas.microsoft.com/office/powerpoint/2010/main" val="3420376559"/>
+                </p:ext>
+              </p:extLst>
+            </p:nvPr>
+          </p:nvGraphicFramePr>
+          <p:xfrm>
+            <a:off x="5752413" y="3245042"/>
+            <a:ext cx="3963988" cy="415925"/>
+          </p:xfrm>
+          <a:graphic>
+            <a:graphicData uri="http://schemas.openxmlformats.org/presentationml/2006/ole">
+              <mc:AlternateContent xmlns:mc="http://schemas.openxmlformats.org/markup-compatibility/2006">
+                <mc:Choice xmlns:v="urn:schemas-microsoft-com:vml" Requires="v">
+                  <p:oleObj spid="_x0000_s3370" name="Equation" r:id="rId21" imgW="2311200" imgH="241200" progId="Equation.DSMT4">
+                    <p:embed/>
+                  </p:oleObj>
+                </mc:Choice>
+                <mc:Fallback>
+                  <p:oleObj name="Equation" r:id="rId21" imgW="2311200" imgH="241200" progId="Equation.DSMT4">
+                    <p:embed/>
+                    <p:pic>
+                      <p:nvPicPr>
+                        <p:cNvPr id="85" name="Object 84">
+                          <a:extLst>
+                            <a:ext uri="{FF2B5EF4-FFF2-40B4-BE49-F238E27FC236}">
+                              <a16:creationId xmlns:a16="http://schemas.microsoft.com/office/drawing/2014/main" id="{895FBD1F-3F4B-4653-B1E6-F1E9E4F71BB8}"/>
+                            </a:ext>
+                          </a:extLst>
+                        </p:cNvPr>
+                        <p:cNvPicPr/>
+                        <p:nvPr/>
+                      </p:nvPicPr>
+                      <p:blipFill>
+                        <a:blip r:embed="rId22"/>
+                        <a:stretch>
+                          <a:fillRect/>
+                        </a:stretch>
+                      </p:blipFill>
+                      <p:spPr>
+                        <a:xfrm>
+                          <a:off x="5752413" y="3245042"/>
+                          <a:ext cx="3963988" cy="415925"/>
+                        </a:xfrm>
+                        <a:prstGeom prst="rect">
+                          <a:avLst/>
+                        </a:prstGeom>
+                      </p:spPr>
+                    </p:pic>
+                  </p:oleObj>
+                </mc:Fallback>
+              </mc:AlternateContent>
+            </a:graphicData>
+          </a:graphic>
+        </p:graphicFrame>
+        <p:sp>
+          <p:nvSpPr>
+            <p:cNvPr id="93" name="Rectangle 92">
+              <a:extLst>
+                <a:ext uri="{FF2B5EF4-FFF2-40B4-BE49-F238E27FC236}">
+                  <a16:creationId xmlns:a16="http://schemas.microsoft.com/office/drawing/2014/main" id="{B017FE3E-4BD0-4A78-9496-6A23DACECB42}"/>
+                </a:ext>
+              </a:extLst>
+            </p:cNvPr>
+            <p:cNvSpPr/>
+            <p:nvPr/>
+          </p:nvSpPr>
+          <p:spPr>
+            <a:xfrm>
+              <a:off x="2296817" y="3169364"/>
+              <a:ext cx="7681453" cy="702237"/>
+            </a:xfrm>
+            <a:prstGeom prst="rect">
+              <a:avLst/>
+            </a:prstGeom>
+            <a:noFill/>
+          </p:spPr>
+          <p:style>
+            <a:lnRef idx="2">
+              <a:schemeClr val="accent1">
+                <a:shade val="50000"/>
+              </a:schemeClr>
+            </a:lnRef>
+            <a:fillRef idx="1">
+              <a:schemeClr val="accent1"/>
+            </a:fillRef>
+            <a:effectRef idx="0">
+              <a:schemeClr val="accent1"/>
+            </a:effectRef>
+            <a:fontRef idx="minor">
+              <a:schemeClr val="lt1"/>
+            </a:fontRef>
+          </p:style>
+          <p:txBody>
+            <a:bodyPr rtlCol="0" anchor="ctr"/>
+            <a:lstStyle/>
+            <a:p>
+              <a:pPr algn="ctr"/>
+              <a:endParaRPr lang="en-US"/>
+            </a:p>
+          </p:txBody>
+        </p:sp>
+        <p:grpSp>
+          <p:nvGrpSpPr>
+            <p:cNvPr id="97" name="Group 96">
+              <a:extLst>
+                <a:ext uri="{FF2B5EF4-FFF2-40B4-BE49-F238E27FC236}">
+                  <a16:creationId xmlns:a16="http://schemas.microsoft.com/office/drawing/2014/main" id="{8D11108D-640A-4503-8D82-9AC7A0263AD9}"/>
+                </a:ext>
+              </a:extLst>
+            </p:cNvPr>
+            <p:cNvGrpSpPr/>
+            <p:nvPr/>
+          </p:nvGrpSpPr>
+          <p:grpSpPr>
+            <a:xfrm>
+              <a:off x="2296817" y="4000582"/>
+              <a:ext cx="6378792" cy="392113"/>
+              <a:chOff x="1963930" y="3220837"/>
+              <a:chExt cx="6378792" cy="392113"/>
+            </a:xfrm>
+          </p:grpSpPr>
+          <p:graphicFrame>
+            <p:nvGraphicFramePr>
+              <p:cNvPr id="49" name="Object 48">
+                <a:extLst>
+                  <a:ext uri="{FF2B5EF4-FFF2-40B4-BE49-F238E27FC236}">
+                    <a16:creationId xmlns:a16="http://schemas.microsoft.com/office/drawing/2014/main" id="{21F5BD1C-1326-4D8D-8F42-A21211FEEA9C}"/>
+                  </a:ext>
+                </a:extLst>
+              </p:cNvPr>
+              <p:cNvGraphicFramePr>
+                <a:graphicFrameLocks noChangeAspect="1"/>
+              </p:cNvGraphicFramePr>
+              <p:nvPr>
+                <p:extLst>
+                  <p:ext uri="{D42A27DB-BD31-4B8C-83A1-F6EECF244321}">
+                    <p14:modId xmlns:p14="http://schemas.microsoft.com/office/powerpoint/2010/main" val="257247382"/>
+                  </p:ext>
+                </p:extLst>
+              </p:nvPr>
+            </p:nvGraphicFramePr>
+            <p:xfrm>
+              <a:off x="6915943" y="3220837"/>
+              <a:ext cx="1319213" cy="392113"/>
+            </p:xfrm>
+            <a:graphic>
+              <a:graphicData uri="http://schemas.openxmlformats.org/presentationml/2006/ole">
+                <mc:AlternateContent xmlns:mc="http://schemas.openxmlformats.org/markup-compatibility/2006">
+                  <mc:Choice xmlns:v="urn:schemas-microsoft-com:vml" Requires="v">
+                    <p:oleObj spid="_x0000_s3371" name="Equation" r:id="rId23" imgW="761760" imgH="228600" progId="Equation.DSMT4">
+                      <p:embed/>
+                    </p:oleObj>
+                  </mc:Choice>
+                  <mc:Fallback>
+                    <p:oleObj name="Equation" r:id="rId23" imgW="761760" imgH="228600" progId="Equation.DSMT4">
+                      <p:embed/>
+                      <p:pic>
+                        <p:nvPicPr>
+                          <p:cNvPr id="50" name="Object 49"/>
+                          <p:cNvPicPr/>
+                          <p:nvPr/>
+                        </p:nvPicPr>
+                        <p:blipFill>
+                          <a:blip r:embed="rId24"/>
+                          <a:stretch>
+                            <a:fillRect/>
+                          </a:stretch>
+                        </p:blipFill>
+                        <p:spPr>
+                          <a:xfrm>
+                            <a:off x="6915943" y="3220837"/>
+                            <a:ext cx="1319213" cy="392113"/>
+                          </a:xfrm>
+                          <a:prstGeom prst="rect">
+                            <a:avLst/>
+                          </a:prstGeom>
+                        </p:spPr>
+                      </p:pic>
+                    </p:oleObj>
+                  </mc:Fallback>
+                </mc:AlternateContent>
+              </a:graphicData>
+            </a:graphic>
+          </p:graphicFrame>
+          <p:sp>
+            <p:nvSpPr>
+              <p:cNvPr id="95" name="TextBox 94">
+                <a:extLst>
+                  <a:ext uri="{FF2B5EF4-FFF2-40B4-BE49-F238E27FC236}">
+                    <a16:creationId xmlns:a16="http://schemas.microsoft.com/office/drawing/2014/main" id="{774AFD7B-9A9A-4781-855D-F1BFBF689657}"/>
+                  </a:ext>
+                </a:extLst>
+              </p:cNvPr>
+              <p:cNvSpPr txBox="1"/>
+              <p:nvPr/>
+            </p:nvSpPr>
+            <p:spPr>
+              <a:xfrm>
+                <a:off x="1963930" y="3230338"/>
+                <a:ext cx="6378792" cy="369332"/>
+              </a:xfrm>
+              <a:prstGeom prst="rect">
+                <a:avLst/>
+              </a:prstGeom>
+              <a:noFill/>
+              <a:ln>
+                <a:noFill/>
+              </a:ln>
+            </p:spPr>
+            <p:txBody>
+              <a:bodyPr wrap="square" rtlCol="0">
+                <a:spAutoFit/>
+              </a:bodyPr>
+              <a:lstStyle/>
+              <a:p>
+                <a:r>
+                  <a:rPr lang="en-US" dirty="0"/>
+                  <a:t>Preparation of data for a loop along each track with </a:t>
+                </a:r>
+              </a:p>
+            </p:txBody>
+          </p:sp>
+          <p:sp>
+            <p:nvSpPr>
+              <p:cNvPr id="96" name="Rectangle 95">
+                <a:extLst>
+                  <a:ext uri="{FF2B5EF4-FFF2-40B4-BE49-F238E27FC236}">
+                    <a16:creationId xmlns:a16="http://schemas.microsoft.com/office/drawing/2014/main" id="{0FA5EE24-1F60-4331-9222-7464F8841C7F}"/>
+                  </a:ext>
+                </a:extLst>
+              </p:cNvPr>
+              <p:cNvSpPr/>
+              <p:nvPr/>
+            </p:nvSpPr>
+            <p:spPr>
+              <a:xfrm>
+                <a:off x="1963930" y="3230338"/>
+                <a:ext cx="6271226" cy="382612"/>
+              </a:xfrm>
+              <a:prstGeom prst="rect">
+                <a:avLst/>
+              </a:prstGeom>
+              <a:noFill/>
+            </p:spPr>
+            <p:style>
+              <a:lnRef idx="2">
+                <a:schemeClr val="accent1">
+                  <a:shade val="50000"/>
+                </a:schemeClr>
+              </a:lnRef>
+              <a:fillRef idx="1">
+                <a:schemeClr val="accent1"/>
+              </a:fillRef>
+              <a:effectRef idx="0">
+                <a:schemeClr val="accent1"/>
+              </a:effectRef>
+              <a:fontRef idx="minor">
+                <a:schemeClr val="lt1"/>
+              </a:fontRef>
+            </p:style>
+            <p:txBody>
+              <a:bodyPr rtlCol="0" anchor="ctr"/>
+              <a:lstStyle/>
+              <a:p>
+                <a:pPr algn="ctr"/>
+                <a:endParaRPr lang="en-US"/>
+              </a:p>
+            </p:txBody>
+          </p:sp>
+        </p:grpSp>
+        <p:grpSp>
+          <p:nvGrpSpPr>
+            <p:cNvPr id="102" name="Group 101">
+              <a:extLst>
+                <a:ext uri="{FF2B5EF4-FFF2-40B4-BE49-F238E27FC236}">
+                  <a16:creationId xmlns:a16="http://schemas.microsoft.com/office/drawing/2014/main" id="{8FD2EEC6-A3B1-4335-B689-ABAB62607405}"/>
+                </a:ext>
+              </a:extLst>
+            </p:cNvPr>
+            <p:cNvGrpSpPr/>
+            <p:nvPr/>
+          </p:nvGrpSpPr>
+          <p:grpSpPr>
+            <a:xfrm>
+              <a:off x="2545680" y="4501044"/>
+              <a:ext cx="3160514" cy="410921"/>
+              <a:chOff x="2184484" y="3580522"/>
+              <a:chExt cx="3160514" cy="410921"/>
+            </a:xfrm>
+          </p:grpSpPr>
+          <p:sp>
+            <p:nvSpPr>
+              <p:cNvPr id="100" name="TextBox 99">
+                <a:extLst>
+                  <a:ext uri="{FF2B5EF4-FFF2-40B4-BE49-F238E27FC236}">
+                    <a16:creationId xmlns:a16="http://schemas.microsoft.com/office/drawing/2014/main" id="{B3CCE7C9-2A0D-4D72-BA6F-DC6EDA317347}"/>
+                  </a:ext>
+                </a:extLst>
+              </p:cNvPr>
+              <p:cNvSpPr txBox="1"/>
+              <p:nvPr/>
+            </p:nvSpPr>
+            <p:spPr>
+              <a:xfrm>
+                <a:off x="2184484" y="3580522"/>
+                <a:ext cx="3160514" cy="369332"/>
+              </a:xfrm>
+              <a:prstGeom prst="rect">
+                <a:avLst/>
+              </a:prstGeom>
+              <a:noFill/>
+              <a:ln>
+                <a:noFill/>
+              </a:ln>
+            </p:spPr>
+            <p:txBody>
+              <a:bodyPr wrap="square" rtlCol="0">
+                <a:spAutoFit/>
+              </a:bodyPr>
+              <a:lstStyle/>
+              <a:p>
+                <a:r>
+                  <a:rPr lang="en-US" dirty="0"/>
+                  <a:t>“Pull” each track for approach-1 </a:t>
+                </a:r>
+              </a:p>
+            </p:txBody>
+          </p:sp>
+          <p:sp>
+            <p:nvSpPr>
+              <p:cNvPr id="101" name="Rectangle 100">
+                <a:extLst>
+                  <a:ext uri="{FF2B5EF4-FFF2-40B4-BE49-F238E27FC236}">
+                    <a16:creationId xmlns:a16="http://schemas.microsoft.com/office/drawing/2014/main" id="{29D681D5-8E0C-4631-8A76-2825AA6DD89A}"/>
+                  </a:ext>
+                </a:extLst>
+              </p:cNvPr>
+              <p:cNvSpPr/>
+              <p:nvPr/>
+            </p:nvSpPr>
+            <p:spPr>
+              <a:xfrm>
+                <a:off x="2225998" y="3608831"/>
+                <a:ext cx="3119000" cy="382612"/>
+              </a:xfrm>
+              <a:prstGeom prst="rect">
+                <a:avLst/>
+              </a:prstGeom>
+              <a:noFill/>
+            </p:spPr>
+            <p:style>
+              <a:lnRef idx="2">
+                <a:schemeClr val="accent1">
+                  <a:shade val="50000"/>
+                </a:schemeClr>
+              </a:lnRef>
+              <a:fillRef idx="1">
+                <a:schemeClr val="accent1"/>
+              </a:fillRef>
+              <a:effectRef idx="0">
+                <a:schemeClr val="accent1"/>
+              </a:effectRef>
+              <a:fontRef idx="minor">
+                <a:schemeClr val="lt1"/>
+              </a:fontRef>
+            </p:style>
+            <p:txBody>
+              <a:bodyPr rtlCol="0" anchor="ctr"/>
+              <a:lstStyle/>
+              <a:p>
+                <a:pPr algn="ctr"/>
+                <a:endParaRPr lang="en-US"/>
+              </a:p>
+            </p:txBody>
+          </p:sp>
+        </p:grpSp>
+        <p:grpSp>
+          <p:nvGrpSpPr>
+            <p:cNvPr id="103" name="Group 102">
+              <a:extLst>
+                <a:ext uri="{FF2B5EF4-FFF2-40B4-BE49-F238E27FC236}">
+                  <a16:creationId xmlns:a16="http://schemas.microsoft.com/office/drawing/2014/main" id="{8CDDB6DB-9BC5-4162-A46A-CE0679EEF8AD}"/>
+                </a:ext>
+              </a:extLst>
+            </p:cNvPr>
+            <p:cNvGrpSpPr/>
+            <p:nvPr/>
+          </p:nvGrpSpPr>
+          <p:grpSpPr>
+            <a:xfrm>
+              <a:off x="2524097" y="4998514"/>
+              <a:ext cx="3182097" cy="396259"/>
+              <a:chOff x="2184484" y="3553595"/>
+              <a:chExt cx="3182097" cy="396259"/>
+            </a:xfrm>
+          </p:grpSpPr>
+          <p:sp>
+            <p:nvSpPr>
+              <p:cNvPr id="104" name="TextBox 103">
+                <a:extLst>
+                  <a:ext uri="{FF2B5EF4-FFF2-40B4-BE49-F238E27FC236}">
+                    <a16:creationId xmlns:a16="http://schemas.microsoft.com/office/drawing/2014/main" id="{0BF13EB8-461E-400B-AC22-FA40C59E48BF}"/>
+                  </a:ext>
+                </a:extLst>
+              </p:cNvPr>
+              <p:cNvSpPr txBox="1"/>
+              <p:nvPr/>
+            </p:nvSpPr>
+            <p:spPr>
+              <a:xfrm>
+                <a:off x="2184484" y="3580522"/>
+                <a:ext cx="3160514" cy="369332"/>
+              </a:xfrm>
+              <a:prstGeom prst="rect">
+                <a:avLst/>
+              </a:prstGeom>
+              <a:noFill/>
+              <a:ln>
+                <a:noFill/>
+              </a:ln>
+            </p:spPr>
+            <p:txBody>
+              <a:bodyPr wrap="square" rtlCol="0">
+                <a:spAutoFit/>
+              </a:bodyPr>
+              <a:lstStyle/>
+              <a:p>
+                <a:r>
+                  <a:rPr lang="en-US" dirty="0"/>
+                  <a:t>“Pull” each track for approach-2 </a:t>
+                </a:r>
+              </a:p>
+            </p:txBody>
+          </p:sp>
+          <p:sp>
+            <p:nvSpPr>
+              <p:cNvPr id="105" name="Rectangle 104">
+                <a:extLst>
+                  <a:ext uri="{FF2B5EF4-FFF2-40B4-BE49-F238E27FC236}">
+                    <a16:creationId xmlns:a16="http://schemas.microsoft.com/office/drawing/2014/main" id="{E3D8C6D5-FC19-483E-B53E-BBD7A31DADCF}"/>
+                  </a:ext>
+                </a:extLst>
+              </p:cNvPr>
+              <p:cNvSpPr/>
+              <p:nvPr/>
+            </p:nvSpPr>
+            <p:spPr>
+              <a:xfrm>
+                <a:off x="2247581" y="3553595"/>
+                <a:ext cx="3119000" cy="382612"/>
+              </a:xfrm>
+              <a:prstGeom prst="rect">
+                <a:avLst/>
+              </a:prstGeom>
+              <a:noFill/>
+            </p:spPr>
+            <p:style>
+              <a:lnRef idx="2">
+                <a:schemeClr val="accent1">
+                  <a:shade val="50000"/>
+                </a:schemeClr>
+              </a:lnRef>
+              <a:fillRef idx="1">
+                <a:schemeClr val="accent1"/>
+              </a:fillRef>
+              <a:effectRef idx="0">
+                <a:schemeClr val="accent1"/>
+              </a:effectRef>
+              <a:fontRef idx="minor">
+                <a:schemeClr val="lt1"/>
+              </a:fontRef>
+            </p:style>
+            <p:txBody>
+              <a:bodyPr rtlCol="0" anchor="ctr"/>
+              <a:lstStyle/>
+              <a:p>
+                <a:pPr algn="ctr"/>
+                <a:endParaRPr lang="en-US"/>
+              </a:p>
+            </p:txBody>
+          </p:sp>
+        </p:grpSp>
+        <p:grpSp>
+          <p:nvGrpSpPr>
+            <p:cNvPr id="110" name="Group 109">
+              <a:extLst>
+                <a:ext uri="{FF2B5EF4-FFF2-40B4-BE49-F238E27FC236}">
+                  <a16:creationId xmlns:a16="http://schemas.microsoft.com/office/drawing/2014/main" id="{F6A97AB8-EE16-46D4-BA4E-CA3463D16E72}"/>
+                </a:ext>
+              </a:extLst>
+            </p:cNvPr>
+            <p:cNvGrpSpPr/>
+            <p:nvPr/>
+          </p:nvGrpSpPr>
+          <p:grpSpPr>
+            <a:xfrm>
+              <a:off x="2118134" y="5546405"/>
+              <a:ext cx="7079595" cy="382612"/>
+              <a:chOff x="2119277" y="5072126"/>
+              <a:chExt cx="7079595" cy="382612"/>
+            </a:xfrm>
+          </p:grpSpPr>
+          <p:sp>
+            <p:nvSpPr>
+              <p:cNvPr id="108" name="TextBox 107">
+                <a:extLst>
+                  <a:ext uri="{FF2B5EF4-FFF2-40B4-BE49-F238E27FC236}">
+                    <a16:creationId xmlns:a16="http://schemas.microsoft.com/office/drawing/2014/main" id="{591E68C0-1A02-42FF-A45B-B83B27FE2F5B}"/>
+                  </a:ext>
+                </a:extLst>
+              </p:cNvPr>
+              <p:cNvSpPr txBox="1"/>
+              <p:nvPr/>
+            </p:nvSpPr>
+            <p:spPr>
+              <a:xfrm>
+                <a:off x="2119278" y="5078766"/>
+                <a:ext cx="7079594" cy="369332"/>
+              </a:xfrm>
+              <a:prstGeom prst="rect">
+                <a:avLst/>
+              </a:prstGeom>
+              <a:noFill/>
+              <a:ln>
+                <a:noFill/>
+              </a:ln>
+            </p:spPr>
+            <p:txBody>
+              <a:bodyPr wrap="square" rtlCol="0">
+                <a:spAutoFit/>
+              </a:bodyPr>
+              <a:lstStyle/>
+              <a:p>
+                <a:r>
+                  <a:rPr lang="en-US" dirty="0"/>
+                  <a:t>Writing of the results to output files for later visualization and processing </a:t>
+                </a:r>
+              </a:p>
+            </p:txBody>
+          </p:sp>
+          <p:sp>
+            <p:nvSpPr>
+              <p:cNvPr id="109" name="Rectangle 108">
+                <a:extLst>
+                  <a:ext uri="{FF2B5EF4-FFF2-40B4-BE49-F238E27FC236}">
+                    <a16:creationId xmlns:a16="http://schemas.microsoft.com/office/drawing/2014/main" id="{37C456D1-A5DA-4AA7-BF64-3FCB8217F409}"/>
+                  </a:ext>
+                </a:extLst>
+              </p:cNvPr>
+              <p:cNvSpPr/>
+              <p:nvPr/>
+            </p:nvSpPr>
+            <p:spPr>
+              <a:xfrm>
+                <a:off x="2119277" y="5072126"/>
+                <a:ext cx="6917526" cy="382612"/>
+              </a:xfrm>
+              <a:prstGeom prst="rect">
+                <a:avLst/>
+              </a:prstGeom>
+              <a:noFill/>
+            </p:spPr>
+            <p:style>
+              <a:lnRef idx="2">
+                <a:schemeClr val="accent1">
+                  <a:shade val="50000"/>
+                </a:schemeClr>
+              </a:lnRef>
+              <a:fillRef idx="1">
+                <a:schemeClr val="accent1"/>
+              </a:fillRef>
+              <a:effectRef idx="0">
+                <a:schemeClr val="accent1"/>
+              </a:effectRef>
+              <a:fontRef idx="minor">
+                <a:schemeClr val="lt1"/>
+              </a:fontRef>
+            </p:style>
+            <p:txBody>
+              <a:bodyPr rtlCol="0" anchor="ctr"/>
+              <a:lstStyle/>
+              <a:p>
+                <a:pPr algn="ctr"/>
+                <a:endParaRPr lang="en-US"/>
+              </a:p>
+            </p:txBody>
+          </p:sp>
+        </p:grpSp>
+        <p:cxnSp>
+          <p:nvCxnSpPr>
+            <p:cNvPr id="115" name="Straight Connector 114">
+              <a:extLst>
+                <a:ext uri="{FF2B5EF4-FFF2-40B4-BE49-F238E27FC236}">
+                  <a16:creationId xmlns:a16="http://schemas.microsoft.com/office/drawing/2014/main" id="{B0D49516-563C-4365-9F6A-93F5B3D8106F}"/>
+                </a:ext>
+              </a:extLst>
+            </p:cNvPr>
+            <p:cNvCxnSpPr>
+              <a:cxnSpLocks/>
+            </p:cNvCxnSpPr>
+            <p:nvPr/>
+          </p:nvCxnSpPr>
+          <p:spPr>
+            <a:xfrm flipH="1" flipV="1">
+              <a:off x="1599462" y="1263192"/>
+              <a:ext cx="367768" cy="3912"/>
+            </a:xfrm>
+            <a:prstGeom prst="line">
+              <a:avLst/>
+            </a:prstGeom>
+            <a:ln w="19050">
+              <a:solidFill>
+                <a:schemeClr val="tx1"/>
+              </a:solidFill>
+            </a:ln>
+          </p:spPr>
+          <p:style>
+            <a:lnRef idx="1">
+              <a:schemeClr val="accent1"/>
+            </a:lnRef>
+            <a:fillRef idx="0">
+              <a:schemeClr val="accent1"/>
+            </a:fillRef>
+            <a:effectRef idx="0">
+              <a:schemeClr val="accent1"/>
+            </a:effectRef>
+            <a:fontRef idx="minor">
+              <a:schemeClr val="tx1"/>
+            </a:fontRef>
+          </p:style>
+        </p:cxnSp>
+        <p:sp>
+          <p:nvSpPr>
+            <p:cNvPr id="124" name="TextBox 123">
+              <a:extLst>
+                <a:ext uri="{FF2B5EF4-FFF2-40B4-BE49-F238E27FC236}">
+                  <a16:creationId xmlns:a16="http://schemas.microsoft.com/office/drawing/2014/main" id="{503F1299-93A0-4E8A-91A6-2FEAB55928EC}"/>
+                </a:ext>
+              </a:extLst>
+            </p:cNvPr>
+            <p:cNvSpPr txBox="1"/>
+            <p:nvPr/>
+          </p:nvSpPr>
+          <p:spPr>
+            <a:xfrm>
+              <a:off x="6213410" y="4771132"/>
+              <a:ext cx="2490844" cy="369332"/>
+            </a:xfrm>
+            <a:prstGeom prst="rect">
+              <a:avLst/>
+            </a:prstGeom>
+            <a:noFill/>
+          </p:spPr>
+          <p:txBody>
+            <a:bodyPr wrap="square" rtlCol="0">
+              <a:spAutoFit/>
+            </a:bodyPr>
+            <a:lstStyle/>
+            <a:p>
+              <a:r>
+                <a:rPr lang="en-US" dirty="0"/>
+                <a:t>See further </a:t>
+              </a:r>
+            </a:p>
+          </p:txBody>
+        </p:sp>
+        <p:sp>
+          <p:nvSpPr>
+            <p:cNvPr id="125" name="Right Brace 124">
+              <a:extLst>
+                <a:ext uri="{FF2B5EF4-FFF2-40B4-BE49-F238E27FC236}">
+                  <a16:creationId xmlns:a16="http://schemas.microsoft.com/office/drawing/2014/main" id="{556DB916-9D73-4F27-96E7-406C4A091B38}"/>
+                </a:ext>
+              </a:extLst>
+            </p:cNvPr>
+            <p:cNvSpPr/>
+            <p:nvPr/>
+          </p:nvSpPr>
+          <p:spPr>
+            <a:xfrm>
+              <a:off x="5881322" y="4565599"/>
+              <a:ext cx="326388" cy="757486"/>
+            </a:xfrm>
+            <a:prstGeom prst="rightBrace">
+              <a:avLst/>
+            </a:prstGeom>
+          </p:spPr>
+          <p:style>
+            <a:lnRef idx="1">
+              <a:schemeClr val="accent1"/>
+            </a:lnRef>
+            <a:fillRef idx="0">
+              <a:schemeClr val="accent1"/>
+            </a:fillRef>
+            <a:effectRef idx="0">
+              <a:schemeClr val="accent1"/>
+            </a:effectRef>
+            <a:fontRef idx="minor">
+              <a:schemeClr val="tx1"/>
+            </a:fontRef>
+          </p:style>
+          <p:txBody>
+            <a:bodyPr rtlCol="0" anchor="ctr"/>
+            <a:lstStyle/>
+            <a:p>
+              <a:pPr algn="ctr"/>
+              <a:endParaRPr lang="en-US"/>
+            </a:p>
+          </p:txBody>
+        </p:sp>
+        <p:cxnSp>
+          <p:nvCxnSpPr>
+            <p:cNvPr id="128" name="Straight Connector 127">
+              <a:extLst>
+                <a:ext uri="{FF2B5EF4-FFF2-40B4-BE49-F238E27FC236}">
+                  <a16:creationId xmlns:a16="http://schemas.microsoft.com/office/drawing/2014/main" id="{8F38652F-AB4F-461C-8689-A011714A4F37}"/>
+                </a:ext>
+              </a:extLst>
+            </p:cNvPr>
+            <p:cNvCxnSpPr>
+              <a:cxnSpLocks/>
+            </p:cNvCxnSpPr>
+            <p:nvPr/>
+          </p:nvCxnSpPr>
+          <p:spPr>
+            <a:xfrm flipV="1">
+              <a:off x="2448552" y="4463902"/>
+              <a:ext cx="16363" cy="1005377"/>
+            </a:xfrm>
+            <a:prstGeom prst="line">
+              <a:avLst/>
+            </a:prstGeom>
+            <a:ln w="19050">
+              <a:solidFill>
+                <a:schemeClr val="tx1"/>
+              </a:solidFill>
+            </a:ln>
+          </p:spPr>
+          <p:style>
+            <a:lnRef idx="1">
+              <a:schemeClr val="accent1"/>
+            </a:lnRef>
+            <a:fillRef idx="0">
+              <a:schemeClr val="accent1"/>
+            </a:fillRef>
+            <a:effectRef idx="0">
+              <a:schemeClr val="accent1"/>
+            </a:effectRef>
+            <a:fontRef idx="minor">
+              <a:schemeClr val="tx1"/>
+            </a:fontRef>
+          </p:style>
+        </p:cxnSp>
+        <p:cxnSp>
+          <p:nvCxnSpPr>
+            <p:cNvPr id="130" name="Straight Connector 129">
+              <a:extLst>
+                <a:ext uri="{FF2B5EF4-FFF2-40B4-BE49-F238E27FC236}">
+                  <a16:creationId xmlns:a16="http://schemas.microsoft.com/office/drawing/2014/main" id="{39DFAF79-A365-4018-BA4D-2E60065BB2A5}"/>
+                </a:ext>
+              </a:extLst>
+            </p:cNvPr>
+            <p:cNvCxnSpPr/>
+            <p:nvPr/>
+          </p:nvCxnSpPr>
+          <p:spPr>
+            <a:xfrm flipH="1">
+              <a:off x="2464915" y="4463394"/>
+              <a:ext cx="277283" cy="1310"/>
+            </a:xfrm>
+            <a:prstGeom prst="line">
+              <a:avLst/>
+            </a:prstGeom>
+            <a:ln w="19050">
+              <a:solidFill>
+                <a:schemeClr val="tx1"/>
+              </a:solidFill>
+            </a:ln>
+          </p:spPr>
+          <p:style>
+            <a:lnRef idx="1">
+              <a:schemeClr val="accent1"/>
+            </a:lnRef>
+            <a:fillRef idx="0">
+              <a:schemeClr val="accent1"/>
+            </a:fillRef>
+            <a:effectRef idx="0">
+              <a:schemeClr val="accent1"/>
+            </a:effectRef>
+            <a:fontRef idx="minor">
+              <a:schemeClr val="tx1"/>
+            </a:fontRef>
+          </p:style>
+        </p:cxnSp>
+        <p:cxnSp>
+          <p:nvCxnSpPr>
+            <p:cNvPr id="132" name="Straight Connector 131">
+              <a:extLst>
+                <a:ext uri="{FF2B5EF4-FFF2-40B4-BE49-F238E27FC236}">
+                  <a16:creationId xmlns:a16="http://schemas.microsoft.com/office/drawing/2014/main" id="{2973DA30-C339-4496-A62F-E49366F7FBD1}"/>
+                </a:ext>
+              </a:extLst>
+            </p:cNvPr>
+            <p:cNvCxnSpPr/>
+            <p:nvPr/>
+          </p:nvCxnSpPr>
+          <p:spPr>
+            <a:xfrm flipH="1">
+              <a:off x="2448552" y="5469279"/>
+              <a:ext cx="277283" cy="1310"/>
+            </a:xfrm>
+            <a:prstGeom prst="line">
+              <a:avLst/>
+            </a:prstGeom>
+            <a:ln w="19050">
+              <a:solidFill>
+                <a:schemeClr val="tx1"/>
+              </a:solidFill>
+            </a:ln>
+          </p:spPr>
+          <p:style>
+            <a:lnRef idx="1">
+              <a:schemeClr val="accent1"/>
+            </a:lnRef>
+            <a:fillRef idx="0">
+              <a:schemeClr val="accent1"/>
+            </a:fillRef>
+            <a:effectRef idx="0">
+              <a:schemeClr val="accent1"/>
+            </a:effectRef>
+            <a:fontRef idx="minor">
+              <a:schemeClr val="tx1"/>
+            </a:fontRef>
+          </p:style>
+        </p:cxnSp>
+      </p:grpSp>
+    </p:spTree>
+    <p:extLst>
+      <p:ext uri="{BB962C8B-B14F-4D97-AF65-F5344CB8AC3E}">
+        <p14:creationId xmlns:p14="http://schemas.microsoft.com/office/powerpoint/2010/main" val="3958846018"/>
+      </p:ext>
+    </p:extLst>
+  </p:cSld>
+  <p:clrMapOvr>
+    <a:masterClrMapping/>
+  </p:clrMapOvr>
+</p:sld>
+</file>
+
+<file path=ppt/slides/slide6.xml><?xml version="1.0" encoding="utf-8"?>
+<p:sld xmlns:a="http://schemas.openxmlformats.org/drawingml/2006/main" xmlns:r="http://schemas.openxmlformats.org/officeDocument/2006/relationships" xmlns:p="http://schemas.openxmlformats.org/presentationml/2006/main">
+  <p:cSld>
+    <p:spTree>
+      <p:nvGrpSpPr>
+        <p:cNvPr id="1" name=""/>
+        <p:cNvGrpSpPr/>
+        <p:nvPr/>
+      </p:nvGrpSpPr>
+      <p:grpSpPr>
+        <a:xfrm>
+          <a:off x="0" y="0"/>
+          <a:ext cx="0" cy="0"/>
+          <a:chOff x="0" y="0"/>
+          <a:chExt cx="0" cy="0"/>
+        </a:xfrm>
+      </p:grpSpPr>
+      <p:sp>
+        <p:nvSpPr>
+          <p:cNvPr id="2" name="TextBox 1">
+            <a:extLst>
+              <a:ext uri="{FF2B5EF4-FFF2-40B4-BE49-F238E27FC236}">
+                <a16:creationId xmlns:a16="http://schemas.microsoft.com/office/drawing/2014/main" id="{7570E296-F348-427A-AA78-5CE8B1778939}"/>
+              </a:ext>
+            </a:extLst>
+          </p:cNvPr>
+          <p:cNvSpPr txBox="1"/>
+          <p:nvPr/>
+        </p:nvSpPr>
+        <p:spPr>
+          <a:xfrm>
+            <a:off x="712535" y="120430"/>
+            <a:ext cx="4944437" cy="369332"/>
+          </a:xfrm>
+          <a:prstGeom prst="rect">
+            <a:avLst/>
+          </a:prstGeom>
+          <a:noFill/>
+          <a:ln>
+            <a:noFill/>
+          </a:ln>
+        </p:spPr>
+        <p:txBody>
+          <a:bodyPr wrap="square" rtlCol="0">
+            <a:spAutoFit/>
+          </a:bodyPr>
+          <a:lstStyle/>
+          <a:p>
+            <a:r>
+              <a:rPr lang="en-US" dirty="0"/>
+              <a:t>“Pull” each track for approach-1 (Larmor rotation): </a:t>
+            </a:r>
+          </a:p>
+        </p:txBody>
+      </p:sp>
+      <p:sp>
+        <p:nvSpPr>
+          <p:cNvPr id="3" name="TextBox 2">
+            <a:extLst>
+              <a:ext uri="{FF2B5EF4-FFF2-40B4-BE49-F238E27FC236}">
+                <a16:creationId xmlns:a16="http://schemas.microsoft.com/office/drawing/2014/main" id="{00F1165A-15A3-475B-98BF-5F5831F6A876}"/>
+              </a:ext>
+            </a:extLst>
+          </p:cNvPr>
+          <p:cNvSpPr txBox="1"/>
+          <p:nvPr/>
+        </p:nvSpPr>
+        <p:spPr>
+          <a:xfrm>
+            <a:off x="5656973" y="122896"/>
+            <a:ext cx="6282970" cy="369332"/>
+          </a:xfrm>
+          <a:prstGeom prst="rect">
+            <a:avLst/>
+          </a:prstGeom>
+          <a:noFill/>
+          <a:ln>
+            <a:noFill/>
+          </a:ln>
+        </p:spPr>
+        <p:txBody>
+          <a:bodyPr wrap="square" rtlCol="0">
+            <a:spAutoFit/>
+          </a:bodyPr>
+          <a:lstStyle/>
+          <a:p>
+            <a:r>
+              <a:rPr lang="en-US" dirty="0"/>
+              <a:t>“Pull” each track for approach-2 (“guiding center” system; gcs): </a:t>
+            </a:r>
+          </a:p>
+        </p:txBody>
+      </p:sp>
+      <p:grpSp>
+        <p:nvGrpSpPr>
+          <p:cNvPr id="30" name="Group 29">
+            <a:extLst>
+              <a:ext uri="{FF2B5EF4-FFF2-40B4-BE49-F238E27FC236}">
+                <a16:creationId xmlns:a16="http://schemas.microsoft.com/office/drawing/2014/main" id="{3EE353B6-AAD5-406D-B731-30A03FD56415}"/>
+              </a:ext>
+            </a:extLst>
+          </p:cNvPr>
+          <p:cNvGrpSpPr/>
+          <p:nvPr/>
+        </p:nvGrpSpPr>
+        <p:grpSpPr>
+          <a:xfrm>
+            <a:off x="217231" y="478718"/>
+            <a:ext cx="5376541" cy="2655673"/>
+            <a:chOff x="126333" y="953636"/>
+            <a:chExt cx="5376541" cy="2655673"/>
+          </a:xfrm>
+        </p:grpSpPr>
+        <p:sp>
+          <p:nvSpPr>
+            <p:cNvPr id="5" name="Flowchart: Process 4">
+              <a:extLst>
+                <a:ext uri="{FF2B5EF4-FFF2-40B4-BE49-F238E27FC236}">
+                  <a16:creationId xmlns:a16="http://schemas.microsoft.com/office/drawing/2014/main" id="{8EDA70D8-07F6-46B3-861B-A29EC8F45534}"/>
+                </a:ext>
+              </a:extLst>
+            </p:cNvPr>
+            <p:cNvSpPr/>
+            <p:nvPr/>
+          </p:nvSpPr>
+          <p:spPr>
+            <a:xfrm>
+              <a:off x="126333" y="953636"/>
+              <a:ext cx="5376541" cy="2655673"/>
+            </a:xfrm>
+            <a:prstGeom prst="flowChartProcess">
+              <a:avLst/>
+            </a:prstGeom>
+            <a:noFill/>
+          </p:spPr>
+          <p:style>
+            <a:lnRef idx="2">
+              <a:schemeClr val="accent1">
+                <a:shade val="50000"/>
+              </a:schemeClr>
+            </a:lnRef>
+            <a:fillRef idx="1">
+              <a:schemeClr val="accent1"/>
+            </a:fillRef>
+            <a:effectRef idx="0">
+              <a:schemeClr val="accent1"/>
+            </a:effectRef>
+            <a:fontRef idx="minor">
+              <a:schemeClr val="lt1"/>
+            </a:fontRef>
+          </p:style>
+          <p:txBody>
+            <a:bodyPr rtlCol="0" anchor="ctr"/>
+            <a:lstStyle/>
+            <a:p>
+              <a:pPr algn="ctr"/>
+              <a:endParaRPr lang="en-US"/>
+            </a:p>
+          </p:txBody>
+        </p:sp>
+        <p:grpSp>
+          <p:nvGrpSpPr>
+            <p:cNvPr id="6" name="Group 5">
+              <a:extLst>
+                <a:ext uri="{FF2B5EF4-FFF2-40B4-BE49-F238E27FC236}">
+                  <a16:creationId xmlns:a16="http://schemas.microsoft.com/office/drawing/2014/main" id="{C8CCF1CA-E5B5-474F-881A-230B1EE83059}"/>
+                </a:ext>
+              </a:extLst>
+            </p:cNvPr>
+            <p:cNvGrpSpPr/>
+            <p:nvPr/>
+          </p:nvGrpSpPr>
+          <p:grpSpPr>
+            <a:xfrm>
+              <a:off x="208726" y="962830"/>
+              <a:ext cx="5254483" cy="2585323"/>
+              <a:chOff x="3790429" y="711512"/>
+              <a:chExt cx="5601821" cy="2099709"/>
+            </a:xfrm>
+          </p:grpSpPr>
+          <p:sp>
+            <p:nvSpPr>
+              <p:cNvPr id="7" name="TextBox 6">
+                <a:extLst>
+                  <a:ext uri="{FF2B5EF4-FFF2-40B4-BE49-F238E27FC236}">
+                    <a16:creationId xmlns:a16="http://schemas.microsoft.com/office/drawing/2014/main" id="{235560C1-4098-4265-83FA-DF068F3A97C0}"/>
+                  </a:ext>
+                </a:extLst>
+              </p:cNvPr>
+              <p:cNvSpPr txBox="1"/>
+              <p:nvPr/>
+            </p:nvSpPr>
+            <p:spPr>
+              <a:xfrm>
+                <a:off x="3790429" y="711512"/>
+                <a:ext cx="5601821" cy="2099709"/>
+              </a:xfrm>
+              <a:prstGeom prst="rect">
+                <a:avLst/>
+              </a:prstGeom>
+              <a:noFill/>
+            </p:spPr>
+            <p:txBody>
+              <a:bodyPr wrap="square" rtlCol="0">
+                <a:spAutoFit/>
+              </a:bodyPr>
+              <a:lstStyle/>
+              <a:p>
+                <a:r>
+                  <a:rPr lang="en-US" dirty="0"/>
+                  <a:t>                                  For each time step:</a:t>
+                </a:r>
+              </a:p>
+              <a:p>
+                <a:r>
+                  <a:rPr lang="en-US" dirty="0"/>
+                  <a:t>“Pull” electron with the time step         in the magnetic field;</a:t>
+                </a:r>
+              </a:p>
+              <a:p>
+                <a:r>
+                  <a:rPr lang="en-US" dirty="0"/>
+                  <a:t>“Pull” ion with the time step         in the drift gap;</a:t>
+                </a:r>
+              </a:p>
+              <a:p>
+                <a:r>
+                  <a:rPr lang="en-US" dirty="0"/>
+                  <a:t>Calculation of distance between electron and ion;</a:t>
+                </a:r>
+              </a:p>
+              <a:p>
+                <a:r>
+                  <a:rPr lang="en-US" dirty="0"/>
+                  <a:t>Calculation of the changing of momenta for ion and electron for the time step        ;</a:t>
+                </a:r>
+              </a:p>
+              <a:p>
+                <a:r>
+                  <a:rPr lang="en-US" dirty="0"/>
+                  <a:t>Change in the ion and electron momenta  for this time step.</a:t>
+                </a:r>
+              </a:p>
+            </p:txBody>
+          </p:sp>
+          <p:grpSp>
+            <p:nvGrpSpPr>
+              <p:cNvPr id="8" name="Group 7">
+                <a:extLst>
+                  <a:ext uri="{FF2B5EF4-FFF2-40B4-BE49-F238E27FC236}">
+                    <a16:creationId xmlns:a16="http://schemas.microsoft.com/office/drawing/2014/main" id="{70EC1A6E-7F2E-4E2C-BB07-EFF49BA97098}"/>
+                  </a:ext>
+                </a:extLst>
+              </p:cNvPr>
+              <p:cNvGrpSpPr/>
+              <p:nvPr/>
+            </p:nvGrpSpPr>
+            <p:grpSpPr>
+              <a:xfrm>
+                <a:off x="6454246" y="925056"/>
+                <a:ext cx="1200612" cy="1375668"/>
+                <a:chOff x="6454246" y="925056"/>
+                <a:chExt cx="1200612" cy="1375668"/>
+              </a:xfrm>
+            </p:grpSpPr>
+            <p:graphicFrame>
+              <p:nvGraphicFramePr>
+                <p:cNvPr id="9" name="Object 8">
+                  <a:extLst>
+                    <a:ext uri="{FF2B5EF4-FFF2-40B4-BE49-F238E27FC236}">
+                      <a16:creationId xmlns:a16="http://schemas.microsoft.com/office/drawing/2014/main" id="{512CDA0E-6C4C-4CF3-847B-EED676320993}"/>
+                    </a:ext>
+                  </a:extLst>
+                </p:cNvPr>
+                <p:cNvGraphicFramePr>
+                  <a:graphicFrameLocks noChangeAspect="1"/>
+                </p:cNvGraphicFramePr>
+                <p:nvPr>
+                  <p:extLst>
+                    <p:ext uri="{D42A27DB-BD31-4B8C-83A1-F6EECF244321}">
+                      <p14:modId xmlns:p14="http://schemas.microsoft.com/office/powerpoint/2010/main" val="1534142624"/>
+                    </p:ext>
+                  </p:extLst>
+                </p:nvPr>
+              </p:nvGraphicFramePr>
+              <p:xfrm>
+                <a:off x="6732340" y="1399689"/>
+                <a:ext cx="416340" cy="248090"/>
+              </p:xfrm>
+              <a:graphic>
+                <a:graphicData uri="http://schemas.openxmlformats.org/presentationml/2006/ole">
+                  <mc:AlternateContent xmlns:mc="http://schemas.openxmlformats.org/markup-compatibility/2006">
+                    <mc:Choice xmlns:v="urn:schemas-microsoft-com:vml" Requires="v">
+                      <p:oleObj spid="_x0000_s4189" name="Equation" r:id="rId3" imgW="241200" imgH="164880" progId="Equation.DSMT4">
+                        <p:embed/>
+                      </p:oleObj>
+                    </mc:Choice>
+                    <mc:Fallback>
+                      <p:oleObj name="Equation" r:id="rId3" imgW="241200" imgH="164880" progId="Equation.DSMT4">
+                        <p:embed/>
+                        <p:pic>
+                          <p:nvPicPr>
+                            <p:cNvPr id="27" name="Object 26"/>
+                            <p:cNvPicPr/>
+                            <p:nvPr/>
+                          </p:nvPicPr>
+                          <p:blipFill>
+                            <a:blip r:embed="rId4"/>
+                            <a:stretch>
+                              <a:fillRect/>
+                            </a:stretch>
+                          </p:blipFill>
+                          <p:spPr>
+                            <a:xfrm>
+                              <a:off x="6732340" y="1399689"/>
+                              <a:ext cx="416340" cy="248090"/>
+                            </a:xfrm>
+                            <a:prstGeom prst="rect">
+                              <a:avLst/>
+                            </a:prstGeom>
+                          </p:spPr>
+                        </p:pic>
+                      </p:oleObj>
+                    </mc:Fallback>
+                  </mc:AlternateContent>
+                </a:graphicData>
+              </a:graphic>
+            </p:graphicFrame>
+            <p:graphicFrame>
+              <p:nvGraphicFramePr>
+                <p:cNvPr id="10" name="Object 9">
+                  <a:extLst>
+                    <a:ext uri="{FF2B5EF4-FFF2-40B4-BE49-F238E27FC236}">
+                      <a16:creationId xmlns:a16="http://schemas.microsoft.com/office/drawing/2014/main" id="{4242D80A-E46A-4E6B-BCA2-20D3F9A37E06}"/>
+                    </a:ext>
+                  </a:extLst>
+                </p:cNvPr>
+                <p:cNvGraphicFramePr>
+                  <a:graphicFrameLocks noChangeAspect="1"/>
+                </p:cNvGraphicFramePr>
+                <p:nvPr>
+                  <p:extLst>
+                    <p:ext uri="{D42A27DB-BD31-4B8C-83A1-F6EECF244321}">
+                      <p14:modId xmlns:p14="http://schemas.microsoft.com/office/powerpoint/2010/main" val="441752758"/>
+                    </p:ext>
+                  </p:extLst>
+                </p:nvPr>
+              </p:nvGraphicFramePr>
+              <p:xfrm>
+                <a:off x="7240210" y="925056"/>
+                <a:ext cx="414648" cy="284162"/>
+              </p:xfrm>
+              <a:graphic>
+                <a:graphicData uri="http://schemas.openxmlformats.org/presentationml/2006/ole">
+                  <mc:AlternateContent xmlns:mc="http://schemas.openxmlformats.org/markup-compatibility/2006">
+                    <mc:Choice xmlns:v="urn:schemas-microsoft-com:vml" Requires="v">
+                      <p:oleObj spid="_x0000_s4190" name="Equation" r:id="rId5" imgW="241200" imgH="164880" progId="Equation.DSMT4">
+                        <p:embed/>
+                      </p:oleObj>
+                    </mc:Choice>
+                    <mc:Fallback>
+                      <p:oleObj name="Equation" r:id="rId5" imgW="241200" imgH="164880" progId="Equation.DSMT4">
+                        <p:embed/>
+                        <p:pic>
+                          <p:nvPicPr>
+                            <p:cNvPr id="28" name="Object 27"/>
+                            <p:cNvPicPr/>
+                            <p:nvPr/>
+                          </p:nvPicPr>
+                          <p:blipFill>
+                            <a:blip r:embed="rId6"/>
+                            <a:stretch>
+                              <a:fillRect/>
+                            </a:stretch>
+                          </p:blipFill>
+                          <p:spPr>
+                            <a:xfrm>
+                              <a:off x="7240210" y="925056"/>
+                              <a:ext cx="414648" cy="284162"/>
+                            </a:xfrm>
+                            <a:prstGeom prst="rect">
+                              <a:avLst/>
+                            </a:prstGeom>
+                          </p:spPr>
+                        </p:pic>
+                      </p:oleObj>
+                    </mc:Fallback>
+                  </mc:AlternateContent>
+                </a:graphicData>
+              </a:graphic>
+            </p:graphicFrame>
+            <p:graphicFrame>
+              <p:nvGraphicFramePr>
+                <p:cNvPr id="13" name="Object 12">
+                  <a:extLst>
+                    <a:ext uri="{FF2B5EF4-FFF2-40B4-BE49-F238E27FC236}">
+                      <a16:creationId xmlns:a16="http://schemas.microsoft.com/office/drawing/2014/main" id="{4C969482-EF8C-41AD-B4FD-7571907FAA99}"/>
+                    </a:ext>
+                  </a:extLst>
+                </p:cNvPr>
+                <p:cNvGraphicFramePr>
+                  <a:graphicFrameLocks noChangeAspect="1"/>
+                </p:cNvGraphicFramePr>
+                <p:nvPr>
+                  <p:extLst>
+                    <p:ext uri="{D42A27DB-BD31-4B8C-83A1-F6EECF244321}">
+                      <p14:modId xmlns:p14="http://schemas.microsoft.com/office/powerpoint/2010/main" val="3726712269"/>
+                    </p:ext>
+                  </p:extLst>
+                </p:nvPr>
+              </p:nvGraphicFramePr>
+              <p:xfrm>
+                <a:off x="6454246" y="2016561"/>
+                <a:ext cx="414647" cy="284163"/>
+              </p:xfrm>
+              <a:graphic>
+                <a:graphicData uri="http://schemas.openxmlformats.org/presentationml/2006/ole">
+                  <mc:AlternateContent xmlns:mc="http://schemas.openxmlformats.org/markup-compatibility/2006">
+                    <mc:Choice xmlns:v="urn:schemas-microsoft-com:vml" Requires="v">
+                      <p:oleObj spid="_x0000_s4191" name="Equation" r:id="rId7" imgW="241200" imgH="164880" progId="Equation.DSMT4">
+                        <p:embed/>
+                      </p:oleObj>
+                    </mc:Choice>
+                    <mc:Fallback>
+                      <p:oleObj name="Equation" r:id="rId7" imgW="241200" imgH="164880" progId="Equation.DSMT4">
+                        <p:embed/>
+                        <p:pic>
+                          <p:nvPicPr>
+                            <p:cNvPr id="32" name="Object 31"/>
+                            <p:cNvPicPr/>
+                            <p:nvPr/>
+                          </p:nvPicPr>
+                          <p:blipFill>
+                            <a:blip r:embed="rId8"/>
+                            <a:stretch>
+                              <a:fillRect/>
+                            </a:stretch>
+                          </p:blipFill>
+                          <p:spPr>
+                            <a:xfrm>
+                              <a:off x="6454246" y="2016561"/>
+                              <a:ext cx="414647" cy="284163"/>
+                            </a:xfrm>
+                            <a:prstGeom prst="rect">
+                              <a:avLst/>
+                            </a:prstGeom>
+                          </p:spPr>
+                        </p:pic>
+                      </p:oleObj>
+                    </mc:Fallback>
+                  </mc:AlternateContent>
+                </a:graphicData>
+              </a:graphic>
+            </p:graphicFrame>
+          </p:grpSp>
+        </p:grpSp>
+      </p:grpSp>
+      <p:grpSp>
+        <p:nvGrpSpPr>
+          <p:cNvPr id="31" name="Group 30">
+            <a:extLst>
+              <a:ext uri="{FF2B5EF4-FFF2-40B4-BE49-F238E27FC236}">
+                <a16:creationId xmlns:a16="http://schemas.microsoft.com/office/drawing/2014/main" id="{CA6E6B28-D9DB-4FBA-966B-17A31880526E}"/>
+              </a:ext>
+            </a:extLst>
+          </p:cNvPr>
+          <p:cNvGrpSpPr/>
+          <p:nvPr/>
+        </p:nvGrpSpPr>
+        <p:grpSpPr>
+          <a:xfrm>
+            <a:off x="5946708" y="512634"/>
+            <a:ext cx="5376541" cy="2862322"/>
+            <a:chOff x="126333" y="953636"/>
+            <a:chExt cx="5376541" cy="2862322"/>
+          </a:xfrm>
+        </p:grpSpPr>
+        <p:sp>
+          <p:nvSpPr>
+            <p:cNvPr id="32" name="Flowchart: Process 31">
+              <a:extLst>
+                <a:ext uri="{FF2B5EF4-FFF2-40B4-BE49-F238E27FC236}">
+                  <a16:creationId xmlns:a16="http://schemas.microsoft.com/office/drawing/2014/main" id="{B6B4C185-D9B4-4C62-ABF3-C1FBEB9E7463}"/>
+                </a:ext>
+              </a:extLst>
+            </p:cNvPr>
+            <p:cNvSpPr/>
+            <p:nvPr/>
+          </p:nvSpPr>
+          <p:spPr>
+            <a:xfrm>
+              <a:off x="126333" y="953636"/>
+              <a:ext cx="5376541" cy="2655673"/>
+            </a:xfrm>
+            <a:prstGeom prst="flowChartProcess">
+              <a:avLst/>
+            </a:prstGeom>
+            <a:noFill/>
+          </p:spPr>
+          <p:style>
+            <a:lnRef idx="2">
+              <a:schemeClr val="accent1">
+                <a:shade val="50000"/>
+              </a:schemeClr>
+            </a:lnRef>
+            <a:fillRef idx="1">
+              <a:schemeClr val="accent1"/>
+            </a:fillRef>
+            <a:effectRef idx="0">
+              <a:schemeClr val="accent1"/>
+            </a:effectRef>
+            <a:fontRef idx="minor">
+              <a:schemeClr val="lt1"/>
+            </a:fontRef>
+          </p:style>
+          <p:txBody>
+            <a:bodyPr rtlCol="0" anchor="ctr"/>
+            <a:lstStyle/>
+            <a:p>
+              <a:pPr algn="ctr"/>
+              <a:endParaRPr lang="en-US"/>
+            </a:p>
+          </p:txBody>
+        </p:sp>
+        <p:grpSp>
+          <p:nvGrpSpPr>
+            <p:cNvPr id="33" name="Group 32">
+              <a:extLst>
+                <a:ext uri="{FF2B5EF4-FFF2-40B4-BE49-F238E27FC236}">
+                  <a16:creationId xmlns:a16="http://schemas.microsoft.com/office/drawing/2014/main" id="{C4887D5F-F355-4AD8-ABD7-1E6BA455D787}"/>
+                </a:ext>
+              </a:extLst>
+            </p:cNvPr>
+            <p:cNvGrpSpPr/>
+            <p:nvPr/>
+          </p:nvGrpSpPr>
+          <p:grpSpPr>
+            <a:xfrm>
+              <a:off x="187361" y="953636"/>
+              <a:ext cx="5254483" cy="2862322"/>
+              <a:chOff x="3767652" y="704045"/>
+              <a:chExt cx="5601821" cy="2324678"/>
+            </a:xfrm>
+          </p:grpSpPr>
+          <p:sp>
+            <p:nvSpPr>
+              <p:cNvPr id="34" name="TextBox 33">
+                <a:extLst>
+                  <a:ext uri="{FF2B5EF4-FFF2-40B4-BE49-F238E27FC236}">
+                    <a16:creationId xmlns:a16="http://schemas.microsoft.com/office/drawing/2014/main" id="{09DE73E1-2FC5-4694-83EA-935D377FEE77}"/>
+                  </a:ext>
+                </a:extLst>
+              </p:cNvPr>
+              <p:cNvSpPr txBox="1"/>
+              <p:nvPr/>
+            </p:nvSpPr>
+            <p:spPr>
+              <a:xfrm>
+                <a:off x="3767652" y="704045"/>
+                <a:ext cx="5601821" cy="2324678"/>
+              </a:xfrm>
+              <a:prstGeom prst="rect">
+                <a:avLst/>
+              </a:prstGeom>
+              <a:noFill/>
+            </p:spPr>
+            <p:txBody>
+              <a:bodyPr wrap="square" rtlCol="0">
+                <a:spAutoFit/>
+              </a:bodyPr>
+              <a:lstStyle/>
+              <a:p>
+                <a:r>
+                  <a:rPr lang="en-US" dirty="0"/>
+                  <a:t>                                  For each time step:</a:t>
+                </a:r>
+              </a:p>
+              <a:p>
+                <a:r>
+                  <a:rPr lang="en-US" dirty="0"/>
+                  <a:t>“Pull” electron with the time step                 in the gcs;</a:t>
+                </a:r>
+              </a:p>
+              <a:p>
+                <a:r>
+                  <a:rPr lang="en-US" dirty="0"/>
+                  <a:t>“Pull” ion with the time step                in the drift gap;</a:t>
+                </a:r>
+              </a:p>
+              <a:p>
+                <a:r>
+                  <a:rPr lang="en-US" dirty="0"/>
+                  <a:t>Calculation of the changing of momenta for ion and electron for the time step            in the gcs;</a:t>
+                </a:r>
+              </a:p>
+              <a:p>
+                <a:r>
+                  <a:rPr lang="en-US" dirty="0"/>
+                  <a:t>Change in the ion and electron momenta for this time step;</a:t>
+                </a:r>
+              </a:p>
+              <a:p>
+                <a:r>
+                  <a:rPr lang="en-US" dirty="0"/>
+                  <a:t>“Pull” electron with the time step                 in the gcs;</a:t>
+                </a:r>
+              </a:p>
+              <a:p>
+                <a:r>
+                  <a:rPr lang="en-US" dirty="0"/>
+                  <a:t>“Pull” ion with the time step                 in the drift gap.</a:t>
+                </a:r>
+              </a:p>
+              <a:p>
+                <a:endParaRPr lang="en-US" dirty="0"/>
+              </a:p>
+            </p:txBody>
+          </p:sp>
+          <p:grpSp>
+            <p:nvGrpSpPr>
+              <p:cNvPr id="35" name="Group 34">
+                <a:extLst>
+                  <a:ext uri="{FF2B5EF4-FFF2-40B4-BE49-F238E27FC236}">
+                    <a16:creationId xmlns:a16="http://schemas.microsoft.com/office/drawing/2014/main" id="{9635FD26-44AF-483D-BB61-B463E6CFE4E4}"/>
+                  </a:ext>
+                </a:extLst>
+              </p:cNvPr>
+              <p:cNvGrpSpPr/>
+              <p:nvPr/>
+            </p:nvGrpSpPr>
+            <p:grpSpPr>
+              <a:xfrm>
+                <a:off x="6467179" y="917589"/>
+                <a:ext cx="1524827" cy="929730"/>
+                <a:chOff x="6467179" y="917589"/>
+                <a:chExt cx="1524827" cy="929730"/>
+              </a:xfrm>
+            </p:grpSpPr>
+            <p:graphicFrame>
+              <p:nvGraphicFramePr>
+                <p:cNvPr id="36" name="Object 35">
+                  <a:extLst>
+                    <a:ext uri="{FF2B5EF4-FFF2-40B4-BE49-F238E27FC236}">
+                      <a16:creationId xmlns:a16="http://schemas.microsoft.com/office/drawing/2014/main" id="{D3843BB1-4C84-4A4C-82CA-34C908E82943}"/>
+                    </a:ext>
+                  </a:extLst>
+                </p:cNvPr>
+                <p:cNvGraphicFramePr>
+                  <a:graphicFrameLocks noChangeAspect="1"/>
+                </p:cNvGraphicFramePr>
+                <p:nvPr>
+                  <p:extLst>
+                    <p:ext uri="{D42A27DB-BD31-4B8C-83A1-F6EECF244321}">
+                      <p14:modId xmlns:p14="http://schemas.microsoft.com/office/powerpoint/2010/main" val="608722221"/>
+                    </p:ext>
+                  </p:extLst>
+                </p:nvPr>
+              </p:nvGraphicFramePr>
+              <p:xfrm>
+                <a:off x="6759659" y="1183524"/>
+                <a:ext cx="722672" cy="268177"/>
+              </p:xfrm>
+              <a:graphic>
+                <a:graphicData uri="http://schemas.openxmlformats.org/presentationml/2006/ole">
+                  <mc:AlternateContent xmlns:mc="http://schemas.openxmlformats.org/markup-compatibility/2006">
+                    <mc:Choice xmlns:v="urn:schemas-microsoft-com:vml" Requires="v">
+                      <p:oleObj spid="_x0000_s4192" name="Equation" r:id="rId9" imgW="419040" imgH="177480" progId="Equation.DSMT4">
+                        <p:embed/>
+                      </p:oleObj>
+                    </mc:Choice>
+                    <mc:Fallback>
+                      <p:oleObj name="Equation" r:id="rId9" imgW="419040" imgH="177480" progId="Equation.DSMT4">
+                        <p:embed/>
+                        <p:pic>
+                          <p:nvPicPr>
+                            <p:cNvPr id="9" name="Object 8">
+                              <a:extLst>
+                                <a:ext uri="{FF2B5EF4-FFF2-40B4-BE49-F238E27FC236}">
+                                  <a16:creationId xmlns:a16="http://schemas.microsoft.com/office/drawing/2014/main" id="{512CDA0E-6C4C-4CF3-847B-EED676320993}"/>
+                                </a:ext>
+                              </a:extLst>
+                            </p:cNvPr>
+                            <p:cNvPicPr/>
+                            <p:nvPr/>
+                          </p:nvPicPr>
+                          <p:blipFill>
+                            <a:blip r:embed="rId10"/>
+                            <a:stretch>
+                              <a:fillRect/>
+                            </a:stretch>
+                          </p:blipFill>
+                          <p:spPr>
+                            <a:xfrm>
+                              <a:off x="6759659" y="1183524"/>
+                              <a:ext cx="722672" cy="268177"/>
+                            </a:xfrm>
+                            <a:prstGeom prst="rect">
+                              <a:avLst/>
+                            </a:prstGeom>
+                          </p:spPr>
+                        </p:pic>
+                      </p:oleObj>
+                    </mc:Fallback>
+                  </mc:AlternateContent>
+                </a:graphicData>
+              </a:graphic>
+            </p:graphicFrame>
+            <p:graphicFrame>
+              <p:nvGraphicFramePr>
+                <p:cNvPr id="37" name="Object 36">
+                  <a:extLst>
+                    <a:ext uri="{FF2B5EF4-FFF2-40B4-BE49-F238E27FC236}">
+                      <a16:creationId xmlns:a16="http://schemas.microsoft.com/office/drawing/2014/main" id="{CDBABE97-50BD-420C-A3E0-D82A99296831}"/>
+                    </a:ext>
+                  </a:extLst>
+                </p:cNvPr>
+                <p:cNvGraphicFramePr>
+                  <a:graphicFrameLocks noChangeAspect="1"/>
+                </p:cNvGraphicFramePr>
+                <p:nvPr>
+                  <p:extLst>
+                    <p:ext uri="{D42A27DB-BD31-4B8C-83A1-F6EECF244321}">
+                      <p14:modId xmlns:p14="http://schemas.microsoft.com/office/powerpoint/2010/main" val="3082187056"/>
+                    </p:ext>
+                  </p:extLst>
+                </p:nvPr>
+              </p:nvGraphicFramePr>
+              <p:xfrm>
+                <a:off x="7272719" y="917589"/>
+                <a:ext cx="719287" cy="305567"/>
+              </p:xfrm>
+              <a:graphic>
+                <a:graphicData uri="http://schemas.openxmlformats.org/presentationml/2006/ole">
+                  <mc:AlternateContent xmlns:mc="http://schemas.openxmlformats.org/markup-compatibility/2006">
+                    <mc:Choice xmlns:v="urn:schemas-microsoft-com:vml" Requires="v">
+                      <p:oleObj spid="_x0000_s4193" name="Equation" r:id="rId11" imgW="419040" imgH="177480" progId="Equation.DSMT4">
+                        <p:embed/>
+                      </p:oleObj>
+                    </mc:Choice>
+                    <mc:Fallback>
+                      <p:oleObj name="Equation" r:id="rId11" imgW="419040" imgH="177480" progId="Equation.DSMT4">
+                        <p:embed/>
+                        <p:pic>
+                          <p:nvPicPr>
+                            <p:cNvPr id="10" name="Object 9">
+                              <a:extLst>
+                                <a:ext uri="{FF2B5EF4-FFF2-40B4-BE49-F238E27FC236}">
+                                  <a16:creationId xmlns:a16="http://schemas.microsoft.com/office/drawing/2014/main" id="{4242D80A-E46A-4E6B-BCA2-20D3F9A37E06}"/>
+                                </a:ext>
+                              </a:extLst>
+                            </p:cNvPr>
+                            <p:cNvPicPr/>
+                            <p:nvPr/>
+                          </p:nvPicPr>
+                          <p:blipFill>
+                            <a:blip r:embed="rId12"/>
+                            <a:stretch>
+                              <a:fillRect/>
+                            </a:stretch>
+                          </p:blipFill>
+                          <p:spPr>
+                            <a:xfrm>
+                              <a:off x="7272719" y="917589"/>
+                              <a:ext cx="719287" cy="305567"/>
+                            </a:xfrm>
+                            <a:prstGeom prst="rect">
+                              <a:avLst/>
+                            </a:prstGeom>
+                          </p:spPr>
+                        </p:pic>
+                      </p:oleObj>
+                    </mc:Fallback>
+                  </mc:AlternateContent>
+                </a:graphicData>
+              </a:graphic>
+            </p:graphicFrame>
+            <p:graphicFrame>
+              <p:nvGraphicFramePr>
+                <p:cNvPr id="38" name="Object 37">
+                  <a:extLst>
+                    <a:ext uri="{FF2B5EF4-FFF2-40B4-BE49-F238E27FC236}">
+                      <a16:creationId xmlns:a16="http://schemas.microsoft.com/office/drawing/2014/main" id="{98BC38E8-0BAA-4211-A772-56C6BD08EB04}"/>
+                    </a:ext>
+                  </a:extLst>
+                </p:cNvPr>
+                <p:cNvGraphicFramePr>
+                  <a:graphicFrameLocks noChangeAspect="1"/>
+                </p:cNvGraphicFramePr>
+                <p:nvPr>
+                  <p:extLst>
+                    <p:ext uri="{D42A27DB-BD31-4B8C-83A1-F6EECF244321}">
+                      <p14:modId xmlns:p14="http://schemas.microsoft.com/office/powerpoint/2010/main" val="1963028012"/>
+                    </p:ext>
+                  </p:extLst>
+                </p:nvPr>
+              </p:nvGraphicFramePr>
+              <p:xfrm>
+                <a:off x="6467179" y="1563156"/>
+                <a:ext cx="414647" cy="284163"/>
+              </p:xfrm>
+              <a:graphic>
+                <a:graphicData uri="http://schemas.openxmlformats.org/presentationml/2006/ole">
+                  <mc:AlternateContent xmlns:mc="http://schemas.openxmlformats.org/markup-compatibility/2006">
+                    <mc:Choice xmlns:v="urn:schemas-microsoft-com:vml" Requires="v">
+                      <p:oleObj spid="_x0000_s4194" name="Equation" r:id="rId13" imgW="241200" imgH="164880" progId="Equation.DSMT4">
+                        <p:embed/>
+                      </p:oleObj>
+                    </mc:Choice>
+                    <mc:Fallback>
+                      <p:oleObj name="Equation" r:id="rId13" imgW="241200" imgH="164880" progId="Equation.DSMT4">
+                        <p:embed/>
+                        <p:pic>
+                          <p:nvPicPr>
+                            <p:cNvPr id="13" name="Object 12">
+                              <a:extLst>
+                                <a:ext uri="{FF2B5EF4-FFF2-40B4-BE49-F238E27FC236}">
+                                  <a16:creationId xmlns:a16="http://schemas.microsoft.com/office/drawing/2014/main" id="{4C969482-EF8C-41AD-B4FD-7571907FAA99}"/>
+                                </a:ext>
+                              </a:extLst>
+                            </p:cNvPr>
+                            <p:cNvPicPr/>
+                            <p:nvPr/>
+                          </p:nvPicPr>
+                          <p:blipFill>
+                            <a:blip r:embed="rId14"/>
+                            <a:stretch>
+                              <a:fillRect/>
+                            </a:stretch>
+                          </p:blipFill>
+                          <p:spPr>
+                            <a:xfrm>
+                              <a:off x="6467179" y="1563156"/>
+                              <a:ext cx="414647" cy="284163"/>
+                            </a:xfrm>
+                            <a:prstGeom prst="rect">
+                              <a:avLst/>
+                            </a:prstGeom>
+                          </p:spPr>
+                        </p:pic>
+                      </p:oleObj>
+                    </mc:Fallback>
+                  </mc:AlternateContent>
+                </a:graphicData>
+              </a:graphic>
+            </p:graphicFrame>
+          </p:grpSp>
+        </p:grpSp>
+      </p:grpSp>
+      <p:graphicFrame>
+        <p:nvGraphicFramePr>
+          <p:cNvPr id="39" name="Object 38">
+            <a:extLst>
+              <a:ext uri="{FF2B5EF4-FFF2-40B4-BE49-F238E27FC236}">
+                <a16:creationId xmlns:a16="http://schemas.microsoft.com/office/drawing/2014/main" id="{27C34878-1310-4808-A0FD-0C9F3449B87C}"/>
+              </a:ext>
+            </a:extLst>
+          </p:cNvPr>
+          <p:cNvGraphicFramePr>
+            <a:graphicFrameLocks noChangeAspect="1"/>
+          </p:cNvGraphicFramePr>
+          <p:nvPr>
+            <p:extLst>
+              <p:ext uri="{D42A27DB-BD31-4B8C-83A1-F6EECF244321}">
+                <p14:modId xmlns:p14="http://schemas.microsoft.com/office/powerpoint/2010/main" val="3961698130"/>
+              </p:ext>
+            </p:extLst>
+          </p:nvPr>
+        </p:nvGraphicFramePr>
+        <p:xfrm>
+          <a:off x="8772501" y="2690254"/>
+          <a:ext cx="674688" cy="376238"/>
+        </p:xfrm>
+        <a:graphic>
+          <a:graphicData uri="http://schemas.openxmlformats.org/presentationml/2006/ole">
+            <mc:AlternateContent xmlns:mc="http://schemas.openxmlformats.org/markup-compatibility/2006">
+              <mc:Choice xmlns:v="urn:schemas-microsoft-com:vml" Requires="v">
+                <p:oleObj spid="_x0000_s4195" name="Equation" r:id="rId15" imgW="419040" imgH="177480" progId="Equation.DSMT4">
+                  <p:embed/>
+                </p:oleObj>
+              </mc:Choice>
+              <mc:Fallback>
+                <p:oleObj name="Equation" r:id="rId15" imgW="419040" imgH="177480" progId="Equation.DSMT4">
+                  <p:embed/>
+                  <p:pic>
+                    <p:nvPicPr>
+                      <p:cNvPr id="37" name="Object 36">
+                        <a:extLst>
+                          <a:ext uri="{FF2B5EF4-FFF2-40B4-BE49-F238E27FC236}">
+                            <a16:creationId xmlns:a16="http://schemas.microsoft.com/office/drawing/2014/main" id="{CDBABE97-50BD-420C-A3E0-D82A99296831}"/>
+                          </a:ext>
+                        </a:extLst>
+                      </p:cNvPr>
+                      <p:cNvPicPr/>
+                      <p:nvPr/>
+                    </p:nvPicPr>
+                    <p:blipFill>
+                      <a:blip r:embed="rId16"/>
+                      <a:stretch>
+                        <a:fillRect/>
+                      </a:stretch>
+                    </p:blipFill>
+                    <p:spPr>
+                      <a:xfrm>
+                        <a:off x="8772501" y="2690254"/>
+                        <a:ext cx="674688" cy="376238"/>
+                      </a:xfrm>
+                      <a:prstGeom prst="rect">
+                        <a:avLst/>
+                      </a:prstGeom>
+                    </p:spPr>
+                  </p:pic>
+                </p:oleObj>
+              </mc:Fallback>
+            </mc:AlternateContent>
+          </a:graphicData>
+        </a:graphic>
+      </p:graphicFrame>
+      <p:graphicFrame>
+        <p:nvGraphicFramePr>
+          <p:cNvPr id="40" name="Object 39">
+            <a:extLst>
+              <a:ext uri="{FF2B5EF4-FFF2-40B4-BE49-F238E27FC236}">
+                <a16:creationId xmlns:a16="http://schemas.microsoft.com/office/drawing/2014/main" id="{D842BF90-105B-4233-9FBC-A5133358ED76}"/>
+              </a:ext>
+            </a:extLst>
+          </p:cNvPr>
+          <p:cNvGraphicFramePr>
+            <a:graphicFrameLocks noChangeAspect="1"/>
+          </p:cNvGraphicFramePr>
+          <p:nvPr>
+            <p:extLst>
+              <p:ext uri="{D42A27DB-BD31-4B8C-83A1-F6EECF244321}">
+                <p14:modId xmlns:p14="http://schemas.microsoft.com/office/powerpoint/2010/main" val="4080660250"/>
+              </p:ext>
+            </p:extLst>
+          </p:nvPr>
+        </p:nvGraphicFramePr>
+        <p:xfrm>
+          <a:off x="9233082" y="2399968"/>
+          <a:ext cx="674688" cy="376238"/>
+        </p:xfrm>
+        <a:graphic>
+          <a:graphicData uri="http://schemas.openxmlformats.org/presentationml/2006/ole">
+            <mc:AlternateContent xmlns:mc="http://schemas.openxmlformats.org/markup-compatibility/2006">
+              <mc:Choice xmlns:v="urn:schemas-microsoft-com:vml" Requires="v">
+                <p:oleObj spid="_x0000_s4196" name="Equation" r:id="rId17" imgW="419040" imgH="177480" progId="Equation.DSMT4">
+                  <p:embed/>
+                </p:oleObj>
+              </mc:Choice>
+              <mc:Fallback>
+                <p:oleObj name="Equation" r:id="rId17" imgW="419040" imgH="177480" progId="Equation.DSMT4">
+                  <p:embed/>
+                  <p:pic>
+                    <p:nvPicPr>
+                      <p:cNvPr id="39" name="Object 38">
+                        <a:extLst>
+                          <a:ext uri="{FF2B5EF4-FFF2-40B4-BE49-F238E27FC236}">
+                            <a16:creationId xmlns:a16="http://schemas.microsoft.com/office/drawing/2014/main" id="{27C34878-1310-4808-A0FD-0C9F3449B87C}"/>
+                          </a:ext>
+                        </a:extLst>
+                      </p:cNvPr>
+                      <p:cNvPicPr/>
+                      <p:nvPr/>
+                    </p:nvPicPr>
+                    <p:blipFill>
+                      <a:blip r:embed="rId16"/>
+                      <a:stretch>
+                        <a:fillRect/>
+                      </a:stretch>
+                    </p:blipFill>
+                    <p:spPr>
+                      <a:xfrm>
+                        <a:off x="9233082" y="2399968"/>
+                        <a:ext cx="674688" cy="376238"/>
+                      </a:xfrm>
+                      <a:prstGeom prst="rect">
+                        <a:avLst/>
+                      </a:prstGeom>
+                    </p:spPr>
+                  </p:pic>
+                </p:oleObj>
+              </mc:Fallback>
+            </mc:AlternateContent>
+          </a:graphicData>
+        </a:graphic>
+      </p:graphicFrame>
+    </p:spTree>
+    <p:extLst>
+      <p:ext uri="{BB962C8B-B14F-4D97-AF65-F5344CB8AC3E}">
+        <p14:creationId xmlns:p14="http://schemas.microsoft.com/office/powerpoint/2010/main" val="14654683"/>
       </p:ext>
     </p:extLst>
   </p:cSld>

</xml_diff>

<commit_message>
Update of the files at 10/31/2017
Renew Figures for both approaches, first finished verdipn of the
description of the script-v6
</commit_message>
<xml_diff>
--- a/docs/eidelyur/docs/magnetizedElectronFigures.pptx
+++ b/docs/eidelyur/docs/magnetizedElectronFigures.pptx
@@ -262,7 +262,7 @@
           <a:p>
             <a:fld id="{2B89F7DB-6B41-4B29-95B0-982C6A923CF9}" type="datetimeFigureOut">
               <a:rPr lang="en-US" smtClean="0"/>
-              <a:t>10/12/2017</a:t>
+              <a:t>10/30/2017</a:t>
             </a:fld>
             <a:endParaRPr lang="en-US"/>
           </a:p>
@@ -430,7 +430,7 @@
           <a:p>
             <a:fld id="{2B89F7DB-6B41-4B29-95B0-982C6A923CF9}" type="datetimeFigureOut">
               <a:rPr lang="en-US" smtClean="0"/>
-              <a:t>10/12/2017</a:t>
+              <a:t>10/30/2017</a:t>
             </a:fld>
             <a:endParaRPr lang="en-US"/>
           </a:p>
@@ -608,7 +608,7 @@
           <a:p>
             <a:fld id="{2B89F7DB-6B41-4B29-95B0-982C6A923CF9}" type="datetimeFigureOut">
               <a:rPr lang="en-US" smtClean="0"/>
-              <a:t>10/12/2017</a:t>
+              <a:t>10/30/2017</a:t>
             </a:fld>
             <a:endParaRPr lang="en-US"/>
           </a:p>
@@ -776,7 +776,7 @@
           <a:p>
             <a:fld id="{2B89F7DB-6B41-4B29-95B0-982C6A923CF9}" type="datetimeFigureOut">
               <a:rPr lang="en-US" smtClean="0"/>
-              <a:t>10/12/2017</a:t>
+              <a:t>10/30/2017</a:t>
             </a:fld>
             <a:endParaRPr lang="en-US"/>
           </a:p>
@@ -1021,7 +1021,7 @@
           <a:p>
             <a:fld id="{2B89F7DB-6B41-4B29-95B0-982C6A923CF9}" type="datetimeFigureOut">
               <a:rPr lang="en-US" smtClean="0"/>
-              <a:t>10/12/2017</a:t>
+              <a:t>10/30/2017</a:t>
             </a:fld>
             <a:endParaRPr lang="en-US"/>
           </a:p>
@@ -1250,7 +1250,7 @@
           <a:p>
             <a:fld id="{2B89F7DB-6B41-4B29-95B0-982C6A923CF9}" type="datetimeFigureOut">
               <a:rPr lang="en-US" smtClean="0"/>
-              <a:t>10/12/2017</a:t>
+              <a:t>10/30/2017</a:t>
             </a:fld>
             <a:endParaRPr lang="en-US"/>
           </a:p>
@@ -1614,7 +1614,7 @@
           <a:p>
             <a:fld id="{2B89F7DB-6B41-4B29-95B0-982C6A923CF9}" type="datetimeFigureOut">
               <a:rPr lang="en-US" smtClean="0"/>
-              <a:t>10/12/2017</a:t>
+              <a:t>10/30/2017</a:t>
             </a:fld>
             <a:endParaRPr lang="en-US"/>
           </a:p>
@@ -1731,7 +1731,7 @@
           <a:p>
             <a:fld id="{2B89F7DB-6B41-4B29-95B0-982C6A923CF9}" type="datetimeFigureOut">
               <a:rPr lang="en-US" smtClean="0"/>
-              <a:t>10/12/2017</a:t>
+              <a:t>10/30/2017</a:t>
             </a:fld>
             <a:endParaRPr lang="en-US"/>
           </a:p>
@@ -1826,7 +1826,7 @@
           <a:p>
             <a:fld id="{2B89F7DB-6B41-4B29-95B0-982C6A923CF9}" type="datetimeFigureOut">
               <a:rPr lang="en-US" smtClean="0"/>
-              <a:t>10/12/2017</a:t>
+              <a:t>10/30/2017</a:t>
             </a:fld>
             <a:endParaRPr lang="en-US"/>
           </a:p>
@@ -2101,7 +2101,7 @@
           <a:p>
             <a:fld id="{2B89F7DB-6B41-4B29-95B0-982C6A923CF9}" type="datetimeFigureOut">
               <a:rPr lang="en-US" smtClean="0"/>
-              <a:t>10/12/2017</a:t>
+              <a:t>10/30/2017</a:t>
             </a:fld>
             <a:endParaRPr lang="en-US"/>
           </a:p>
@@ -2353,7 +2353,7 @@
           <a:p>
             <a:fld id="{2B89F7DB-6B41-4B29-95B0-982C6A923CF9}" type="datetimeFigureOut">
               <a:rPr lang="en-US" smtClean="0"/>
-              <a:t>10/12/2017</a:t>
+              <a:t>10/30/2017</a:t>
             </a:fld>
             <a:endParaRPr lang="en-US"/>
           </a:p>
@@ -2564,7 +2564,7 @@
           <a:p>
             <a:fld id="{2B89F7DB-6B41-4B29-95B0-982C6A923CF9}" type="datetimeFigureOut">
               <a:rPr lang="en-US" smtClean="0"/>
-              <a:t>10/12/2017</a:t>
+              <a:t>10/30/2017</a:t>
             </a:fld>
             <a:endParaRPr lang="en-US"/>
           </a:p>
@@ -3471,7 +3471,7 @@
           <a:graphicData uri="http://schemas.openxmlformats.org/presentationml/2006/ole">
             <mc:AlternateContent xmlns:mc="http://schemas.openxmlformats.org/markup-compatibility/2006">
               <mc:Choice xmlns:v="urn:schemas-microsoft-com:vml" Requires="v">
-                <p:oleObj spid="_x0000_s1373" name="Equation" r:id="rId3" imgW="139680" imgH="228600" progId="Equation.DSMT4">
+                <p:oleObj spid="_x0000_s1433" name="Equation" r:id="rId3" imgW="139680" imgH="228600" progId="Equation.DSMT4">
                   <p:embed/>
                 </p:oleObj>
               </mc:Choice>
@@ -3528,7 +3528,7 @@
           <a:graphicData uri="http://schemas.openxmlformats.org/presentationml/2006/ole">
             <mc:AlternateContent xmlns:mc="http://schemas.openxmlformats.org/markup-compatibility/2006">
               <mc:Choice xmlns:v="urn:schemas-microsoft-com:vml" Requires="v">
-                <p:oleObj spid="_x0000_s1374" name="Equation" r:id="rId5" imgW="126720" imgH="228600" progId="Equation.DSMT4">
+                <p:oleObj spid="_x0000_s1434" name="Equation" r:id="rId5" imgW="126720" imgH="228600" progId="Equation.DSMT4">
                   <p:embed/>
                 </p:oleObj>
               </mc:Choice>
@@ -3585,7 +3585,7 @@
           <a:graphicData uri="http://schemas.openxmlformats.org/presentationml/2006/ole">
             <mc:AlternateContent xmlns:mc="http://schemas.openxmlformats.org/markup-compatibility/2006">
               <mc:Choice xmlns:v="urn:schemas-microsoft-com:vml" Requires="v">
-                <p:oleObj spid="_x0000_s1375" name="Equation" r:id="rId7" imgW="152280" imgH="228600" progId="Equation.DSMT4">
+                <p:oleObj spid="_x0000_s1435" name="Equation" r:id="rId7" imgW="152280" imgH="228600" progId="Equation.DSMT4">
                   <p:embed/>
                 </p:oleObj>
               </mc:Choice>
@@ -3642,7 +3642,7 @@
           <a:graphicData uri="http://schemas.openxmlformats.org/presentationml/2006/ole">
             <mc:AlternateContent xmlns:mc="http://schemas.openxmlformats.org/markup-compatibility/2006">
               <mc:Choice xmlns:v="urn:schemas-microsoft-com:vml" Requires="v">
-                <p:oleObj spid="_x0000_s1376" name="Equation" r:id="rId9" imgW="139680" imgH="228600" progId="Equation.DSMT4">
+                <p:oleObj spid="_x0000_s1436" name="Equation" r:id="rId9" imgW="139680" imgH="228600" progId="Equation.DSMT4">
                   <p:embed/>
                 </p:oleObj>
               </mc:Choice>
@@ -3699,7 +3699,7 @@
           <a:graphicData uri="http://schemas.openxmlformats.org/presentationml/2006/ole">
             <mc:AlternateContent xmlns:mc="http://schemas.openxmlformats.org/markup-compatibility/2006">
               <mc:Choice xmlns:v="urn:schemas-microsoft-com:vml" Requires="v">
-                <p:oleObj spid="_x0000_s1377" name="Equation" r:id="rId11" imgW="126720" imgH="164880" progId="Equation.DSMT4">
+                <p:oleObj spid="_x0000_s1437" name="Equation" r:id="rId11" imgW="126720" imgH="164880" progId="Equation.DSMT4">
                   <p:embed/>
                 </p:oleObj>
               </mc:Choice>
@@ -3756,7 +3756,7 @@
           <a:graphicData uri="http://schemas.openxmlformats.org/presentationml/2006/ole">
             <mc:AlternateContent xmlns:mc="http://schemas.openxmlformats.org/markup-compatibility/2006">
               <mc:Choice xmlns:v="urn:schemas-microsoft-com:vml" Requires="v">
-                <p:oleObj spid="_x0000_s1378" name="Equation" r:id="rId13" imgW="152280" imgH="228600" progId="Equation.DSMT4">
+                <p:oleObj spid="_x0000_s1438" name="Equation" r:id="rId13" imgW="152280" imgH="228600" progId="Equation.DSMT4">
                   <p:embed/>
                 </p:oleObj>
               </mc:Choice>
@@ -3813,7 +3813,7 @@
           <a:graphicData uri="http://schemas.openxmlformats.org/presentationml/2006/ole">
             <mc:AlternateContent xmlns:mc="http://schemas.openxmlformats.org/markup-compatibility/2006">
               <mc:Choice xmlns:v="urn:schemas-microsoft-com:vml" Requires="v">
-                <p:oleObj spid="_x0000_s1379" name="Equation" r:id="rId15" imgW="507960" imgH="253800" progId="Equation.DSMT4">
+                <p:oleObj spid="_x0000_s1439" name="Equation" r:id="rId15" imgW="507960" imgH="253800" progId="Equation.DSMT4">
                   <p:embed/>
                 </p:oleObj>
               </mc:Choice>
@@ -3870,7 +3870,7 @@
           <a:graphicData uri="http://schemas.openxmlformats.org/presentationml/2006/ole">
             <mc:AlternateContent xmlns:mc="http://schemas.openxmlformats.org/markup-compatibility/2006">
               <mc:Choice xmlns:v="urn:schemas-microsoft-com:vml" Requires="v">
-                <p:oleObj spid="_x0000_s1380" name="Equation" r:id="rId17" imgW="152280" imgH="253800" progId="Equation.DSMT4">
+                <p:oleObj spid="_x0000_s1440" name="Equation" r:id="rId17" imgW="152280" imgH="253800" progId="Equation.DSMT4">
                   <p:embed/>
                 </p:oleObj>
               </mc:Choice>
@@ -3927,7 +3927,7 @@
           <a:graphicData uri="http://schemas.openxmlformats.org/presentationml/2006/ole">
             <mc:AlternateContent xmlns:mc="http://schemas.openxmlformats.org/markup-compatibility/2006">
               <mc:Choice xmlns:v="urn:schemas-microsoft-com:vml" Requires="v">
-                <p:oleObj spid="_x0000_s1381" name="Equation" r:id="rId19" imgW="139680" imgH="164880" progId="Equation.DSMT4">
+                <p:oleObj spid="_x0000_s1441" name="Equation" r:id="rId19" imgW="139680" imgH="164880" progId="Equation.DSMT4">
                   <p:embed/>
                 </p:oleObj>
               </mc:Choice>
@@ -3984,7 +3984,7 @@
           <a:graphicData uri="http://schemas.openxmlformats.org/presentationml/2006/ole">
             <mc:AlternateContent xmlns:mc="http://schemas.openxmlformats.org/markup-compatibility/2006">
               <mc:Choice xmlns:v="urn:schemas-microsoft-com:vml" Requires="v">
-                <p:oleObj spid="_x0000_s1382" name="Equation" r:id="rId21" imgW="126720" imgH="139680" progId="Equation.DSMT4">
+                <p:oleObj spid="_x0000_s1442" name="Equation" r:id="rId21" imgW="126720" imgH="139680" progId="Equation.DSMT4">
                   <p:embed/>
                 </p:oleObj>
               </mc:Choice>
@@ -4041,7 +4041,7 @@
           <a:graphicData uri="http://schemas.openxmlformats.org/presentationml/2006/ole">
             <mc:AlternateContent xmlns:mc="http://schemas.openxmlformats.org/markup-compatibility/2006">
               <mc:Choice xmlns:v="urn:schemas-microsoft-com:vml" Requires="v">
-                <p:oleObj spid="_x0000_s1383" name="Equation" r:id="rId23" imgW="126720" imgH="126720" progId="Equation.DSMT4">
+                <p:oleObj spid="_x0000_s1443" name="Equation" r:id="rId23" imgW="126720" imgH="126720" progId="Equation.DSMT4">
                   <p:embed/>
                 </p:oleObj>
               </mc:Choice>
@@ -4098,7 +4098,7 @@
           <a:graphicData uri="http://schemas.openxmlformats.org/presentationml/2006/ole">
             <mc:AlternateContent xmlns:mc="http://schemas.openxmlformats.org/markup-compatibility/2006">
               <mc:Choice xmlns:v="urn:schemas-microsoft-com:vml" Requires="v">
-                <p:oleObj spid="_x0000_s1384" name="Equation" r:id="rId25" imgW="152280" imgH="177480" progId="Equation.DSMT4">
+                <p:oleObj spid="_x0000_s1444" name="Equation" r:id="rId25" imgW="152280" imgH="177480" progId="Equation.DSMT4">
                   <p:embed/>
                 </p:oleObj>
               </mc:Choice>
@@ -4726,7 +4726,7 @@
             <a:graphicData uri="http://schemas.openxmlformats.org/presentationml/2006/ole">
               <mc:AlternateContent xmlns:mc="http://schemas.openxmlformats.org/markup-compatibility/2006">
                 <mc:Choice xmlns:v="urn:schemas-microsoft-com:vml" Requires="v">
-                  <p:oleObj spid="_x0000_s2595" name="Equation" r:id="rId3" imgW="152280" imgH="228600" progId="Equation.DSMT4">
+                  <p:oleObj spid="_x0000_s2715" name="Equation" r:id="rId3" imgW="152280" imgH="228600" progId="Equation.DSMT4">
                     <p:embed/>
                   </p:oleObj>
                 </mc:Choice>
@@ -4882,7 +4882,7 @@
               <a:graphicData uri="http://schemas.openxmlformats.org/presentationml/2006/ole">
                 <mc:AlternateContent xmlns:mc="http://schemas.openxmlformats.org/markup-compatibility/2006">
                   <mc:Choice xmlns:v="urn:schemas-microsoft-com:vml" Requires="v">
-                    <p:oleObj spid="_x0000_s2596" name="Equation" r:id="rId5" imgW="241200" imgH="164880" progId="Equation.DSMT4">
+                    <p:oleObj spid="_x0000_s2716" name="Equation" r:id="rId5" imgW="241200" imgH="164880" progId="Equation.DSMT4">
                       <p:embed/>
                     </p:oleObj>
                   </mc:Choice>
@@ -5089,7 +5089,7 @@
                 <a:graphicData uri="http://schemas.openxmlformats.org/presentationml/2006/ole">
                   <mc:AlternateContent xmlns:mc="http://schemas.openxmlformats.org/markup-compatibility/2006">
                     <mc:Choice xmlns:v="urn:schemas-microsoft-com:vml" Requires="v">
-                      <p:oleObj spid="_x0000_s2597" name="Equation" r:id="rId7" imgW="419040" imgH="177480" progId="Equation.DSMT4">
+                      <p:oleObj spid="_x0000_s2717" name="Equation" r:id="rId7" imgW="419040" imgH="177480" progId="Equation.DSMT4">
                         <p:embed/>
                       </p:oleObj>
                     </mc:Choice>
@@ -5146,7 +5146,7 @@
                 <a:graphicData uri="http://schemas.openxmlformats.org/presentationml/2006/ole">
                   <mc:AlternateContent xmlns:mc="http://schemas.openxmlformats.org/markup-compatibility/2006">
                     <mc:Choice xmlns:v="urn:schemas-microsoft-com:vml" Requires="v">
-                      <p:oleObj spid="_x0000_s2598" name="Equation" r:id="rId9" imgW="419040" imgH="177480" progId="Equation.DSMT4">
+                      <p:oleObj spid="_x0000_s2718" name="Equation" r:id="rId9" imgW="419040" imgH="177480" progId="Equation.DSMT4">
                         <p:embed/>
                       </p:oleObj>
                     </mc:Choice>
@@ -5203,7 +5203,7 @@
                 <a:graphicData uri="http://schemas.openxmlformats.org/presentationml/2006/ole">
                   <mc:AlternateContent xmlns:mc="http://schemas.openxmlformats.org/markup-compatibility/2006">
                     <mc:Choice xmlns:v="urn:schemas-microsoft-com:vml" Requires="v">
-                      <p:oleObj spid="_x0000_s2599" name="Equation" r:id="rId11" imgW="241200" imgH="164880" progId="Equation.DSMT4">
+                      <p:oleObj spid="_x0000_s2719" name="Equation" r:id="rId11" imgW="241200" imgH="164880" progId="Equation.DSMT4">
                         <p:embed/>
                       </p:oleObj>
                     </mc:Choice>
@@ -5260,7 +5260,7 @@
                 <a:graphicData uri="http://schemas.openxmlformats.org/presentationml/2006/ole">
                   <mc:AlternateContent xmlns:mc="http://schemas.openxmlformats.org/markup-compatibility/2006">
                     <mc:Choice xmlns:v="urn:schemas-microsoft-com:vml" Requires="v">
-                      <p:oleObj spid="_x0000_s2600" name="Equation" r:id="rId13" imgW="241200" imgH="164880" progId="Equation.DSMT4">
+                      <p:oleObj spid="_x0000_s2720" name="Equation" r:id="rId13" imgW="241200" imgH="164880" progId="Equation.DSMT4">
                         <p:embed/>
                       </p:oleObj>
                     </mc:Choice>
@@ -5317,7 +5317,7 @@
                 <a:graphicData uri="http://schemas.openxmlformats.org/presentationml/2006/ole">
                   <mc:AlternateContent xmlns:mc="http://schemas.openxmlformats.org/markup-compatibility/2006">
                     <mc:Choice xmlns:v="urn:schemas-microsoft-com:vml" Requires="v">
-                      <p:oleObj spid="_x0000_s2601" name="Equation" r:id="rId15" imgW="419040" imgH="177480" progId="Equation.DSMT4">
+                      <p:oleObj spid="_x0000_s2721" name="Equation" r:id="rId15" imgW="419040" imgH="177480" progId="Equation.DSMT4">
                         <p:embed/>
                       </p:oleObj>
                     </mc:Choice>
@@ -5374,7 +5374,7 @@
                 <a:graphicData uri="http://schemas.openxmlformats.org/presentationml/2006/ole">
                   <mc:AlternateContent xmlns:mc="http://schemas.openxmlformats.org/markup-compatibility/2006">
                     <mc:Choice xmlns:v="urn:schemas-microsoft-com:vml" Requires="v">
-                      <p:oleObj spid="_x0000_s2602" name="Equation" r:id="rId17" imgW="419040" imgH="177480" progId="Equation.DSMT4">
+                      <p:oleObj spid="_x0000_s2722" name="Equation" r:id="rId17" imgW="419040" imgH="177480" progId="Equation.DSMT4">
                         <p:embed/>
                       </p:oleObj>
                     </mc:Choice>
@@ -5431,7 +5431,7 @@
                 <a:graphicData uri="http://schemas.openxmlformats.org/presentationml/2006/ole">
                   <mc:AlternateContent xmlns:mc="http://schemas.openxmlformats.org/markup-compatibility/2006">
                     <mc:Choice xmlns:v="urn:schemas-microsoft-com:vml" Requires="v">
-                      <p:oleObj spid="_x0000_s2603" name="Equation" r:id="rId18" imgW="139680" imgH="164880" progId="Equation.DSMT4">
+                      <p:oleObj spid="_x0000_s2723" name="Equation" r:id="rId18" imgW="139680" imgH="164880" progId="Equation.DSMT4">
                         <p:embed/>
                       </p:oleObj>
                     </mc:Choice>
@@ -5488,7 +5488,7 @@
                 <a:graphicData uri="http://schemas.openxmlformats.org/presentationml/2006/ole">
                   <mc:AlternateContent xmlns:mc="http://schemas.openxmlformats.org/markup-compatibility/2006">
                     <mc:Choice xmlns:v="urn:schemas-microsoft-com:vml" Requires="v">
-                      <p:oleObj spid="_x0000_s2604" name="Equation" r:id="rId20" imgW="241200" imgH="228600" progId="Equation.DSMT4">
+                      <p:oleObj spid="_x0000_s2724" name="Equation" r:id="rId20" imgW="241200" imgH="228600" progId="Equation.DSMT4">
                         <p:embed/>
                       </p:oleObj>
                     </mc:Choice>
@@ -5548,7 +5548,7 @@
           <a:graphicData uri="http://schemas.openxmlformats.org/presentationml/2006/ole">
             <mc:AlternateContent xmlns:mc="http://schemas.openxmlformats.org/markup-compatibility/2006">
               <mc:Choice xmlns:v="urn:schemas-microsoft-com:vml" Requires="v">
-                <p:oleObj spid="_x0000_s2605" name="Equation" r:id="rId22" imgW="152280" imgH="164880" progId="Equation.DSMT4">
+                <p:oleObj spid="_x0000_s2725" name="Equation" r:id="rId22" imgW="152280" imgH="164880" progId="Equation.DSMT4">
                   <p:embed/>
                 </p:oleObj>
               </mc:Choice>
@@ -5605,7 +5605,7 @@
           <a:graphicData uri="http://schemas.openxmlformats.org/presentationml/2006/ole">
             <mc:AlternateContent xmlns:mc="http://schemas.openxmlformats.org/markup-compatibility/2006">
               <mc:Choice xmlns:v="urn:schemas-microsoft-com:vml" Requires="v">
-                <p:oleObj spid="_x0000_s2606" name="Equation" r:id="rId24" imgW="177480" imgH="228600" progId="Equation.DSMT4">
+                <p:oleObj spid="_x0000_s2726" name="Equation" r:id="rId24" imgW="177480" imgH="228600" progId="Equation.DSMT4">
                   <p:embed/>
                 </p:oleObj>
               </mc:Choice>
@@ -5710,7 +5710,7 @@
             <a:graphicData uri="http://schemas.openxmlformats.org/presentationml/2006/ole">
               <mc:AlternateContent xmlns:mc="http://schemas.openxmlformats.org/markup-compatibility/2006">
                 <mc:Choice xmlns:v="urn:schemas-microsoft-com:vml" Requires="v">
-                  <p:oleObj spid="_x0000_s2607" name="Equation" r:id="rId26" imgW="241200" imgH="228600" progId="Equation.DSMT4">
+                  <p:oleObj spid="_x0000_s2727" name="Equation" r:id="rId26" imgW="241200" imgH="228600" progId="Equation.DSMT4">
                     <p:embed/>
                   </p:oleObj>
                 </mc:Choice>
@@ -5767,7 +5767,7 @@
             <a:graphicData uri="http://schemas.openxmlformats.org/presentationml/2006/ole">
               <mc:AlternateContent xmlns:mc="http://schemas.openxmlformats.org/markup-compatibility/2006">
                 <mc:Choice xmlns:v="urn:schemas-microsoft-com:vml" Requires="v">
-                  <p:oleObj spid="_x0000_s2608" name="Equation" r:id="rId28" imgW="152280" imgH="241200" progId="Equation.DSMT4">
+                  <p:oleObj spid="_x0000_s2728" name="Equation" r:id="rId28" imgW="152280" imgH="241200" progId="Equation.DSMT4">
                     <p:embed/>
                   </p:oleObj>
                 </mc:Choice>
@@ -5873,7 +5873,7 @@
             <a:graphicData uri="http://schemas.openxmlformats.org/presentationml/2006/ole">
               <mc:AlternateContent xmlns:mc="http://schemas.openxmlformats.org/markup-compatibility/2006">
                 <mc:Choice xmlns:v="urn:schemas-microsoft-com:vml" Requires="v">
-                  <p:oleObj spid="_x0000_s2609" name="Equation" r:id="rId30" imgW="241200" imgH="228600" progId="Equation.DSMT4">
+                  <p:oleObj spid="_x0000_s2729" name="Equation" r:id="rId30" imgW="241200" imgH="228600" progId="Equation.DSMT4">
                     <p:embed/>
                   </p:oleObj>
                 </mc:Choice>
@@ -5930,7 +5930,7 @@
             <a:graphicData uri="http://schemas.openxmlformats.org/presentationml/2006/ole">
               <mc:AlternateContent xmlns:mc="http://schemas.openxmlformats.org/markup-compatibility/2006">
                 <mc:Choice xmlns:v="urn:schemas-microsoft-com:vml" Requires="v">
-                  <p:oleObj spid="_x0000_s2610" name="Equation" r:id="rId31" imgW="152280" imgH="164880" progId="Equation.DSMT4">
+                  <p:oleObj spid="_x0000_s2730" name="Equation" r:id="rId31" imgW="152280" imgH="164880" progId="Equation.DSMT4">
                     <p:embed/>
                   </p:oleObj>
                 </mc:Choice>
@@ -6036,7 +6036,7 @@
             <a:graphicData uri="http://schemas.openxmlformats.org/presentationml/2006/ole">
               <mc:AlternateContent xmlns:mc="http://schemas.openxmlformats.org/markup-compatibility/2006">
                 <mc:Choice xmlns:v="urn:schemas-microsoft-com:vml" Requires="v">
-                  <p:oleObj spid="_x0000_s2611" name="Equation" r:id="rId33" imgW="241200" imgH="228600" progId="Equation.DSMT4">
+                  <p:oleObj spid="_x0000_s2731" name="Equation" r:id="rId33" imgW="241200" imgH="228600" progId="Equation.DSMT4">
                     <p:embed/>
                   </p:oleObj>
                 </mc:Choice>
@@ -6093,7 +6093,7 @@
             <a:graphicData uri="http://schemas.openxmlformats.org/presentationml/2006/ole">
               <mc:AlternateContent xmlns:mc="http://schemas.openxmlformats.org/markup-compatibility/2006">
                 <mc:Choice xmlns:v="urn:schemas-microsoft-com:vml" Requires="v">
-                  <p:oleObj spid="_x0000_s2612" name="Equation" r:id="rId34" imgW="177480" imgH="228600" progId="Equation.DSMT4">
+                  <p:oleObj spid="_x0000_s2732" name="Equation" r:id="rId34" imgW="177480" imgH="228600" progId="Equation.DSMT4">
                     <p:embed/>
                   </p:oleObj>
                 </mc:Choice>
@@ -6151,7 +6151,7 @@
           <a:graphicData uri="http://schemas.openxmlformats.org/presentationml/2006/ole">
             <mc:AlternateContent xmlns:mc="http://schemas.openxmlformats.org/markup-compatibility/2006">
               <mc:Choice xmlns:v="urn:schemas-microsoft-com:vml" Requires="v">
-                <p:oleObj spid="_x0000_s2613" name="Equation" r:id="rId36" imgW="291960" imgH="228600" progId="Equation.DSMT4">
+                <p:oleObj spid="_x0000_s2733" name="Equation" r:id="rId36" imgW="291960" imgH="228600" progId="Equation.DSMT4">
                   <p:embed/>
                 </p:oleObj>
               </mc:Choice>
@@ -6208,7 +6208,7 @@
           <a:graphicData uri="http://schemas.openxmlformats.org/presentationml/2006/ole">
             <mc:AlternateContent xmlns:mc="http://schemas.openxmlformats.org/markup-compatibility/2006">
               <mc:Choice xmlns:v="urn:schemas-microsoft-com:vml" Requires="v">
-                <p:oleObj spid="_x0000_s2614" name="Equation" r:id="rId38" imgW="241200" imgH="203040" progId="Equation.DSMT4">
+                <p:oleObj spid="_x0000_s2734" name="Equation" r:id="rId38" imgW="241200" imgH="203040" progId="Equation.DSMT4">
                   <p:embed/>
                 </p:oleObj>
               </mc:Choice>
@@ -6265,7 +6265,7 @@
           <a:graphicData uri="http://schemas.openxmlformats.org/presentationml/2006/ole">
             <mc:AlternateContent xmlns:mc="http://schemas.openxmlformats.org/markup-compatibility/2006">
               <mc:Choice xmlns:v="urn:schemas-microsoft-com:vml" Requires="v">
-                <p:oleObj spid="_x0000_s2615" name="Equation" r:id="rId40" imgW="152280" imgH="241200" progId="Equation.DSMT4">
+                <p:oleObj spid="_x0000_s2735" name="Equation" r:id="rId40" imgW="152280" imgH="241200" progId="Equation.DSMT4">
                   <p:embed/>
                 </p:oleObj>
               </mc:Choice>
@@ -6322,7 +6322,7 @@
           <a:graphicData uri="http://schemas.openxmlformats.org/presentationml/2006/ole">
             <mc:AlternateContent xmlns:mc="http://schemas.openxmlformats.org/markup-compatibility/2006">
               <mc:Choice xmlns:v="urn:schemas-microsoft-com:vml" Requires="v">
-                <p:oleObj spid="_x0000_s2616" name="Equation" r:id="rId42" imgW="253800" imgH="241200" progId="Equation.DSMT4">
+                <p:oleObj spid="_x0000_s2736" name="Equation" r:id="rId42" imgW="253800" imgH="241200" progId="Equation.DSMT4">
                   <p:embed/>
                 </p:oleObj>
               </mc:Choice>
@@ -6379,7 +6379,7 @@
           <a:graphicData uri="http://schemas.openxmlformats.org/presentationml/2006/ole">
             <mc:AlternateContent xmlns:mc="http://schemas.openxmlformats.org/markup-compatibility/2006">
               <mc:Choice xmlns:v="urn:schemas-microsoft-com:vml" Requires="v">
-                <p:oleObj spid="_x0000_s2617" name="Equation" r:id="rId44" imgW="139680" imgH="164880" progId="Equation.DSMT4">
+                <p:oleObj spid="_x0000_s2737" name="Equation" r:id="rId44" imgW="139680" imgH="164880" progId="Equation.DSMT4">
                   <p:embed/>
                 </p:oleObj>
               </mc:Choice>
@@ -6941,7 +6941,7 @@
             <a:graphicData uri="http://schemas.openxmlformats.org/presentationml/2006/ole">
               <mc:AlternateContent xmlns:mc="http://schemas.openxmlformats.org/markup-compatibility/2006">
                 <mc:Choice xmlns:v="urn:schemas-microsoft-com:vml" Requires="v">
-                  <p:oleObj spid="_x0000_s2618" name="Equation" r:id="rId46" imgW="545760" imgH="266400" progId="Equation.DSMT4">
+                  <p:oleObj spid="_x0000_s2738" name="Equation" r:id="rId46" imgW="545760" imgH="266400" progId="Equation.DSMT4">
                     <p:embed/>
                   </p:oleObj>
                 </mc:Choice>
@@ -7079,10 +7079,10 @@
       </p:grpSpPr>
       <p:grpSp>
         <p:nvGrpSpPr>
-          <p:cNvPr id="140" name="Group 139">
+          <p:cNvPr id="3" name="Group 2">
             <a:extLst>
               <a:ext uri="{FF2B5EF4-FFF2-40B4-BE49-F238E27FC236}">
-                <a16:creationId xmlns:a16="http://schemas.microsoft.com/office/drawing/2014/main" id="{85C4A3FC-7C8D-46BA-B7FF-560FC6E34638}"/>
+                <a16:creationId xmlns:a16="http://schemas.microsoft.com/office/drawing/2014/main" id="{C96727EE-7C5A-4A4E-9231-C9B74707F6B5}"/>
               </a:ext>
             </a:extLst>
           </p:cNvPr>
@@ -7091,10 +7091,10 @@
         </p:nvGrpSpPr>
         <p:grpSpPr>
           <a:xfrm>
-            <a:off x="1588262" y="871508"/>
-            <a:ext cx="8423414" cy="5247236"/>
-            <a:chOff x="1588262" y="871508"/>
-            <a:chExt cx="8423414" cy="5247236"/>
+            <a:off x="1588262" y="860704"/>
+            <a:ext cx="9759292" cy="5258040"/>
+            <a:chOff x="1588262" y="860704"/>
+            <a:chExt cx="9759292" cy="5258040"/>
           </a:xfrm>
         </p:grpSpPr>
         <p:grpSp>
@@ -7111,10 +7111,10 @@
           </p:nvGrpSpPr>
           <p:grpSpPr>
             <a:xfrm>
-              <a:off x="2091736" y="1791340"/>
-              <a:ext cx="7530730" cy="681038"/>
-              <a:chOff x="4789715" y="-62680"/>
-              <a:chExt cx="7530730" cy="681038"/>
+              <a:off x="2091736" y="1757363"/>
+              <a:ext cx="7919940" cy="747712"/>
+              <a:chOff x="4789715" y="-96657"/>
+              <a:chExt cx="7919940" cy="747712"/>
             </a:xfrm>
           </p:grpSpPr>
           <p:sp>
@@ -7132,7 +7132,7 @@
             <p:spPr>
               <a:xfrm>
                 <a:off x="4789715" y="78377"/>
-                <a:ext cx="7530730" cy="369332"/>
+                <a:ext cx="7919940" cy="369332"/>
               </a:xfrm>
               <a:prstGeom prst="rect">
                 <a:avLst/>
@@ -7150,7 +7150,7 @@
               <a:p>
                 <a:r>
                   <a:rPr lang="en-US" dirty="0"/>
-                  <a:t>Loop for value                                      in range                          with                  steps  </a:t>
+                  <a:t>Loop for value                                      in range                          with                      steps  </a:t>
                 </a:r>
               </a:p>
             </p:txBody>
@@ -7170,25 +7170,25 @@
               <p:nvPr>
                 <p:extLst>
                   <p:ext uri="{D42A27DB-BD31-4B8C-83A1-F6EECF244321}">
-                    <p14:modId xmlns:p14="http://schemas.microsoft.com/office/powerpoint/2010/main" val="495772052"/>
+                    <p14:modId xmlns:p14="http://schemas.microsoft.com/office/powerpoint/2010/main" val="2912710840"/>
                   </p:ext>
                 </p:extLst>
               </p:nvPr>
             </p:nvGraphicFramePr>
             <p:xfrm>
-              <a:off x="6220250" y="-62680"/>
-              <a:ext cx="1931987" cy="681038"/>
+              <a:off x="6220642" y="-96657"/>
+              <a:ext cx="1931987" cy="747712"/>
             </p:xfrm>
             <a:graphic>
               <a:graphicData uri="http://schemas.openxmlformats.org/presentationml/2006/ole">
                 <mc:AlternateContent xmlns:mc="http://schemas.openxmlformats.org/markup-compatibility/2006">
                   <mc:Choice xmlns:v="urn:schemas-microsoft-com:vml" Requires="v">
-                    <p:oleObj spid="_x0000_s3460" name="Equation" r:id="rId3" imgW="1117440" imgH="393480" progId="Equation.DSMT4">
+                    <p:oleObj spid="_x0000_s3515" name="Equation" r:id="rId3" imgW="1117440" imgH="431640" progId="Equation.DSMT4">
                       <p:embed/>
                     </p:oleObj>
                   </mc:Choice>
                   <mc:Fallback>
-                    <p:oleObj name="Equation" r:id="rId3" imgW="1117440" imgH="393480" progId="Equation.DSMT4">
+                    <p:oleObj name="Equation" r:id="rId3" imgW="1117440" imgH="431640" progId="Equation.DSMT4">
                       <p:embed/>
                       <p:pic>
                         <p:nvPicPr>
@@ -7210,8 +7210,8 @@
                         </p:blipFill>
                         <p:spPr>
                           <a:xfrm>
-                            <a:off x="6220250" y="-62680"/>
-                            <a:ext cx="1931987" cy="681038"/>
+                            <a:off x="6220642" y="-96657"/>
+                            <a:ext cx="1931987" cy="747712"/>
                           </a:xfrm>
                           <a:prstGeom prst="rect">
                             <a:avLst/>
@@ -7240,7 +7240,7 @@
             <p:nvPr>
               <p:extLst>
                 <p:ext uri="{D42A27DB-BD31-4B8C-83A1-F6EECF244321}">
-                  <p14:modId xmlns:p14="http://schemas.microsoft.com/office/powerpoint/2010/main" val="65214628"/>
+                  <p14:modId xmlns:p14="http://schemas.microsoft.com/office/powerpoint/2010/main" val="1984619874"/>
                 </p:ext>
               </p:extLst>
             </p:nvPr>
@@ -7253,7 +7253,7 @@
             <a:graphicData uri="http://schemas.openxmlformats.org/presentationml/2006/ole">
               <mc:AlternateContent xmlns:mc="http://schemas.openxmlformats.org/markup-compatibility/2006">
                 <mc:Choice xmlns:v="urn:schemas-microsoft-com:vml" Requires="v">
-                  <p:oleObj spid="_x0000_s3461" name="Equation" r:id="rId5" imgW="723600" imgH="177480" progId="Equation.DSMT4">
+                  <p:oleObj spid="_x0000_s3516" name="Equation" r:id="rId5" imgW="723600" imgH="177480" progId="Equation.DSMT4">
                     <p:embed/>
                   </p:oleObj>
                 </mc:Choice>
@@ -7309,20 +7309,20 @@
             <p:nvPr>
               <p:extLst>
                 <p:ext uri="{D42A27DB-BD31-4B8C-83A1-F6EECF244321}">
-                  <p14:modId xmlns:p14="http://schemas.microsoft.com/office/powerpoint/2010/main" val="1894238754"/>
+                  <p14:modId xmlns:p14="http://schemas.microsoft.com/office/powerpoint/2010/main" val="2025394803"/>
                 </p:ext>
               </p:extLst>
             </p:nvPr>
           </p:nvGraphicFramePr>
           <p:xfrm>
-            <a:off x="8046401" y="1946212"/>
+            <a:off x="8135873" y="1959053"/>
             <a:ext cx="919162" cy="306387"/>
           </p:xfrm>
           <a:graphic>
             <a:graphicData uri="http://schemas.openxmlformats.org/presentationml/2006/ole">
               <mc:AlternateContent xmlns:mc="http://schemas.openxmlformats.org/markup-compatibility/2006">
                 <mc:Choice xmlns:v="urn:schemas-microsoft-com:vml" Requires="v">
-                  <p:oleObj spid="_x0000_s3462" name="Equation" r:id="rId7" imgW="533160" imgH="177480" progId="Equation.DSMT4">
+                  <p:oleObj spid="_x0000_s3517" name="Equation" r:id="rId7" imgW="533160" imgH="177480" progId="Equation.DSMT4">
                     <p:embed/>
                   </p:oleObj>
                 </mc:Choice>
@@ -7349,7 +7349,7 @@
                       </p:blipFill>
                       <p:spPr>
                         <a:xfrm>
-                          <a:off x="8046401" y="1946212"/>
+                          <a:off x="8135873" y="1959053"/>
                           <a:ext cx="919162" cy="306387"/>
                         </a:xfrm>
                         <a:prstGeom prst="rect">
@@ -7378,7 +7378,7 @@
           <p:spPr>
             <a:xfrm>
               <a:off x="2118134" y="1735866"/>
-              <a:ext cx="7385132" cy="769917"/>
+              <a:ext cx="7860136" cy="769917"/>
             </a:xfrm>
             <a:prstGeom prst="rect">
               <a:avLst/>
@@ -7468,7 +7468,7 @@
             <p:nvPr>
               <p:extLst>
                 <p:ext uri="{D42A27DB-BD31-4B8C-83A1-F6EECF244321}">
-                  <p14:modId xmlns:p14="http://schemas.microsoft.com/office/powerpoint/2010/main" val="2981137912"/>
+                  <p14:modId xmlns:p14="http://schemas.microsoft.com/office/powerpoint/2010/main" val="1996817238"/>
                 </p:ext>
               </p:extLst>
             </p:nvPr>
@@ -7481,7 +7481,7 @@
             <a:graphicData uri="http://schemas.openxmlformats.org/presentationml/2006/ole">
               <mc:AlternateContent xmlns:mc="http://schemas.openxmlformats.org/markup-compatibility/2006">
                 <mc:Choice xmlns:v="urn:schemas-microsoft-com:vml" Requires="v">
-                  <p:oleObj spid="_x0000_s3463" name="Equation" r:id="rId9" imgW="342720" imgH="190440" progId="Equation.DSMT4">
+                  <p:oleObj spid="_x0000_s3518" name="Equation" r:id="rId9" imgW="342720" imgH="190440" progId="Equation.DSMT4">
                     <p:embed/>
                   </p:oleObj>
                 </mc:Choice>
@@ -7531,7 +7531,7 @@
             <p:nvPr>
               <p:extLst>
                 <p:ext uri="{D42A27DB-BD31-4B8C-83A1-F6EECF244321}">
-                  <p14:modId xmlns:p14="http://schemas.microsoft.com/office/powerpoint/2010/main" val="1712929757"/>
+                  <p14:modId xmlns:p14="http://schemas.microsoft.com/office/powerpoint/2010/main" val="2336908567"/>
                 </p:ext>
               </p:extLst>
             </p:nvPr>
@@ -7544,7 +7544,7 @@
             <a:graphicData uri="http://schemas.openxmlformats.org/presentationml/2006/ole">
               <mc:AlternateContent xmlns:mc="http://schemas.openxmlformats.org/markup-compatibility/2006">
                 <mc:Choice xmlns:v="urn:schemas-microsoft-com:vml" Requires="v">
-                  <p:oleObj spid="_x0000_s3464" name="Equation" r:id="rId11" imgW="723600" imgH="241200" progId="Equation.DSMT4">
+                  <p:oleObj spid="_x0000_s3519" name="Equation" r:id="rId11" imgW="723600" imgH="241200" progId="Equation.DSMT4">
                     <p:embed/>
                   </p:oleObj>
                 </mc:Choice>
@@ -7847,10 +7847,10 @@
         </p:cxnSp>
         <p:grpSp>
           <p:nvGrpSpPr>
-            <p:cNvPr id="74" name="Group 73">
+            <p:cNvPr id="71" name="Group 70">
               <a:extLst>
                 <a:ext uri="{FF2B5EF4-FFF2-40B4-BE49-F238E27FC236}">
-                  <a16:creationId xmlns:a16="http://schemas.microsoft.com/office/drawing/2014/main" id="{4CC329EE-BDF2-4428-A60A-E580A5C37E28}"/>
+                  <a16:creationId xmlns:a16="http://schemas.microsoft.com/office/drawing/2014/main" id="{07E7F227-0EE3-4C0C-8102-BD637C8B829F}"/>
                 </a:ext>
               </a:extLst>
             </p:cNvPr>
@@ -7859,18 +7859,18 @@
           </p:nvGrpSpPr>
           <p:grpSpPr>
             <a:xfrm>
-              <a:off x="1967230" y="871508"/>
-              <a:ext cx="7529739" cy="790883"/>
-              <a:chOff x="1609011" y="136217"/>
-              <a:chExt cx="7529739" cy="790883"/>
+              <a:off x="1967230" y="860704"/>
+              <a:ext cx="9380324" cy="812800"/>
+              <a:chOff x="1647530" y="-92072"/>
+              <a:chExt cx="8255319" cy="812800"/>
             </a:xfrm>
           </p:grpSpPr>
           <p:grpSp>
             <p:nvGrpSpPr>
-              <p:cNvPr id="71" name="Group 70">
+              <p:cNvPr id="11" name="Group 10">
                 <a:extLst>
                   <a:ext uri="{FF2B5EF4-FFF2-40B4-BE49-F238E27FC236}">
-                    <a16:creationId xmlns:a16="http://schemas.microsoft.com/office/drawing/2014/main" id="{07E7F227-0EE3-4C0C-8102-BD637C8B829F}"/>
+                    <a16:creationId xmlns:a16="http://schemas.microsoft.com/office/drawing/2014/main" id="{043C2479-82DD-4BE6-B71C-57795C528028}"/>
                   </a:ext>
                 </a:extLst>
               </p:cNvPr>
@@ -7879,140 +7879,56 @@
             </p:nvGrpSpPr>
             <p:grpSpPr>
               <a:xfrm>
-                <a:off x="1609011" y="136525"/>
-                <a:ext cx="7529739" cy="790575"/>
-                <a:chOff x="1647530" y="-80960"/>
-                <a:chExt cx="7529739" cy="790575"/>
+                <a:off x="1647530" y="-92072"/>
+                <a:ext cx="8255319" cy="812800"/>
+                <a:chOff x="4789714" y="-119626"/>
+                <a:chExt cx="8255319" cy="812800"/>
               </a:xfrm>
             </p:grpSpPr>
-            <p:grpSp>
-              <p:nvGrpSpPr>
-                <p:cNvPr id="11" name="Group 10">
+            <p:sp>
+              <p:nvSpPr>
+                <p:cNvPr id="12" name="TextBox 11">
                   <a:extLst>
                     <a:ext uri="{FF2B5EF4-FFF2-40B4-BE49-F238E27FC236}">
-                      <a16:creationId xmlns:a16="http://schemas.microsoft.com/office/drawing/2014/main" id="{043C2479-82DD-4BE6-B71C-57795C528028}"/>
+                      <a16:creationId xmlns:a16="http://schemas.microsoft.com/office/drawing/2014/main" id="{7844C074-6EB0-4548-BBB6-C785DA9BB5BF}"/>
                     </a:ext>
                   </a:extLst>
                 </p:cNvPr>
-                <p:cNvGrpSpPr/>
+                <p:cNvSpPr txBox="1"/>
                 <p:nvPr/>
-              </p:nvGrpSpPr>
-              <p:grpSpPr>
+              </p:nvSpPr>
+              <p:spPr>
                 <a:xfrm>
-                  <a:off x="1647530" y="-80960"/>
-                  <a:ext cx="7529739" cy="790575"/>
-                  <a:chOff x="4789714" y="-108514"/>
-                  <a:chExt cx="7529739" cy="790575"/>
+                  <a:off x="4789714" y="78377"/>
+                  <a:ext cx="8255319" cy="369332"/>
                 </a:xfrm>
-              </p:grpSpPr>
-              <p:sp>
-                <p:nvSpPr>
-                  <p:cNvPr id="12" name="TextBox 11">
-                    <a:extLst>
-                      <a:ext uri="{FF2B5EF4-FFF2-40B4-BE49-F238E27FC236}">
-                        <a16:creationId xmlns:a16="http://schemas.microsoft.com/office/drawing/2014/main" id="{7844C074-6EB0-4548-BBB6-C785DA9BB5BF}"/>
-                      </a:ext>
-                    </a:extLst>
-                  </p:cNvPr>
-                  <p:cNvSpPr txBox="1"/>
-                  <p:nvPr/>
-                </p:nvSpPr>
-                <p:spPr>
-                  <a:xfrm>
-                    <a:off x="4789714" y="78377"/>
-                    <a:ext cx="7529739" cy="369332"/>
-                  </a:xfrm>
-                  <a:prstGeom prst="rect">
-                    <a:avLst/>
-                  </a:prstGeom>
+                <a:prstGeom prst="rect">
+                  <a:avLst/>
+                </a:prstGeom>
+                <a:noFill/>
+                <a:ln>
                   <a:noFill/>
-                  <a:ln>
-                    <a:noFill/>
-                  </a:ln>
-                </p:spPr>
-                <p:txBody>
-                  <a:bodyPr wrap="square" rtlCol="0">
-                    <a:spAutoFit/>
-                  </a:bodyPr>
-                  <a:lstStyle/>
-                  <a:p>
-                    <a:r>
-                      <a:rPr lang="en-US" dirty="0"/>
-                      <a:t>Loop for value                                           in range                      with                  steps  </a:t>
-                    </a:r>
-                  </a:p>
-                </p:txBody>
-              </p:sp>
-              <p:graphicFrame>
-                <p:nvGraphicFramePr>
-                  <p:cNvPr id="13" name="Object 12">
-                    <a:extLst>
-                      <a:ext uri="{FF2B5EF4-FFF2-40B4-BE49-F238E27FC236}">
-                        <a16:creationId xmlns:a16="http://schemas.microsoft.com/office/drawing/2014/main" id="{099E243C-1F21-4408-9C60-4C220182492C}"/>
-                      </a:ext>
-                    </a:extLst>
-                  </p:cNvPr>
-                  <p:cNvGraphicFramePr>
-                    <a:graphicFrameLocks noChangeAspect="1"/>
-                  </p:cNvGraphicFramePr>
-                  <p:nvPr>
-                    <p:extLst>
-                      <p:ext uri="{D42A27DB-BD31-4B8C-83A1-F6EECF244321}">
-                        <p14:modId xmlns:p14="http://schemas.microsoft.com/office/powerpoint/2010/main" val="1449596106"/>
-                      </p:ext>
-                    </p:extLst>
-                  </p:nvPr>
-                </p:nvGraphicFramePr>
-                <p:xfrm>
-                  <a:off x="6231878" y="-108514"/>
-                  <a:ext cx="2173288" cy="790575"/>
-                </p:xfrm>
-                <a:graphic>
-                  <a:graphicData uri="http://schemas.openxmlformats.org/presentationml/2006/ole">
-                    <mc:AlternateContent xmlns:mc="http://schemas.openxmlformats.org/markup-compatibility/2006">
-                      <mc:Choice xmlns:v="urn:schemas-microsoft-com:vml" Requires="v">
-                        <p:oleObj spid="_x0000_s3465" name="Equation" r:id="rId13" imgW="1257120" imgH="457200" progId="Equation.DSMT4">
-                          <p:embed/>
-                        </p:oleObj>
-                      </mc:Choice>
-                      <mc:Fallback>
-                        <p:oleObj name="Equation" r:id="rId13" imgW="1257120" imgH="457200" progId="Equation.DSMT4">
-                          <p:embed/>
-                          <p:pic>
-                            <p:nvPicPr>
-                              <p:cNvPr id="21" name="Object 20"/>
-                              <p:cNvPicPr/>
-                              <p:nvPr/>
-                            </p:nvPicPr>
-                            <p:blipFill>
-                              <a:blip r:embed="rId14"/>
-                              <a:stretch>
-                                <a:fillRect/>
-                              </a:stretch>
-                            </p:blipFill>
-                            <p:spPr>
-                              <a:xfrm>
-                                <a:off x="6231878" y="-108514"/>
-                                <a:ext cx="2173288" cy="790575"/>
-                              </a:xfrm>
-                              <a:prstGeom prst="rect">
-                                <a:avLst/>
-                              </a:prstGeom>
-                            </p:spPr>
-                          </p:pic>
-                        </p:oleObj>
-                      </mc:Fallback>
-                    </mc:AlternateContent>
-                  </a:graphicData>
-                </a:graphic>
-              </p:graphicFrame>
-            </p:grpSp>
+                </a:ln>
+              </p:spPr>
+              <p:txBody>
+                <a:bodyPr wrap="square" rtlCol="0">
+                  <a:spAutoFit/>
+                </a:bodyPr>
+                <a:lstStyle/>
+                <a:p>
+                  <a:r>
+                    <a:rPr lang="en-US" dirty="0"/>
+                    <a:t>Loop for value                                                                 in range                          with                        steps  </a:t>
+                  </a:r>
+                </a:p>
+              </p:txBody>
+            </p:sp>
             <p:graphicFrame>
               <p:nvGraphicFramePr>
-                <p:cNvPr id="69" name="Object 68">
+                <p:cNvPr id="13" name="Object 12">
                   <a:extLst>
                     <a:ext uri="{FF2B5EF4-FFF2-40B4-BE49-F238E27FC236}">
-                      <a16:creationId xmlns:a16="http://schemas.microsoft.com/office/drawing/2014/main" id="{2C8CA670-137A-4BEE-B97C-888ACD591832}"/>
+                      <a16:creationId xmlns:a16="http://schemas.microsoft.com/office/drawing/2014/main" id="{099E243C-1F21-4408-9C60-4C220182492C}"/>
                     </a:ext>
                   </a:extLst>
                 </p:cNvPr>
@@ -8022,117 +7938,42 @@
                 <p:nvPr>
                   <p:extLst>
                     <p:ext uri="{D42A27DB-BD31-4B8C-83A1-F6EECF244321}">
-                      <p14:modId xmlns:p14="http://schemas.microsoft.com/office/powerpoint/2010/main" val="4115112793"/>
+                      <p14:modId xmlns:p14="http://schemas.microsoft.com/office/powerpoint/2010/main" val="2845149039"/>
                     </p:ext>
                   </p:extLst>
                 </p:nvPr>
               </p:nvGraphicFramePr>
               <p:xfrm>
-                <a:off x="6094103" y="145081"/>
-                <a:ext cx="1093787" cy="306387"/>
+                <a:off x="6052828" y="-119626"/>
+                <a:ext cx="2941638" cy="812800"/>
               </p:xfrm>
               <a:graphic>
                 <a:graphicData uri="http://schemas.openxmlformats.org/presentationml/2006/ole">
                   <mc:AlternateContent xmlns:mc="http://schemas.openxmlformats.org/markup-compatibility/2006">
                     <mc:Choice xmlns:v="urn:schemas-microsoft-com:vml" Requires="v">
-                      <p:oleObj spid="_x0000_s3466" name="Equation" r:id="rId15" imgW="634680" imgH="177480" progId="Equation.DSMT4">
+                      <p:oleObj spid="_x0000_s3520" name="Equation" r:id="rId13" imgW="1701720" imgH="469800" progId="Equation.DSMT4">
                         <p:embed/>
                       </p:oleObj>
                     </mc:Choice>
                     <mc:Fallback>
-                      <p:oleObj name="Equation" r:id="rId15" imgW="634680" imgH="177480" progId="Equation.DSMT4">
+                      <p:oleObj name="Equation" r:id="rId13" imgW="1701720" imgH="469800" progId="Equation.DSMT4">
                         <p:embed/>
                         <p:pic>
                           <p:nvPicPr>
-                            <p:cNvPr id="33" name="Object 32">
-                              <a:extLst>
-                                <a:ext uri="{FF2B5EF4-FFF2-40B4-BE49-F238E27FC236}">
-                                  <a16:creationId xmlns:a16="http://schemas.microsoft.com/office/drawing/2014/main" id="{5E583790-2809-418D-88C8-4D96C3C07CDF}"/>
-                                </a:ext>
-                              </a:extLst>
-                            </p:cNvPr>
+                            <p:cNvPr id="21" name="Object 20"/>
                             <p:cNvPicPr/>
                             <p:nvPr/>
                           </p:nvPicPr>
                           <p:blipFill>
-                            <a:blip r:embed="rId16"/>
+                            <a:blip r:embed="rId14"/>
                             <a:stretch>
                               <a:fillRect/>
                             </a:stretch>
                           </p:blipFill>
                           <p:spPr>
                             <a:xfrm>
-                              <a:off x="6094103" y="145081"/>
-                              <a:ext cx="1093787" cy="306387"/>
-                            </a:xfrm>
-                            <a:prstGeom prst="rect">
-                              <a:avLst/>
-                            </a:prstGeom>
-                          </p:spPr>
-                        </p:pic>
-                      </p:oleObj>
-                    </mc:Fallback>
-                  </mc:AlternateContent>
-                </a:graphicData>
-              </a:graphic>
-            </p:graphicFrame>
-            <p:graphicFrame>
-              <p:nvGraphicFramePr>
-                <p:cNvPr id="70" name="Object 69">
-                  <a:extLst>
-                    <a:ext uri="{FF2B5EF4-FFF2-40B4-BE49-F238E27FC236}">
-                      <a16:creationId xmlns:a16="http://schemas.microsoft.com/office/drawing/2014/main" id="{372D09C3-76E9-4AC7-AFC6-249B5395122E}"/>
-                    </a:ext>
-                  </a:extLst>
-                </p:cNvPr>
-                <p:cNvGraphicFramePr>
-                  <a:graphicFrameLocks noChangeAspect="1"/>
-                </p:cNvGraphicFramePr>
-                <p:nvPr>
-                  <p:extLst>
-                    <p:ext uri="{D42A27DB-BD31-4B8C-83A1-F6EECF244321}">
-                      <p14:modId xmlns:p14="http://schemas.microsoft.com/office/powerpoint/2010/main" val="4148110207"/>
-                    </p:ext>
-                  </p:extLst>
-                </p:nvPr>
-              </p:nvGraphicFramePr>
-              <p:xfrm>
-                <a:off x="7614069" y="128590"/>
-                <a:ext cx="962025" cy="306388"/>
-              </p:xfrm>
-              <a:graphic>
-                <a:graphicData uri="http://schemas.openxmlformats.org/presentationml/2006/ole">
-                  <mc:AlternateContent xmlns:mc="http://schemas.openxmlformats.org/markup-compatibility/2006">
-                    <mc:Choice xmlns:v="urn:schemas-microsoft-com:vml" Requires="v">
-                      <p:oleObj spid="_x0000_s3467" name="Equation" r:id="rId17" imgW="558720" imgH="177480" progId="Equation.DSMT4">
-                        <p:embed/>
-                      </p:oleObj>
-                    </mc:Choice>
-                    <mc:Fallback>
-                      <p:oleObj name="Equation" r:id="rId17" imgW="558720" imgH="177480" progId="Equation.DSMT4">
-                        <p:embed/>
-                        <p:pic>
-                          <p:nvPicPr>
-                            <p:cNvPr id="33" name="Object 32">
-                              <a:extLst>
-                                <a:ext uri="{FF2B5EF4-FFF2-40B4-BE49-F238E27FC236}">
-                                  <a16:creationId xmlns:a16="http://schemas.microsoft.com/office/drawing/2014/main" id="{5E583790-2809-418D-88C8-4D96C3C07CDF}"/>
-                                </a:ext>
-                              </a:extLst>
-                            </p:cNvPr>
-                            <p:cNvPicPr/>
-                            <p:nvPr/>
-                          </p:nvPicPr>
-                          <p:blipFill>
-                            <a:blip r:embed="rId18"/>
-                            <a:stretch>
-                              <a:fillRect/>
-                            </a:stretch>
-                          </p:blipFill>
-                          <p:spPr>
-                            <a:xfrm>
-                              <a:off x="7614069" y="128590"/>
-                              <a:ext cx="962025" cy="306388"/>
+                              <a:off x="6052828" y="-119626"/>
+                              <a:ext cx="2941638" cy="812800"/>
                             </a:xfrm>
                             <a:prstGeom prst="rect">
                               <a:avLst/>
@@ -8146,59 +7987,197 @@
               </a:graphic>
             </p:graphicFrame>
           </p:grpSp>
-          <p:sp>
-            <p:nvSpPr>
-              <p:cNvPr id="72" name="Rectangle 71">
+          <p:graphicFrame>
+            <p:nvGraphicFramePr>
+              <p:cNvPr id="69" name="Object 68">
                 <a:extLst>
                   <a:ext uri="{FF2B5EF4-FFF2-40B4-BE49-F238E27FC236}">
-                    <a16:creationId xmlns:a16="http://schemas.microsoft.com/office/drawing/2014/main" id="{51D17A4F-DA57-48E6-B04C-F3F596C2ADF0}"/>
+                    <a16:creationId xmlns:a16="http://schemas.microsoft.com/office/drawing/2014/main" id="{2C8CA670-137A-4BEE-B97C-888ACD591832}"/>
                   </a:ext>
                 </a:extLst>
               </p:cNvPr>
-              <p:cNvSpPr/>
-              <p:nvPr/>
-            </p:nvSpPr>
-            <p:spPr>
-              <a:xfrm>
-                <a:off x="1609011" y="136217"/>
-                <a:ext cx="7484007" cy="769917"/>
-              </a:xfrm>
-              <a:prstGeom prst="rect">
-                <a:avLst/>
-              </a:prstGeom>
-              <a:noFill/>
-              <a:ln w="12700">
-                <a:solidFill>
-                  <a:schemeClr val="tx1"/>
-                </a:solidFill>
-              </a:ln>
-            </p:spPr>
-            <p:style>
-              <a:lnRef idx="2">
-                <a:schemeClr val="accent1">
-                  <a:shade val="50000"/>
-                </a:schemeClr>
-              </a:lnRef>
-              <a:fillRef idx="1">
-                <a:schemeClr val="accent1"/>
-              </a:fillRef>
-              <a:effectRef idx="0">
-                <a:schemeClr val="accent1"/>
-              </a:effectRef>
-              <a:fontRef idx="minor">
-                <a:schemeClr val="lt1"/>
-              </a:fontRef>
-            </p:style>
-            <p:txBody>
-              <a:bodyPr rtlCol="0" anchor="ctr"/>
-              <a:lstStyle/>
-              <a:p>
-                <a:pPr algn="ctr"/>
-                <a:endParaRPr lang="en-US"/>
-              </a:p>
-            </p:txBody>
-          </p:sp>
+              <p:cNvGraphicFramePr>
+                <a:graphicFrameLocks noChangeAspect="1"/>
+              </p:cNvGraphicFramePr>
+              <p:nvPr>
+                <p:extLst>
+                  <p:ext uri="{D42A27DB-BD31-4B8C-83A1-F6EECF244321}">
+                    <p14:modId xmlns:p14="http://schemas.microsoft.com/office/powerpoint/2010/main" val="434784749"/>
+                  </p:ext>
+                </p:extLst>
+              </p:nvPr>
+            </p:nvGraphicFramePr>
+            <p:xfrm>
+              <a:off x="6600397" y="137403"/>
+              <a:ext cx="1093787" cy="306387"/>
+            </p:xfrm>
+            <a:graphic>
+              <a:graphicData uri="http://schemas.openxmlformats.org/presentationml/2006/ole">
+                <mc:AlternateContent xmlns:mc="http://schemas.openxmlformats.org/markup-compatibility/2006">
+                  <mc:Choice xmlns:v="urn:schemas-microsoft-com:vml" Requires="v">
+                    <p:oleObj spid="_x0000_s3521" name="Equation" r:id="rId15" imgW="634680" imgH="177480" progId="Equation.DSMT4">
+                      <p:embed/>
+                    </p:oleObj>
+                  </mc:Choice>
+                  <mc:Fallback>
+                    <p:oleObj name="Equation" r:id="rId15" imgW="634680" imgH="177480" progId="Equation.DSMT4">
+                      <p:embed/>
+                      <p:pic>
+                        <p:nvPicPr>
+                          <p:cNvPr id="33" name="Object 32">
+                            <a:extLst>
+                              <a:ext uri="{FF2B5EF4-FFF2-40B4-BE49-F238E27FC236}">
+                                <a16:creationId xmlns:a16="http://schemas.microsoft.com/office/drawing/2014/main" id="{5E583790-2809-418D-88C8-4D96C3C07CDF}"/>
+                              </a:ext>
+                            </a:extLst>
+                          </p:cNvPr>
+                          <p:cNvPicPr/>
+                          <p:nvPr/>
+                        </p:nvPicPr>
+                        <p:blipFill>
+                          <a:blip r:embed="rId16"/>
+                          <a:stretch>
+                            <a:fillRect/>
+                          </a:stretch>
+                        </p:blipFill>
+                        <p:spPr>
+                          <a:xfrm>
+                            <a:off x="6600397" y="137403"/>
+                            <a:ext cx="1093787" cy="306387"/>
+                          </a:xfrm>
+                          <a:prstGeom prst="rect">
+                            <a:avLst/>
+                          </a:prstGeom>
+                        </p:spPr>
+                      </p:pic>
+                    </p:oleObj>
+                  </mc:Fallback>
+                </mc:AlternateContent>
+              </a:graphicData>
+            </a:graphic>
+          </p:graphicFrame>
+          <p:graphicFrame>
+            <p:nvGraphicFramePr>
+              <p:cNvPr id="70" name="Object 69">
+                <a:extLst>
+                  <a:ext uri="{FF2B5EF4-FFF2-40B4-BE49-F238E27FC236}">
+                    <a16:creationId xmlns:a16="http://schemas.microsoft.com/office/drawing/2014/main" id="{372D09C3-76E9-4AC7-AFC6-249B5395122E}"/>
+                  </a:ext>
+                </a:extLst>
+              </p:cNvPr>
+              <p:cNvGraphicFramePr>
+                <a:graphicFrameLocks noChangeAspect="1"/>
+              </p:cNvGraphicFramePr>
+              <p:nvPr>
+                <p:extLst>
+                  <p:ext uri="{D42A27DB-BD31-4B8C-83A1-F6EECF244321}">
+                    <p14:modId xmlns:p14="http://schemas.microsoft.com/office/powerpoint/2010/main" val="1159676708"/>
+                  </p:ext>
+                </p:extLst>
+              </p:nvPr>
+            </p:nvGraphicFramePr>
+            <p:xfrm>
+              <a:off x="8181631" y="117354"/>
+              <a:ext cx="962025" cy="306388"/>
+            </p:xfrm>
+            <a:graphic>
+              <a:graphicData uri="http://schemas.openxmlformats.org/presentationml/2006/ole">
+                <mc:AlternateContent xmlns:mc="http://schemas.openxmlformats.org/markup-compatibility/2006">
+                  <mc:Choice xmlns:v="urn:schemas-microsoft-com:vml" Requires="v">
+                    <p:oleObj spid="_x0000_s3522" name="Equation" r:id="rId17" imgW="558720" imgH="177480" progId="Equation.DSMT4">
+                      <p:embed/>
+                    </p:oleObj>
+                  </mc:Choice>
+                  <mc:Fallback>
+                    <p:oleObj name="Equation" r:id="rId17" imgW="558720" imgH="177480" progId="Equation.DSMT4">
+                      <p:embed/>
+                      <p:pic>
+                        <p:nvPicPr>
+                          <p:cNvPr id="33" name="Object 32">
+                            <a:extLst>
+                              <a:ext uri="{FF2B5EF4-FFF2-40B4-BE49-F238E27FC236}">
+                                <a16:creationId xmlns:a16="http://schemas.microsoft.com/office/drawing/2014/main" id="{5E583790-2809-418D-88C8-4D96C3C07CDF}"/>
+                              </a:ext>
+                            </a:extLst>
+                          </p:cNvPr>
+                          <p:cNvPicPr/>
+                          <p:nvPr/>
+                        </p:nvPicPr>
+                        <p:blipFill>
+                          <a:blip r:embed="rId18"/>
+                          <a:stretch>
+                            <a:fillRect/>
+                          </a:stretch>
+                        </p:blipFill>
+                        <p:spPr>
+                          <a:xfrm>
+                            <a:off x="8181631" y="117354"/>
+                            <a:ext cx="962025" cy="306388"/>
+                          </a:xfrm>
+                          <a:prstGeom prst="rect">
+                            <a:avLst/>
+                          </a:prstGeom>
+                        </p:spPr>
+                      </p:pic>
+                    </p:oleObj>
+                  </mc:Fallback>
+                </mc:AlternateContent>
+              </a:graphicData>
+            </a:graphic>
+          </p:graphicFrame>
         </p:grpSp>
+        <p:sp>
+          <p:nvSpPr>
+            <p:cNvPr id="72" name="Rectangle 71">
+              <a:extLst>
+                <a:ext uri="{FF2B5EF4-FFF2-40B4-BE49-F238E27FC236}">
+                  <a16:creationId xmlns:a16="http://schemas.microsoft.com/office/drawing/2014/main" id="{51D17A4F-DA57-48E6-B04C-F3F596C2ADF0}"/>
+                </a:ext>
+              </a:extLst>
+            </p:cNvPr>
+            <p:cNvSpPr/>
+            <p:nvPr/>
+          </p:nvSpPr>
+          <p:spPr>
+            <a:xfrm>
+              <a:off x="1967230" y="871508"/>
+              <a:ext cx="9200442" cy="769917"/>
+            </a:xfrm>
+            <a:prstGeom prst="rect">
+              <a:avLst/>
+            </a:prstGeom>
+            <a:noFill/>
+            <a:ln w="12700">
+              <a:solidFill>
+                <a:schemeClr val="tx1"/>
+              </a:solidFill>
+            </a:ln>
+          </p:spPr>
+          <p:style>
+            <a:lnRef idx="2">
+              <a:schemeClr val="accent1">
+                <a:shade val="50000"/>
+              </a:schemeClr>
+            </a:lnRef>
+            <a:fillRef idx="1">
+              <a:schemeClr val="accent1"/>
+            </a:fillRef>
+            <a:effectRef idx="0">
+              <a:schemeClr val="accent1"/>
+            </a:effectRef>
+            <a:fontRef idx="minor">
+              <a:schemeClr val="lt1"/>
+            </a:fontRef>
+          </p:style>
+          <p:txBody>
+            <a:bodyPr rtlCol="0" anchor="ctr"/>
+            <a:lstStyle/>
+            <a:p>
+              <a:pPr algn="ctr"/>
+              <a:endParaRPr lang="en-US"/>
+            </a:p>
+          </p:txBody>
+        </p:sp>
         <p:sp>
           <p:nvSpPr>
             <p:cNvPr id="90" name="TextBox 89">
@@ -8258,7 +8237,7 @@
             <p:nvPr>
               <p:extLst>
                 <p:ext uri="{D42A27DB-BD31-4B8C-83A1-F6EECF244321}">
-                  <p14:modId xmlns:p14="http://schemas.microsoft.com/office/powerpoint/2010/main" val="623049965"/>
+                  <p14:modId xmlns:p14="http://schemas.microsoft.com/office/powerpoint/2010/main" val="3931954317"/>
                 </p:ext>
               </p:extLst>
             </p:nvPr>
@@ -8271,7 +8250,7 @@
             <a:graphicData uri="http://schemas.openxmlformats.org/presentationml/2006/ole">
               <mc:AlternateContent xmlns:mc="http://schemas.openxmlformats.org/markup-compatibility/2006">
                 <mc:Choice xmlns:v="urn:schemas-microsoft-com:vml" Requires="v">
-                  <p:oleObj spid="_x0000_s3468" name="Equation" r:id="rId19" imgW="139680" imgH="164880" progId="Equation.DSMT4">
+                  <p:oleObj spid="_x0000_s3523" name="Equation" r:id="rId19" imgW="139680" imgH="164880" progId="Equation.DSMT4">
                     <p:embed/>
                   </p:oleObj>
                 </mc:Choice>
@@ -8327,7 +8306,7 @@
             <p:nvPr>
               <p:extLst>
                 <p:ext uri="{D42A27DB-BD31-4B8C-83A1-F6EECF244321}">
-                  <p14:modId xmlns:p14="http://schemas.microsoft.com/office/powerpoint/2010/main" val="3420376559"/>
+                  <p14:modId xmlns:p14="http://schemas.microsoft.com/office/powerpoint/2010/main" val="649604833"/>
                 </p:ext>
               </p:extLst>
             </p:nvPr>
@@ -8340,7 +8319,7 @@
             <a:graphicData uri="http://schemas.openxmlformats.org/presentationml/2006/ole">
               <mc:AlternateContent xmlns:mc="http://schemas.openxmlformats.org/markup-compatibility/2006">
                 <mc:Choice xmlns:v="urn:schemas-microsoft-com:vml" Requires="v">
-                  <p:oleObj spid="_x0000_s3469" name="Equation" r:id="rId21" imgW="2311200" imgH="241200" progId="Equation.DSMT4">
+                  <p:oleObj spid="_x0000_s3524" name="Equation" r:id="rId21" imgW="2311200" imgH="241200" progId="Equation.DSMT4">
                     <p:embed/>
                   </p:oleObj>
                 </mc:Choice>
@@ -8428,175 +8407,154 @@
             </a:p>
           </p:txBody>
         </p:sp>
-        <p:grpSp>
-          <p:nvGrpSpPr>
-            <p:cNvPr id="97" name="Group 96">
+        <p:graphicFrame>
+          <p:nvGraphicFramePr>
+            <p:cNvPr id="49" name="Object 48">
               <a:extLst>
                 <a:ext uri="{FF2B5EF4-FFF2-40B4-BE49-F238E27FC236}">
-                  <a16:creationId xmlns:a16="http://schemas.microsoft.com/office/drawing/2014/main" id="{8D11108D-640A-4503-8D82-9AC7A0263AD9}"/>
+                  <a16:creationId xmlns:a16="http://schemas.microsoft.com/office/drawing/2014/main" id="{21F5BD1C-1326-4D8D-8F42-A21211FEEA9C}"/>
                 </a:ext>
               </a:extLst>
             </p:cNvPr>
-            <p:cNvGrpSpPr/>
+            <p:cNvGraphicFramePr>
+              <a:graphicFrameLocks noChangeAspect="1"/>
+            </p:cNvGraphicFramePr>
+            <p:nvPr>
+              <p:extLst>
+                <p:ext uri="{D42A27DB-BD31-4B8C-83A1-F6EECF244321}">
+                  <p14:modId xmlns:p14="http://schemas.microsoft.com/office/powerpoint/2010/main" val="4069894283"/>
+                </p:ext>
+              </p:extLst>
+            </p:nvPr>
+          </p:nvGraphicFramePr>
+          <p:xfrm>
+            <a:off x="7259638" y="4000500"/>
+            <a:ext cx="1296987" cy="392113"/>
+          </p:xfrm>
+          <a:graphic>
+            <a:graphicData uri="http://schemas.openxmlformats.org/presentationml/2006/ole">
+              <mc:AlternateContent xmlns:mc="http://schemas.openxmlformats.org/markup-compatibility/2006">
+                <mc:Choice xmlns:v="urn:schemas-microsoft-com:vml" Requires="v">
+                  <p:oleObj spid="_x0000_s3525" name="Equation" r:id="rId23" imgW="749160" imgH="228600" progId="Equation.DSMT4">
+                    <p:embed/>
+                  </p:oleObj>
+                </mc:Choice>
+                <mc:Fallback>
+                  <p:oleObj name="Equation" r:id="rId23" imgW="749160" imgH="228600" progId="Equation.DSMT4">
+                    <p:embed/>
+                    <p:pic>
+                      <p:nvPicPr>
+                        <p:cNvPr id="50" name="Object 49"/>
+                        <p:cNvPicPr/>
+                        <p:nvPr/>
+                      </p:nvPicPr>
+                      <p:blipFill>
+                        <a:blip r:embed="rId24"/>
+                        <a:stretch>
+                          <a:fillRect/>
+                        </a:stretch>
+                      </p:blipFill>
+                      <p:spPr>
+                        <a:xfrm>
+                          <a:off x="7259638" y="4000500"/>
+                          <a:ext cx="1296987" cy="392113"/>
+                        </a:xfrm>
+                        <a:prstGeom prst="rect">
+                          <a:avLst/>
+                        </a:prstGeom>
+                      </p:spPr>
+                    </p:pic>
+                  </p:oleObj>
+                </mc:Fallback>
+              </mc:AlternateContent>
+            </a:graphicData>
+          </a:graphic>
+        </p:graphicFrame>
+        <p:sp>
+          <p:nvSpPr>
+            <p:cNvPr id="95" name="TextBox 94">
+              <a:extLst>
+                <a:ext uri="{FF2B5EF4-FFF2-40B4-BE49-F238E27FC236}">
+                  <a16:creationId xmlns:a16="http://schemas.microsoft.com/office/drawing/2014/main" id="{774AFD7B-9A9A-4781-855D-F1BFBF689657}"/>
+                </a:ext>
+              </a:extLst>
+            </p:cNvPr>
+            <p:cNvSpPr txBox="1"/>
             <p:nvPr/>
-          </p:nvGrpSpPr>
-          <p:grpSpPr>
+          </p:nvSpPr>
+          <p:spPr>
             <a:xfrm>
-              <a:off x="2296817" y="4000582"/>
-              <a:ext cx="6378792" cy="392113"/>
-              <a:chOff x="1963930" y="3220837"/>
-              <a:chExt cx="6378792" cy="392113"/>
+              <a:off x="2272878" y="4050208"/>
+              <a:ext cx="6378792" cy="369332"/>
             </a:xfrm>
-          </p:grpSpPr>
-          <p:graphicFrame>
-            <p:nvGraphicFramePr>
-              <p:cNvPr id="49" name="Object 48">
-                <a:extLst>
-                  <a:ext uri="{FF2B5EF4-FFF2-40B4-BE49-F238E27FC236}">
-                    <a16:creationId xmlns:a16="http://schemas.microsoft.com/office/drawing/2014/main" id="{21F5BD1C-1326-4D8D-8F42-A21211FEEA9C}"/>
-                  </a:ext>
-                </a:extLst>
-              </p:cNvPr>
-              <p:cNvGraphicFramePr>
-                <a:graphicFrameLocks noChangeAspect="1"/>
-              </p:cNvGraphicFramePr>
-              <p:nvPr>
-                <p:extLst>
-                  <p:ext uri="{D42A27DB-BD31-4B8C-83A1-F6EECF244321}">
-                    <p14:modId xmlns:p14="http://schemas.microsoft.com/office/powerpoint/2010/main" val="257247382"/>
-                  </p:ext>
-                </p:extLst>
-              </p:nvPr>
-            </p:nvGraphicFramePr>
-            <p:xfrm>
-              <a:off x="6915943" y="3220837"/>
-              <a:ext cx="1319213" cy="392113"/>
-            </p:xfrm>
-            <a:graphic>
-              <a:graphicData uri="http://schemas.openxmlformats.org/presentationml/2006/ole">
-                <mc:AlternateContent xmlns:mc="http://schemas.openxmlformats.org/markup-compatibility/2006">
-                  <mc:Choice xmlns:v="urn:schemas-microsoft-com:vml" Requires="v">
-                    <p:oleObj spid="_x0000_s3470" name="Equation" r:id="rId23" imgW="761760" imgH="228600" progId="Equation.DSMT4">
-                      <p:embed/>
-                    </p:oleObj>
-                  </mc:Choice>
-                  <mc:Fallback>
-                    <p:oleObj name="Equation" r:id="rId23" imgW="761760" imgH="228600" progId="Equation.DSMT4">
-                      <p:embed/>
-                      <p:pic>
-                        <p:nvPicPr>
-                          <p:cNvPr id="50" name="Object 49"/>
-                          <p:cNvPicPr/>
-                          <p:nvPr/>
-                        </p:nvPicPr>
-                        <p:blipFill>
-                          <a:blip r:embed="rId24"/>
-                          <a:stretch>
-                            <a:fillRect/>
-                          </a:stretch>
-                        </p:blipFill>
-                        <p:spPr>
-                          <a:xfrm>
-                            <a:off x="6915943" y="3220837"/>
-                            <a:ext cx="1319213" cy="392113"/>
-                          </a:xfrm>
-                          <a:prstGeom prst="rect">
-                            <a:avLst/>
-                          </a:prstGeom>
-                        </p:spPr>
-                      </p:pic>
-                    </p:oleObj>
-                  </mc:Fallback>
-                </mc:AlternateContent>
-              </a:graphicData>
-            </a:graphic>
-          </p:graphicFrame>
-          <p:sp>
-            <p:nvSpPr>
-              <p:cNvPr id="95" name="TextBox 94">
-                <a:extLst>
-                  <a:ext uri="{FF2B5EF4-FFF2-40B4-BE49-F238E27FC236}">
-                    <a16:creationId xmlns:a16="http://schemas.microsoft.com/office/drawing/2014/main" id="{774AFD7B-9A9A-4781-855D-F1BFBF689657}"/>
-                  </a:ext>
-                </a:extLst>
-              </p:cNvPr>
-              <p:cNvSpPr txBox="1"/>
-              <p:nvPr/>
-            </p:nvSpPr>
-            <p:spPr>
-              <a:xfrm>
-                <a:off x="1963930" y="3230338"/>
-                <a:ext cx="6378792" cy="369332"/>
-              </a:xfrm>
-              <a:prstGeom prst="rect">
-                <a:avLst/>
-              </a:prstGeom>
+            <a:prstGeom prst="rect">
+              <a:avLst/>
+            </a:prstGeom>
+            <a:noFill/>
+            <a:ln>
               <a:noFill/>
-              <a:ln>
-                <a:noFill/>
-              </a:ln>
-            </p:spPr>
-            <p:txBody>
-              <a:bodyPr wrap="square" rtlCol="0">
-                <a:spAutoFit/>
-              </a:bodyPr>
-              <a:lstStyle/>
-              <a:p>
-                <a:r>
-                  <a:rPr lang="en-US" dirty="0"/>
-                  <a:t>Preparation of data for a loop along each track with </a:t>
-                </a:r>
-              </a:p>
-            </p:txBody>
-          </p:sp>
-          <p:sp>
-            <p:nvSpPr>
-              <p:cNvPr id="96" name="Rectangle 95">
-                <a:extLst>
-                  <a:ext uri="{FF2B5EF4-FFF2-40B4-BE49-F238E27FC236}">
-                    <a16:creationId xmlns:a16="http://schemas.microsoft.com/office/drawing/2014/main" id="{0FA5EE24-1F60-4331-9222-7464F8841C7F}"/>
-                  </a:ext>
-                </a:extLst>
-              </p:cNvPr>
-              <p:cNvSpPr/>
-              <p:nvPr/>
-            </p:nvSpPr>
-            <p:spPr>
-              <a:xfrm>
-                <a:off x="1963930" y="3230338"/>
-                <a:ext cx="6271226" cy="382612"/>
-              </a:xfrm>
-              <a:prstGeom prst="rect">
-                <a:avLst/>
-              </a:prstGeom>
-              <a:noFill/>
-            </p:spPr>
-            <p:style>
-              <a:lnRef idx="2">
-                <a:schemeClr val="accent1">
-                  <a:shade val="50000"/>
-                </a:schemeClr>
-              </a:lnRef>
-              <a:fillRef idx="1">
-                <a:schemeClr val="accent1"/>
-              </a:fillRef>
-              <a:effectRef idx="0">
-                <a:schemeClr val="accent1"/>
-              </a:effectRef>
-              <a:fontRef idx="minor">
-                <a:schemeClr val="lt1"/>
-              </a:fontRef>
-            </p:style>
-            <p:txBody>
-              <a:bodyPr rtlCol="0" anchor="ctr"/>
-              <a:lstStyle/>
-              <a:p>
-                <a:pPr algn="ctr"/>
-                <a:endParaRPr lang="en-US"/>
-              </a:p>
-            </p:txBody>
-          </p:sp>
-        </p:grpSp>
+            </a:ln>
+          </p:spPr>
+          <p:txBody>
+            <a:bodyPr wrap="square" rtlCol="0">
+              <a:spAutoFit/>
+            </a:bodyPr>
+            <a:lstStyle/>
+            <a:p>
+              <a:r>
+                <a:rPr lang="en-US" dirty="0"/>
+                <a:t>Preparation of data for a loop along each track with </a:t>
+              </a:r>
+            </a:p>
+          </p:txBody>
+        </p:sp>
+        <p:sp>
+          <p:nvSpPr>
+            <p:cNvPr id="96" name="Rectangle 95">
+              <a:extLst>
+                <a:ext uri="{FF2B5EF4-FFF2-40B4-BE49-F238E27FC236}">
+                  <a16:creationId xmlns:a16="http://schemas.microsoft.com/office/drawing/2014/main" id="{0FA5EE24-1F60-4331-9222-7464F8841C7F}"/>
+                </a:ext>
+              </a:extLst>
+            </p:cNvPr>
+            <p:cNvSpPr/>
+            <p:nvPr/>
+          </p:nvSpPr>
+          <p:spPr>
+            <a:xfrm>
+              <a:off x="2296817" y="4010083"/>
+              <a:ext cx="6271226" cy="382612"/>
+            </a:xfrm>
+            <a:prstGeom prst="rect">
+              <a:avLst/>
+            </a:prstGeom>
+            <a:noFill/>
+          </p:spPr>
+          <p:style>
+            <a:lnRef idx="2">
+              <a:schemeClr val="accent1">
+                <a:shade val="50000"/>
+              </a:schemeClr>
+            </a:lnRef>
+            <a:fillRef idx="1">
+              <a:schemeClr val="accent1"/>
+            </a:fillRef>
+            <a:effectRef idx="0">
+              <a:schemeClr val="accent1"/>
+            </a:effectRef>
+            <a:fontRef idx="minor">
+              <a:schemeClr val="lt1"/>
+            </a:fontRef>
+          </p:style>
+          <p:txBody>
+            <a:bodyPr rtlCol="0" anchor="ctr"/>
+            <a:lstStyle/>
+            <a:p>
+              <a:pPr algn="ctr"/>
+              <a:endParaRPr lang="en-US"/>
+            </a:p>
+          </p:txBody>
+        </p:sp>
         <p:grpSp>
           <p:nvGrpSpPr>
             <p:cNvPr id="102" name="Group 101">
@@ -9245,7 +9203,7 @@
         </p:nvSpPr>
         <p:spPr>
           <a:xfrm>
-            <a:off x="5656973" y="122896"/>
+            <a:off x="5787332" y="121953"/>
             <a:ext cx="6282970" cy="369332"/>
           </a:xfrm>
           <a:prstGeom prst="rect">
@@ -9269,12 +9227,59 @@
           </a:p>
         </p:txBody>
       </p:sp>
+      <p:sp>
+        <p:nvSpPr>
+          <p:cNvPr id="5" name="Flowchart: Process 4">
+            <a:extLst>
+              <a:ext uri="{FF2B5EF4-FFF2-40B4-BE49-F238E27FC236}">
+                <a16:creationId xmlns:a16="http://schemas.microsoft.com/office/drawing/2014/main" id="{8EDA70D8-07F6-46B3-861B-A29EC8F45534}"/>
+              </a:ext>
+            </a:extLst>
+          </p:cNvPr>
+          <p:cNvSpPr/>
+          <p:nvPr/>
+        </p:nvSpPr>
+        <p:spPr>
+          <a:xfrm>
+            <a:off x="217231" y="478718"/>
+            <a:ext cx="5376541" cy="2040519"/>
+          </a:xfrm>
+          <a:prstGeom prst="flowChartProcess">
+            <a:avLst/>
+          </a:prstGeom>
+          <a:noFill/>
+        </p:spPr>
+        <p:style>
+          <a:lnRef idx="2">
+            <a:schemeClr val="accent1">
+              <a:shade val="50000"/>
+            </a:schemeClr>
+          </a:lnRef>
+          <a:fillRef idx="1">
+            <a:schemeClr val="accent1"/>
+          </a:fillRef>
+          <a:effectRef idx="0">
+            <a:schemeClr val="accent1"/>
+          </a:effectRef>
+          <a:fontRef idx="minor">
+            <a:schemeClr val="lt1"/>
+          </a:fontRef>
+        </p:style>
+        <p:txBody>
+          <a:bodyPr rtlCol="0" anchor="ctr"/>
+          <a:lstStyle/>
+          <a:p>
+            <a:pPr algn="ctr"/>
+            <a:endParaRPr lang="en-US"/>
+          </a:p>
+        </p:txBody>
+      </p:sp>
       <p:grpSp>
         <p:nvGrpSpPr>
-          <p:cNvPr id="30" name="Group 29">
+          <p:cNvPr id="6" name="Group 5">
             <a:extLst>
               <a:ext uri="{FF2B5EF4-FFF2-40B4-BE49-F238E27FC236}">
-                <a16:creationId xmlns:a16="http://schemas.microsoft.com/office/drawing/2014/main" id="{3EE353B6-AAD5-406D-B731-30A03FD56415}"/>
+                <a16:creationId xmlns:a16="http://schemas.microsoft.com/office/drawing/2014/main" id="{C8CCF1CA-E5B5-474F-881A-230B1EE83059}"/>
               </a:ext>
             </a:extLst>
           </p:cNvPr>
@@ -9283,18 +9288,308 @@
         </p:nvGrpSpPr>
         <p:grpSpPr>
           <a:xfrm>
-            <a:off x="217231" y="478718"/>
-            <a:ext cx="5376541" cy="2655673"/>
-            <a:chOff x="126333" y="953636"/>
-            <a:chExt cx="5376541" cy="2655673"/>
+            <a:off x="299624" y="487912"/>
+            <a:ext cx="5254483" cy="2031325"/>
+            <a:chOff x="3790429" y="711512"/>
+            <a:chExt cx="5601821" cy="1649771"/>
           </a:xfrm>
         </p:grpSpPr>
         <p:sp>
           <p:nvSpPr>
-            <p:cNvPr id="5" name="Flowchart: Process 4">
+            <p:cNvPr id="7" name="TextBox 6">
               <a:extLst>
                 <a:ext uri="{FF2B5EF4-FFF2-40B4-BE49-F238E27FC236}">
-                  <a16:creationId xmlns:a16="http://schemas.microsoft.com/office/drawing/2014/main" id="{8EDA70D8-07F6-46B3-861B-A29EC8F45534}"/>
+                  <a16:creationId xmlns:a16="http://schemas.microsoft.com/office/drawing/2014/main" id="{235560C1-4098-4265-83FA-DF068F3A97C0}"/>
+                </a:ext>
+              </a:extLst>
+            </p:cNvPr>
+            <p:cNvSpPr txBox="1"/>
+            <p:nvPr/>
+          </p:nvSpPr>
+          <p:spPr>
+            <a:xfrm>
+              <a:off x="3790429" y="711512"/>
+              <a:ext cx="5601821" cy="1649771"/>
+            </a:xfrm>
+            <a:prstGeom prst="rect">
+              <a:avLst/>
+            </a:prstGeom>
+            <a:noFill/>
+          </p:spPr>
+          <p:txBody>
+            <a:bodyPr wrap="square" rtlCol="0">
+              <a:spAutoFit/>
+            </a:bodyPr>
+            <a:lstStyle/>
+            <a:p>
+              <a:r>
+                <a:rPr lang="en-US" dirty="0"/>
+                <a:t>                                  For each time step:</a:t>
+              </a:r>
+            </a:p>
+            <a:p>
+              <a:r>
+                <a:rPr lang="en-US" dirty="0"/>
+                <a:t>“Pull” electron with the time step         in the magnetic field;</a:t>
+              </a:r>
+            </a:p>
+            <a:p>
+              <a:r>
+                <a:rPr lang="en-US" dirty="0"/>
+                <a:t>“Pull” ion with the time step         in the drift gap;</a:t>
+              </a:r>
+            </a:p>
+            <a:p>
+              <a:r>
+                <a:rPr lang="en-US" dirty="0"/>
+                <a:t>Calculation of distance between electron and ion;</a:t>
+              </a:r>
+            </a:p>
+            <a:p>
+              <a:r>
+                <a:rPr lang="en-US" dirty="0"/>
+                <a:t>Calculation of the changing of momenta for ion and electron for the time step        .</a:t>
+              </a:r>
+            </a:p>
+          </p:txBody>
+        </p:sp>
+        <p:grpSp>
+          <p:nvGrpSpPr>
+            <p:cNvPr id="8" name="Group 7">
+              <a:extLst>
+                <a:ext uri="{FF2B5EF4-FFF2-40B4-BE49-F238E27FC236}">
+                  <a16:creationId xmlns:a16="http://schemas.microsoft.com/office/drawing/2014/main" id="{70EC1A6E-7F2E-4E2C-BB07-EFF49BA97098}"/>
+                </a:ext>
+              </a:extLst>
+            </p:cNvPr>
+            <p:cNvGrpSpPr/>
+            <p:nvPr/>
+          </p:nvGrpSpPr>
+          <p:grpSpPr>
+            <a:xfrm>
+              <a:off x="6454246" y="925056"/>
+              <a:ext cx="1200612" cy="1375668"/>
+              <a:chOff x="6454246" y="925056"/>
+              <a:chExt cx="1200612" cy="1375668"/>
+            </a:xfrm>
+          </p:grpSpPr>
+          <p:graphicFrame>
+            <p:nvGraphicFramePr>
+              <p:cNvPr id="9" name="Object 8">
+                <a:extLst>
+                  <a:ext uri="{FF2B5EF4-FFF2-40B4-BE49-F238E27FC236}">
+                    <a16:creationId xmlns:a16="http://schemas.microsoft.com/office/drawing/2014/main" id="{512CDA0E-6C4C-4CF3-847B-EED676320993}"/>
+                  </a:ext>
+                </a:extLst>
+              </p:cNvPr>
+              <p:cNvGraphicFramePr>
+                <a:graphicFrameLocks noChangeAspect="1"/>
+              </p:cNvGraphicFramePr>
+              <p:nvPr>
+                <p:extLst>
+                  <p:ext uri="{D42A27DB-BD31-4B8C-83A1-F6EECF244321}">
+                    <p14:modId xmlns:p14="http://schemas.microsoft.com/office/powerpoint/2010/main" val="1534142624"/>
+                  </p:ext>
+                </p:extLst>
+              </p:nvPr>
+            </p:nvGraphicFramePr>
+            <p:xfrm>
+              <a:off x="6732340" y="1399689"/>
+              <a:ext cx="416340" cy="248090"/>
+            </p:xfrm>
+            <a:graphic>
+              <a:graphicData uri="http://schemas.openxmlformats.org/presentationml/2006/ole">
+                <mc:AlternateContent xmlns:mc="http://schemas.openxmlformats.org/markup-compatibility/2006">
+                  <mc:Choice xmlns:v="urn:schemas-microsoft-com:vml" Requires="v">
+                    <p:oleObj spid="_x0000_s4309" name="Equation" r:id="rId3" imgW="241200" imgH="164880" progId="Equation.DSMT4">
+                      <p:embed/>
+                    </p:oleObj>
+                  </mc:Choice>
+                  <mc:Fallback>
+                    <p:oleObj name="Equation" r:id="rId3" imgW="241200" imgH="164880" progId="Equation.DSMT4">
+                      <p:embed/>
+                      <p:pic>
+                        <p:nvPicPr>
+                          <p:cNvPr id="27" name="Object 26"/>
+                          <p:cNvPicPr/>
+                          <p:nvPr/>
+                        </p:nvPicPr>
+                        <p:blipFill>
+                          <a:blip r:embed="rId4"/>
+                          <a:stretch>
+                            <a:fillRect/>
+                          </a:stretch>
+                        </p:blipFill>
+                        <p:spPr>
+                          <a:xfrm>
+                            <a:off x="6732340" y="1399689"/>
+                            <a:ext cx="416340" cy="248090"/>
+                          </a:xfrm>
+                          <a:prstGeom prst="rect">
+                            <a:avLst/>
+                          </a:prstGeom>
+                        </p:spPr>
+                      </p:pic>
+                    </p:oleObj>
+                  </mc:Fallback>
+                </mc:AlternateContent>
+              </a:graphicData>
+            </a:graphic>
+          </p:graphicFrame>
+          <p:graphicFrame>
+            <p:nvGraphicFramePr>
+              <p:cNvPr id="10" name="Object 9">
+                <a:extLst>
+                  <a:ext uri="{FF2B5EF4-FFF2-40B4-BE49-F238E27FC236}">
+                    <a16:creationId xmlns:a16="http://schemas.microsoft.com/office/drawing/2014/main" id="{4242D80A-E46A-4E6B-BCA2-20D3F9A37E06}"/>
+                  </a:ext>
+                </a:extLst>
+              </p:cNvPr>
+              <p:cNvGraphicFramePr>
+                <a:graphicFrameLocks noChangeAspect="1"/>
+              </p:cNvGraphicFramePr>
+              <p:nvPr>
+                <p:extLst>
+                  <p:ext uri="{D42A27DB-BD31-4B8C-83A1-F6EECF244321}">
+                    <p14:modId xmlns:p14="http://schemas.microsoft.com/office/powerpoint/2010/main" val="441752758"/>
+                  </p:ext>
+                </p:extLst>
+              </p:nvPr>
+            </p:nvGraphicFramePr>
+            <p:xfrm>
+              <a:off x="7240210" y="925056"/>
+              <a:ext cx="414648" cy="284162"/>
+            </p:xfrm>
+            <a:graphic>
+              <a:graphicData uri="http://schemas.openxmlformats.org/presentationml/2006/ole">
+                <mc:AlternateContent xmlns:mc="http://schemas.openxmlformats.org/markup-compatibility/2006">
+                  <mc:Choice xmlns:v="urn:schemas-microsoft-com:vml" Requires="v">
+                    <p:oleObj spid="_x0000_s4310" name="Equation" r:id="rId5" imgW="241200" imgH="164880" progId="Equation.DSMT4">
+                      <p:embed/>
+                    </p:oleObj>
+                  </mc:Choice>
+                  <mc:Fallback>
+                    <p:oleObj name="Equation" r:id="rId5" imgW="241200" imgH="164880" progId="Equation.DSMT4">
+                      <p:embed/>
+                      <p:pic>
+                        <p:nvPicPr>
+                          <p:cNvPr id="28" name="Object 27"/>
+                          <p:cNvPicPr/>
+                          <p:nvPr/>
+                        </p:nvPicPr>
+                        <p:blipFill>
+                          <a:blip r:embed="rId6"/>
+                          <a:stretch>
+                            <a:fillRect/>
+                          </a:stretch>
+                        </p:blipFill>
+                        <p:spPr>
+                          <a:xfrm>
+                            <a:off x="7240210" y="925056"/>
+                            <a:ext cx="414648" cy="284162"/>
+                          </a:xfrm>
+                          <a:prstGeom prst="rect">
+                            <a:avLst/>
+                          </a:prstGeom>
+                        </p:spPr>
+                      </p:pic>
+                    </p:oleObj>
+                  </mc:Fallback>
+                </mc:AlternateContent>
+              </a:graphicData>
+            </a:graphic>
+          </p:graphicFrame>
+          <p:graphicFrame>
+            <p:nvGraphicFramePr>
+              <p:cNvPr id="13" name="Object 12">
+                <a:extLst>
+                  <a:ext uri="{FF2B5EF4-FFF2-40B4-BE49-F238E27FC236}">
+                    <a16:creationId xmlns:a16="http://schemas.microsoft.com/office/drawing/2014/main" id="{4C969482-EF8C-41AD-B4FD-7571907FAA99}"/>
+                  </a:ext>
+                </a:extLst>
+              </p:cNvPr>
+              <p:cNvGraphicFramePr>
+                <a:graphicFrameLocks noChangeAspect="1"/>
+              </p:cNvGraphicFramePr>
+              <p:nvPr>
+                <p:extLst>
+                  <p:ext uri="{D42A27DB-BD31-4B8C-83A1-F6EECF244321}">
+                    <p14:modId xmlns:p14="http://schemas.microsoft.com/office/powerpoint/2010/main" val="3726712269"/>
+                  </p:ext>
+                </p:extLst>
+              </p:nvPr>
+            </p:nvGraphicFramePr>
+            <p:xfrm>
+              <a:off x="6454246" y="2016561"/>
+              <a:ext cx="414647" cy="284163"/>
+            </p:xfrm>
+            <a:graphic>
+              <a:graphicData uri="http://schemas.openxmlformats.org/presentationml/2006/ole">
+                <mc:AlternateContent xmlns:mc="http://schemas.openxmlformats.org/markup-compatibility/2006">
+                  <mc:Choice xmlns:v="urn:schemas-microsoft-com:vml" Requires="v">
+                    <p:oleObj spid="_x0000_s4311" name="Equation" r:id="rId7" imgW="241200" imgH="164880" progId="Equation.DSMT4">
+                      <p:embed/>
+                    </p:oleObj>
+                  </mc:Choice>
+                  <mc:Fallback>
+                    <p:oleObj name="Equation" r:id="rId7" imgW="241200" imgH="164880" progId="Equation.DSMT4">
+                      <p:embed/>
+                      <p:pic>
+                        <p:nvPicPr>
+                          <p:cNvPr id="32" name="Object 31"/>
+                          <p:cNvPicPr/>
+                          <p:nvPr/>
+                        </p:nvPicPr>
+                        <p:blipFill>
+                          <a:blip r:embed="rId8"/>
+                          <a:stretch>
+                            <a:fillRect/>
+                          </a:stretch>
+                        </p:blipFill>
+                        <p:spPr>
+                          <a:xfrm>
+                            <a:off x="6454246" y="2016561"/>
+                            <a:ext cx="414647" cy="284163"/>
+                          </a:xfrm>
+                          <a:prstGeom prst="rect">
+                            <a:avLst/>
+                          </a:prstGeom>
+                        </p:spPr>
+                      </p:pic>
+                    </p:oleObj>
+                  </mc:Fallback>
+                </mc:AlternateContent>
+              </a:graphicData>
+            </a:graphic>
+          </p:graphicFrame>
+        </p:grpSp>
+      </p:grpSp>
+      <p:grpSp>
+        <p:nvGrpSpPr>
+          <p:cNvPr id="4" name="Group 3">
+            <a:extLst>
+              <a:ext uri="{FF2B5EF4-FFF2-40B4-BE49-F238E27FC236}">
+                <a16:creationId xmlns:a16="http://schemas.microsoft.com/office/drawing/2014/main" id="{ABD6E19D-7783-4DF2-8D95-8F976FDD8C30}"/>
+              </a:ext>
+            </a:extLst>
+          </p:cNvPr>
+          <p:cNvGrpSpPr/>
+          <p:nvPr/>
+        </p:nvGrpSpPr>
+        <p:grpSpPr>
+          <a:xfrm>
+            <a:off x="5946708" y="512634"/>
+            <a:ext cx="5376541" cy="2308324"/>
+            <a:chOff x="5946708" y="512634"/>
+            <a:chExt cx="5376541" cy="2308324"/>
+          </a:xfrm>
+        </p:grpSpPr>
+        <p:sp>
+          <p:nvSpPr>
+            <p:cNvPr id="32" name="Flowchart: Process 31">
+              <a:extLst>
+                <a:ext uri="{FF2B5EF4-FFF2-40B4-BE49-F238E27FC236}">
+                  <a16:creationId xmlns:a16="http://schemas.microsoft.com/office/drawing/2014/main" id="{B6B4C185-D9B4-4C62-ABF3-C1FBEB9E7463}"/>
                 </a:ext>
               </a:extLst>
             </p:cNvPr>
@@ -9303,8 +9598,8 @@
           </p:nvSpPr>
           <p:spPr>
             <a:xfrm>
-              <a:off x="126333" y="953636"/>
-              <a:ext cx="5376541" cy="2655673"/>
+              <a:off x="5946708" y="512634"/>
+              <a:ext cx="5376541" cy="2006603"/>
             </a:xfrm>
             <a:prstGeom prst="flowChartProcess">
               <a:avLst/>
@@ -9336,12 +9631,80 @@
             </a:p>
           </p:txBody>
         </p:sp>
+        <p:sp>
+          <p:nvSpPr>
+            <p:cNvPr id="34" name="TextBox 33">
+              <a:extLst>
+                <a:ext uri="{FF2B5EF4-FFF2-40B4-BE49-F238E27FC236}">
+                  <a16:creationId xmlns:a16="http://schemas.microsoft.com/office/drawing/2014/main" id="{09DE73E1-2FC5-4694-83EA-935D377FEE77}"/>
+                </a:ext>
+              </a:extLst>
+            </p:cNvPr>
+            <p:cNvSpPr txBox="1"/>
+            <p:nvPr/>
+          </p:nvSpPr>
+          <p:spPr>
+            <a:xfrm>
+              <a:off x="6007736" y="512634"/>
+              <a:ext cx="5254483" cy="2308324"/>
+            </a:xfrm>
+            <a:prstGeom prst="rect">
+              <a:avLst/>
+            </a:prstGeom>
+            <a:noFill/>
+          </p:spPr>
+          <p:txBody>
+            <a:bodyPr wrap="square" rtlCol="0">
+              <a:spAutoFit/>
+            </a:bodyPr>
+            <a:lstStyle/>
+            <a:p>
+              <a:r>
+                <a:rPr lang="en-US" dirty="0"/>
+                <a:t>                                  For each time step:</a:t>
+              </a:r>
+            </a:p>
+            <a:p>
+              <a:r>
+                <a:rPr lang="en-US" dirty="0"/>
+                <a:t>“Pull” electron with the time step                 in the gcs;</a:t>
+              </a:r>
+            </a:p>
+            <a:p>
+              <a:r>
+                <a:rPr lang="en-US" dirty="0"/>
+                <a:t>“Pull” ion with the time step                in the drift gap;</a:t>
+              </a:r>
+            </a:p>
+            <a:p>
+              <a:r>
+                <a:rPr lang="en-US" dirty="0"/>
+                <a:t>Calculation of the changing of momenta for ion and electron for the time step            in the gcs;</a:t>
+              </a:r>
+            </a:p>
+            <a:p>
+              <a:r>
+                <a:rPr lang="en-US" dirty="0"/>
+                <a:t>“Pull” electron with the time step                 in the gcs;</a:t>
+              </a:r>
+            </a:p>
+            <a:p>
+              <a:r>
+                <a:rPr lang="en-US" dirty="0"/>
+                <a:t>“Pull” ion with the time step                 in the drift gap.</a:t>
+              </a:r>
+            </a:p>
+            <a:p>
+              <a:endParaRPr lang="en-US" dirty="0"/>
+            </a:p>
+          </p:txBody>
+        </p:sp>
         <p:grpSp>
           <p:nvGrpSpPr>
-            <p:cNvPr id="6" name="Group 5">
+            <p:cNvPr id="35" name="Group 34">
               <a:extLst>
                 <a:ext uri="{FF2B5EF4-FFF2-40B4-BE49-F238E27FC236}">
-                  <a16:creationId xmlns:a16="http://schemas.microsoft.com/office/drawing/2014/main" id="{C8CCF1CA-E5B5-474F-881A-230B1EE83059}"/>
+                  <a16:creationId xmlns:a16="http://schemas.microsoft.com/office/drawing/2014/main" id="{9635FD26-44AF-483D-BB61-B463E6CFE4E4}"/>
                 </a:ext>
               </a:extLst>
             </p:cNvPr>
@@ -9350,818 +9713,359 @@
           </p:nvGrpSpPr>
           <p:grpSpPr>
             <a:xfrm>
-              <a:off x="208726" y="962830"/>
-              <a:ext cx="5254483" cy="2585323"/>
-              <a:chOff x="3790429" y="711512"/>
-              <a:chExt cx="5601821" cy="2099709"/>
+              <a:off x="8539880" y="775566"/>
+              <a:ext cx="1430281" cy="1144755"/>
+              <a:chOff x="6467179" y="917589"/>
+              <a:chExt cx="1524827" cy="929730"/>
             </a:xfrm>
           </p:grpSpPr>
-          <p:sp>
-            <p:nvSpPr>
-              <p:cNvPr id="7" name="TextBox 6">
+          <p:graphicFrame>
+            <p:nvGraphicFramePr>
+              <p:cNvPr id="36" name="Object 35">
                 <a:extLst>
                   <a:ext uri="{FF2B5EF4-FFF2-40B4-BE49-F238E27FC236}">
-                    <a16:creationId xmlns:a16="http://schemas.microsoft.com/office/drawing/2014/main" id="{235560C1-4098-4265-83FA-DF068F3A97C0}"/>
+                    <a16:creationId xmlns:a16="http://schemas.microsoft.com/office/drawing/2014/main" id="{D3843BB1-4C84-4A4C-82CA-34C908E82943}"/>
                   </a:ext>
                 </a:extLst>
               </p:cNvPr>
-              <p:cNvSpPr txBox="1"/>
-              <p:nvPr/>
-            </p:nvSpPr>
-            <p:spPr>
-              <a:xfrm>
-                <a:off x="3790429" y="711512"/>
-                <a:ext cx="5601821" cy="2099709"/>
-              </a:xfrm>
-              <a:prstGeom prst="rect">
-                <a:avLst/>
-              </a:prstGeom>
-              <a:noFill/>
-            </p:spPr>
-            <p:txBody>
-              <a:bodyPr wrap="square" rtlCol="0">
-                <a:spAutoFit/>
-              </a:bodyPr>
-              <a:lstStyle/>
-              <a:p>
-                <a:r>
-                  <a:rPr lang="en-US" dirty="0"/>
-                  <a:t>                                  For each time step:</a:t>
-                </a:r>
-              </a:p>
-              <a:p>
-                <a:r>
-                  <a:rPr lang="en-US" dirty="0"/>
-                  <a:t>“Pull” electron with the time step         in the magnetic field;</a:t>
-                </a:r>
-              </a:p>
-              <a:p>
-                <a:r>
-                  <a:rPr lang="en-US" dirty="0"/>
-                  <a:t>“Pull” ion with the time step         in the drift gap;</a:t>
-                </a:r>
-              </a:p>
-              <a:p>
-                <a:r>
-                  <a:rPr lang="en-US" dirty="0"/>
-                  <a:t>Calculation of distance between electron and ion;</a:t>
-                </a:r>
-              </a:p>
-              <a:p>
-                <a:r>
-                  <a:rPr lang="en-US" dirty="0"/>
-                  <a:t>Calculation of the changing of momenta for ion and electron for the time step        ;</a:t>
-                </a:r>
-              </a:p>
-              <a:p>
-                <a:r>
-                  <a:rPr lang="en-US" dirty="0"/>
-                  <a:t>Change in the ion and electron momenta  for this time step.</a:t>
-                </a:r>
-              </a:p>
-            </p:txBody>
-          </p:sp>
-          <p:grpSp>
-            <p:nvGrpSpPr>
-              <p:cNvPr id="8" name="Group 7">
+              <p:cNvGraphicFramePr>
+                <a:graphicFrameLocks noChangeAspect="1"/>
+              </p:cNvGraphicFramePr>
+              <p:nvPr>
+                <p:extLst>
+                  <p:ext uri="{D42A27DB-BD31-4B8C-83A1-F6EECF244321}">
+                    <p14:modId xmlns:p14="http://schemas.microsoft.com/office/powerpoint/2010/main" val="608722221"/>
+                  </p:ext>
+                </p:extLst>
+              </p:nvPr>
+            </p:nvGraphicFramePr>
+            <p:xfrm>
+              <a:off x="6759659" y="1183524"/>
+              <a:ext cx="722672" cy="268177"/>
+            </p:xfrm>
+            <a:graphic>
+              <a:graphicData uri="http://schemas.openxmlformats.org/presentationml/2006/ole">
+                <mc:AlternateContent xmlns:mc="http://schemas.openxmlformats.org/markup-compatibility/2006">
+                  <mc:Choice xmlns:v="urn:schemas-microsoft-com:vml" Requires="v">
+                    <p:oleObj spid="_x0000_s4312" name="Equation" r:id="rId9" imgW="419040" imgH="177480" progId="Equation.DSMT4">
+                      <p:embed/>
+                    </p:oleObj>
+                  </mc:Choice>
+                  <mc:Fallback>
+                    <p:oleObj name="Equation" r:id="rId9" imgW="419040" imgH="177480" progId="Equation.DSMT4">
+                      <p:embed/>
+                      <p:pic>
+                        <p:nvPicPr>
+                          <p:cNvPr id="9" name="Object 8">
+                            <a:extLst>
+                              <a:ext uri="{FF2B5EF4-FFF2-40B4-BE49-F238E27FC236}">
+                                <a16:creationId xmlns:a16="http://schemas.microsoft.com/office/drawing/2014/main" id="{512CDA0E-6C4C-4CF3-847B-EED676320993}"/>
+                              </a:ext>
+                            </a:extLst>
+                          </p:cNvPr>
+                          <p:cNvPicPr/>
+                          <p:nvPr/>
+                        </p:nvPicPr>
+                        <p:blipFill>
+                          <a:blip r:embed="rId10"/>
+                          <a:stretch>
+                            <a:fillRect/>
+                          </a:stretch>
+                        </p:blipFill>
+                        <p:spPr>
+                          <a:xfrm>
+                            <a:off x="6759659" y="1183524"/>
+                            <a:ext cx="722672" cy="268177"/>
+                          </a:xfrm>
+                          <a:prstGeom prst="rect">
+                            <a:avLst/>
+                          </a:prstGeom>
+                        </p:spPr>
+                      </p:pic>
+                    </p:oleObj>
+                  </mc:Fallback>
+                </mc:AlternateContent>
+              </a:graphicData>
+            </a:graphic>
+          </p:graphicFrame>
+          <p:graphicFrame>
+            <p:nvGraphicFramePr>
+              <p:cNvPr id="37" name="Object 36">
                 <a:extLst>
                   <a:ext uri="{FF2B5EF4-FFF2-40B4-BE49-F238E27FC236}">
-                    <a16:creationId xmlns:a16="http://schemas.microsoft.com/office/drawing/2014/main" id="{70EC1A6E-7F2E-4E2C-BB07-EFF49BA97098}"/>
+                    <a16:creationId xmlns:a16="http://schemas.microsoft.com/office/drawing/2014/main" id="{CDBABE97-50BD-420C-A3E0-D82A99296831}"/>
                   </a:ext>
                 </a:extLst>
               </p:cNvPr>
-              <p:cNvGrpSpPr/>
-              <p:nvPr/>
-            </p:nvGrpSpPr>
-            <p:grpSpPr>
-              <a:xfrm>
-                <a:off x="6454246" y="925056"/>
-                <a:ext cx="1200612" cy="1375668"/>
-                <a:chOff x="6454246" y="925056"/>
-                <a:chExt cx="1200612" cy="1375668"/>
-              </a:xfrm>
-            </p:grpSpPr>
-            <p:graphicFrame>
-              <p:nvGraphicFramePr>
-                <p:cNvPr id="9" name="Object 8">
-                  <a:extLst>
-                    <a:ext uri="{FF2B5EF4-FFF2-40B4-BE49-F238E27FC236}">
-                      <a16:creationId xmlns:a16="http://schemas.microsoft.com/office/drawing/2014/main" id="{512CDA0E-6C4C-4CF3-847B-EED676320993}"/>
-                    </a:ext>
-                  </a:extLst>
-                </p:cNvPr>
-                <p:cNvGraphicFramePr>
-                  <a:graphicFrameLocks noChangeAspect="1"/>
-                </p:cNvGraphicFramePr>
-                <p:nvPr>
-                  <p:extLst>
-                    <p:ext uri="{D42A27DB-BD31-4B8C-83A1-F6EECF244321}">
-                      <p14:modId xmlns:p14="http://schemas.microsoft.com/office/powerpoint/2010/main" val="1534142624"/>
-                    </p:ext>
-                  </p:extLst>
-                </p:nvPr>
-              </p:nvGraphicFramePr>
-              <p:xfrm>
-                <a:off x="6732340" y="1399689"/>
-                <a:ext cx="416340" cy="248090"/>
-              </p:xfrm>
-              <a:graphic>
-                <a:graphicData uri="http://schemas.openxmlformats.org/presentationml/2006/ole">
-                  <mc:AlternateContent xmlns:mc="http://schemas.openxmlformats.org/markup-compatibility/2006">
-                    <mc:Choice xmlns:v="urn:schemas-microsoft-com:vml" Requires="v">
-                      <p:oleObj spid="_x0000_s4261" name="Equation" r:id="rId3" imgW="241200" imgH="164880" progId="Equation.DSMT4">
-                        <p:embed/>
-                      </p:oleObj>
-                    </mc:Choice>
-                    <mc:Fallback>
-                      <p:oleObj name="Equation" r:id="rId3" imgW="241200" imgH="164880" progId="Equation.DSMT4">
-                        <p:embed/>
-                        <p:pic>
-                          <p:nvPicPr>
-                            <p:cNvPr id="27" name="Object 26"/>
-                            <p:cNvPicPr/>
-                            <p:nvPr/>
-                          </p:nvPicPr>
-                          <p:blipFill>
-                            <a:blip r:embed="rId4"/>
-                            <a:stretch>
-                              <a:fillRect/>
-                            </a:stretch>
-                          </p:blipFill>
-                          <p:spPr>
-                            <a:xfrm>
-                              <a:off x="6732340" y="1399689"/>
-                              <a:ext cx="416340" cy="248090"/>
-                            </a:xfrm>
-                            <a:prstGeom prst="rect">
-                              <a:avLst/>
-                            </a:prstGeom>
-                          </p:spPr>
-                        </p:pic>
-                      </p:oleObj>
-                    </mc:Fallback>
-                  </mc:AlternateContent>
-                </a:graphicData>
-              </a:graphic>
-            </p:graphicFrame>
-            <p:graphicFrame>
-              <p:nvGraphicFramePr>
-                <p:cNvPr id="10" name="Object 9">
-                  <a:extLst>
-                    <a:ext uri="{FF2B5EF4-FFF2-40B4-BE49-F238E27FC236}">
-                      <a16:creationId xmlns:a16="http://schemas.microsoft.com/office/drawing/2014/main" id="{4242D80A-E46A-4E6B-BCA2-20D3F9A37E06}"/>
-                    </a:ext>
-                  </a:extLst>
-                </p:cNvPr>
-                <p:cNvGraphicFramePr>
-                  <a:graphicFrameLocks noChangeAspect="1"/>
-                </p:cNvGraphicFramePr>
-                <p:nvPr>
-                  <p:extLst>
-                    <p:ext uri="{D42A27DB-BD31-4B8C-83A1-F6EECF244321}">
-                      <p14:modId xmlns:p14="http://schemas.microsoft.com/office/powerpoint/2010/main" val="441752758"/>
-                    </p:ext>
-                  </p:extLst>
-                </p:nvPr>
-              </p:nvGraphicFramePr>
-              <p:xfrm>
-                <a:off x="7240210" y="925056"/>
-                <a:ext cx="414648" cy="284162"/>
-              </p:xfrm>
-              <a:graphic>
-                <a:graphicData uri="http://schemas.openxmlformats.org/presentationml/2006/ole">
-                  <mc:AlternateContent xmlns:mc="http://schemas.openxmlformats.org/markup-compatibility/2006">
-                    <mc:Choice xmlns:v="urn:schemas-microsoft-com:vml" Requires="v">
-                      <p:oleObj spid="_x0000_s4262" name="Equation" r:id="rId5" imgW="241200" imgH="164880" progId="Equation.DSMT4">
-                        <p:embed/>
-                      </p:oleObj>
-                    </mc:Choice>
-                    <mc:Fallback>
-                      <p:oleObj name="Equation" r:id="rId5" imgW="241200" imgH="164880" progId="Equation.DSMT4">
-                        <p:embed/>
-                        <p:pic>
-                          <p:nvPicPr>
-                            <p:cNvPr id="28" name="Object 27"/>
-                            <p:cNvPicPr/>
-                            <p:nvPr/>
-                          </p:nvPicPr>
-                          <p:blipFill>
-                            <a:blip r:embed="rId6"/>
-                            <a:stretch>
-                              <a:fillRect/>
-                            </a:stretch>
-                          </p:blipFill>
-                          <p:spPr>
-                            <a:xfrm>
-                              <a:off x="7240210" y="925056"/>
-                              <a:ext cx="414648" cy="284162"/>
-                            </a:xfrm>
-                            <a:prstGeom prst="rect">
-                              <a:avLst/>
-                            </a:prstGeom>
-                          </p:spPr>
-                        </p:pic>
-                      </p:oleObj>
-                    </mc:Fallback>
-                  </mc:AlternateContent>
-                </a:graphicData>
-              </a:graphic>
-            </p:graphicFrame>
-            <p:graphicFrame>
-              <p:nvGraphicFramePr>
-                <p:cNvPr id="13" name="Object 12">
-                  <a:extLst>
-                    <a:ext uri="{FF2B5EF4-FFF2-40B4-BE49-F238E27FC236}">
-                      <a16:creationId xmlns:a16="http://schemas.microsoft.com/office/drawing/2014/main" id="{4C969482-EF8C-41AD-B4FD-7571907FAA99}"/>
-                    </a:ext>
-                  </a:extLst>
-                </p:cNvPr>
-                <p:cNvGraphicFramePr>
-                  <a:graphicFrameLocks noChangeAspect="1"/>
-                </p:cNvGraphicFramePr>
-                <p:nvPr>
-                  <p:extLst>
-                    <p:ext uri="{D42A27DB-BD31-4B8C-83A1-F6EECF244321}">
-                      <p14:modId xmlns:p14="http://schemas.microsoft.com/office/powerpoint/2010/main" val="3726712269"/>
-                    </p:ext>
-                  </p:extLst>
-                </p:nvPr>
-              </p:nvGraphicFramePr>
-              <p:xfrm>
-                <a:off x="6454246" y="2016561"/>
-                <a:ext cx="414647" cy="284163"/>
-              </p:xfrm>
-              <a:graphic>
-                <a:graphicData uri="http://schemas.openxmlformats.org/presentationml/2006/ole">
-                  <mc:AlternateContent xmlns:mc="http://schemas.openxmlformats.org/markup-compatibility/2006">
-                    <mc:Choice xmlns:v="urn:schemas-microsoft-com:vml" Requires="v">
-                      <p:oleObj spid="_x0000_s4263" name="Equation" r:id="rId7" imgW="241200" imgH="164880" progId="Equation.DSMT4">
-                        <p:embed/>
-                      </p:oleObj>
-                    </mc:Choice>
-                    <mc:Fallback>
-                      <p:oleObj name="Equation" r:id="rId7" imgW="241200" imgH="164880" progId="Equation.DSMT4">
-                        <p:embed/>
-                        <p:pic>
-                          <p:nvPicPr>
-                            <p:cNvPr id="32" name="Object 31"/>
-                            <p:cNvPicPr/>
-                            <p:nvPr/>
-                          </p:nvPicPr>
-                          <p:blipFill>
-                            <a:blip r:embed="rId8"/>
-                            <a:stretch>
-                              <a:fillRect/>
-                            </a:stretch>
-                          </p:blipFill>
-                          <p:spPr>
-                            <a:xfrm>
-                              <a:off x="6454246" y="2016561"/>
-                              <a:ext cx="414647" cy="284163"/>
-                            </a:xfrm>
-                            <a:prstGeom prst="rect">
-                              <a:avLst/>
-                            </a:prstGeom>
-                          </p:spPr>
-                        </p:pic>
-                      </p:oleObj>
-                    </mc:Fallback>
-                  </mc:AlternateContent>
-                </a:graphicData>
-              </a:graphic>
-            </p:graphicFrame>
-          </p:grpSp>
+              <p:cNvGraphicFramePr>
+                <a:graphicFrameLocks noChangeAspect="1"/>
+              </p:cNvGraphicFramePr>
+              <p:nvPr>
+                <p:extLst>
+                  <p:ext uri="{D42A27DB-BD31-4B8C-83A1-F6EECF244321}">
+                    <p14:modId xmlns:p14="http://schemas.microsoft.com/office/powerpoint/2010/main" val="3082187056"/>
+                  </p:ext>
+                </p:extLst>
+              </p:nvPr>
+            </p:nvGraphicFramePr>
+            <p:xfrm>
+              <a:off x="7272719" y="917589"/>
+              <a:ext cx="719287" cy="305567"/>
+            </p:xfrm>
+            <a:graphic>
+              <a:graphicData uri="http://schemas.openxmlformats.org/presentationml/2006/ole">
+                <mc:AlternateContent xmlns:mc="http://schemas.openxmlformats.org/markup-compatibility/2006">
+                  <mc:Choice xmlns:v="urn:schemas-microsoft-com:vml" Requires="v">
+                    <p:oleObj spid="_x0000_s4313" name="Equation" r:id="rId11" imgW="419040" imgH="177480" progId="Equation.DSMT4">
+                      <p:embed/>
+                    </p:oleObj>
+                  </mc:Choice>
+                  <mc:Fallback>
+                    <p:oleObj name="Equation" r:id="rId11" imgW="419040" imgH="177480" progId="Equation.DSMT4">
+                      <p:embed/>
+                      <p:pic>
+                        <p:nvPicPr>
+                          <p:cNvPr id="10" name="Object 9">
+                            <a:extLst>
+                              <a:ext uri="{FF2B5EF4-FFF2-40B4-BE49-F238E27FC236}">
+                                <a16:creationId xmlns:a16="http://schemas.microsoft.com/office/drawing/2014/main" id="{4242D80A-E46A-4E6B-BCA2-20D3F9A37E06}"/>
+                              </a:ext>
+                            </a:extLst>
+                          </p:cNvPr>
+                          <p:cNvPicPr/>
+                          <p:nvPr/>
+                        </p:nvPicPr>
+                        <p:blipFill>
+                          <a:blip r:embed="rId12"/>
+                          <a:stretch>
+                            <a:fillRect/>
+                          </a:stretch>
+                        </p:blipFill>
+                        <p:spPr>
+                          <a:xfrm>
+                            <a:off x="7272719" y="917589"/>
+                            <a:ext cx="719287" cy="305567"/>
+                          </a:xfrm>
+                          <a:prstGeom prst="rect">
+                            <a:avLst/>
+                          </a:prstGeom>
+                        </p:spPr>
+                      </p:pic>
+                    </p:oleObj>
+                  </mc:Fallback>
+                </mc:AlternateContent>
+              </a:graphicData>
+            </a:graphic>
+          </p:graphicFrame>
+          <p:graphicFrame>
+            <p:nvGraphicFramePr>
+              <p:cNvPr id="38" name="Object 37">
+                <a:extLst>
+                  <a:ext uri="{FF2B5EF4-FFF2-40B4-BE49-F238E27FC236}">
+                    <a16:creationId xmlns:a16="http://schemas.microsoft.com/office/drawing/2014/main" id="{98BC38E8-0BAA-4211-A772-56C6BD08EB04}"/>
+                  </a:ext>
+                </a:extLst>
+              </p:cNvPr>
+              <p:cNvGraphicFramePr>
+                <a:graphicFrameLocks noChangeAspect="1"/>
+              </p:cNvGraphicFramePr>
+              <p:nvPr>
+                <p:extLst>
+                  <p:ext uri="{D42A27DB-BD31-4B8C-83A1-F6EECF244321}">
+                    <p14:modId xmlns:p14="http://schemas.microsoft.com/office/powerpoint/2010/main" val="1963028012"/>
+                  </p:ext>
+                </p:extLst>
+              </p:nvPr>
+            </p:nvGraphicFramePr>
+            <p:xfrm>
+              <a:off x="6467179" y="1563156"/>
+              <a:ext cx="414647" cy="284163"/>
+            </p:xfrm>
+            <a:graphic>
+              <a:graphicData uri="http://schemas.openxmlformats.org/presentationml/2006/ole">
+                <mc:AlternateContent xmlns:mc="http://schemas.openxmlformats.org/markup-compatibility/2006">
+                  <mc:Choice xmlns:v="urn:schemas-microsoft-com:vml" Requires="v">
+                    <p:oleObj spid="_x0000_s4314" name="Equation" r:id="rId13" imgW="241200" imgH="164880" progId="Equation.DSMT4">
+                      <p:embed/>
+                    </p:oleObj>
+                  </mc:Choice>
+                  <mc:Fallback>
+                    <p:oleObj name="Equation" r:id="rId13" imgW="241200" imgH="164880" progId="Equation.DSMT4">
+                      <p:embed/>
+                      <p:pic>
+                        <p:nvPicPr>
+                          <p:cNvPr id="13" name="Object 12">
+                            <a:extLst>
+                              <a:ext uri="{FF2B5EF4-FFF2-40B4-BE49-F238E27FC236}">
+                                <a16:creationId xmlns:a16="http://schemas.microsoft.com/office/drawing/2014/main" id="{4C969482-EF8C-41AD-B4FD-7571907FAA99}"/>
+                              </a:ext>
+                            </a:extLst>
+                          </p:cNvPr>
+                          <p:cNvPicPr/>
+                          <p:nvPr/>
+                        </p:nvPicPr>
+                        <p:blipFill>
+                          <a:blip r:embed="rId14"/>
+                          <a:stretch>
+                            <a:fillRect/>
+                          </a:stretch>
+                        </p:blipFill>
+                        <p:spPr>
+                          <a:xfrm>
+                            <a:off x="6467179" y="1563156"/>
+                            <a:ext cx="414647" cy="284163"/>
+                          </a:xfrm>
+                          <a:prstGeom prst="rect">
+                            <a:avLst/>
+                          </a:prstGeom>
+                        </p:spPr>
+                      </p:pic>
+                    </p:oleObj>
+                  </mc:Fallback>
+                </mc:AlternateContent>
+              </a:graphicData>
+            </a:graphic>
+          </p:graphicFrame>
         </p:grpSp>
-      </p:grpSp>
-      <p:grpSp>
-        <p:nvGrpSpPr>
-          <p:cNvPr id="31" name="Group 30">
-            <a:extLst>
-              <a:ext uri="{FF2B5EF4-FFF2-40B4-BE49-F238E27FC236}">
-                <a16:creationId xmlns:a16="http://schemas.microsoft.com/office/drawing/2014/main" id="{CA6E6B28-D9DB-4FBA-966B-17A31880526E}"/>
-              </a:ext>
-            </a:extLst>
-          </p:cNvPr>
-          <p:cNvGrpSpPr/>
-          <p:nvPr/>
-        </p:nvGrpSpPr>
-        <p:grpSpPr>
-          <a:xfrm>
-            <a:off x="5946708" y="512634"/>
-            <a:ext cx="5376541" cy="2862322"/>
-            <a:chOff x="126333" y="953636"/>
-            <a:chExt cx="5376541" cy="2862322"/>
-          </a:xfrm>
-        </p:grpSpPr>
-        <p:sp>
-          <p:nvSpPr>
-            <p:cNvPr id="32" name="Flowchart: Process 31">
+        <p:graphicFrame>
+          <p:nvGraphicFramePr>
+            <p:cNvPr id="39" name="Object 38">
               <a:extLst>
                 <a:ext uri="{FF2B5EF4-FFF2-40B4-BE49-F238E27FC236}">
-                  <a16:creationId xmlns:a16="http://schemas.microsoft.com/office/drawing/2014/main" id="{B6B4C185-D9B4-4C62-ABF3-C1FBEB9E7463}"/>
+                  <a16:creationId xmlns:a16="http://schemas.microsoft.com/office/drawing/2014/main" id="{27C34878-1310-4808-A0FD-0C9F3449B87C}"/>
                 </a:ext>
               </a:extLst>
             </p:cNvPr>
-            <p:cNvSpPr/>
-            <p:nvPr/>
-          </p:nvSpPr>
-          <p:spPr>
-            <a:xfrm>
-              <a:off x="126333" y="953636"/>
-              <a:ext cx="5376541" cy="2655673"/>
-            </a:xfrm>
-            <a:prstGeom prst="flowChartProcess">
-              <a:avLst/>
-            </a:prstGeom>
-            <a:noFill/>
-          </p:spPr>
-          <p:style>
-            <a:lnRef idx="2">
-              <a:schemeClr val="accent1">
-                <a:shade val="50000"/>
-              </a:schemeClr>
-            </a:lnRef>
-            <a:fillRef idx="1">
-              <a:schemeClr val="accent1"/>
-            </a:fillRef>
-            <a:effectRef idx="0">
-              <a:schemeClr val="accent1"/>
-            </a:effectRef>
-            <a:fontRef idx="minor">
-              <a:schemeClr val="lt1"/>
-            </a:fontRef>
-          </p:style>
-          <p:txBody>
-            <a:bodyPr rtlCol="0" anchor="ctr"/>
-            <a:lstStyle/>
-            <a:p>
-              <a:pPr algn="ctr"/>
-              <a:endParaRPr lang="en-US"/>
-            </a:p>
-          </p:txBody>
-        </p:sp>
-        <p:grpSp>
-          <p:nvGrpSpPr>
-            <p:cNvPr id="33" name="Group 32">
+            <p:cNvGraphicFramePr>
+              <a:graphicFrameLocks noChangeAspect="1"/>
+            </p:cNvGraphicFramePr>
+            <p:nvPr>
+              <p:extLst>
+                <p:ext uri="{D42A27DB-BD31-4B8C-83A1-F6EECF244321}">
+                  <p14:modId xmlns:p14="http://schemas.microsoft.com/office/powerpoint/2010/main" val="1144505410"/>
+                </p:ext>
+              </p:extLst>
+            </p:nvPr>
+          </p:nvGraphicFramePr>
+          <p:xfrm>
+            <a:off x="8781661" y="2128887"/>
+            <a:ext cx="674688" cy="376238"/>
+          </p:xfrm>
+          <a:graphic>
+            <a:graphicData uri="http://schemas.openxmlformats.org/presentationml/2006/ole">
+              <mc:AlternateContent xmlns:mc="http://schemas.openxmlformats.org/markup-compatibility/2006">
+                <mc:Choice xmlns:v="urn:schemas-microsoft-com:vml" Requires="v">
+                  <p:oleObj spid="_x0000_s4315" name="Equation" r:id="rId15" imgW="419040" imgH="177480" progId="Equation.DSMT4">
+                    <p:embed/>
+                  </p:oleObj>
+                </mc:Choice>
+                <mc:Fallback>
+                  <p:oleObj name="Equation" r:id="rId15" imgW="419040" imgH="177480" progId="Equation.DSMT4">
+                    <p:embed/>
+                    <p:pic>
+                      <p:nvPicPr>
+                        <p:cNvPr id="37" name="Object 36">
+                          <a:extLst>
+                            <a:ext uri="{FF2B5EF4-FFF2-40B4-BE49-F238E27FC236}">
+                              <a16:creationId xmlns:a16="http://schemas.microsoft.com/office/drawing/2014/main" id="{CDBABE97-50BD-420C-A3E0-D82A99296831}"/>
+                            </a:ext>
+                          </a:extLst>
+                        </p:cNvPr>
+                        <p:cNvPicPr/>
+                        <p:nvPr/>
+                      </p:nvPicPr>
+                      <p:blipFill>
+                        <a:blip r:embed="rId16"/>
+                        <a:stretch>
+                          <a:fillRect/>
+                        </a:stretch>
+                      </p:blipFill>
+                      <p:spPr>
+                        <a:xfrm>
+                          <a:off x="8781661" y="2128887"/>
+                          <a:ext cx="674688" cy="376238"/>
+                        </a:xfrm>
+                        <a:prstGeom prst="rect">
+                          <a:avLst/>
+                        </a:prstGeom>
+                      </p:spPr>
+                    </p:pic>
+                  </p:oleObj>
+                </mc:Fallback>
+              </mc:AlternateContent>
+            </a:graphicData>
+          </a:graphic>
+        </p:graphicFrame>
+        <p:graphicFrame>
+          <p:nvGraphicFramePr>
+            <p:cNvPr id="40" name="Object 39">
               <a:extLst>
                 <a:ext uri="{FF2B5EF4-FFF2-40B4-BE49-F238E27FC236}">
-                  <a16:creationId xmlns:a16="http://schemas.microsoft.com/office/drawing/2014/main" id="{C4887D5F-F355-4AD8-ABD7-1E6BA455D787}"/>
+                  <a16:creationId xmlns:a16="http://schemas.microsoft.com/office/drawing/2014/main" id="{D842BF90-105B-4233-9FBC-A5133358ED76}"/>
                 </a:ext>
               </a:extLst>
             </p:cNvPr>
-            <p:cNvGrpSpPr/>
-            <p:nvPr/>
-          </p:nvGrpSpPr>
-          <p:grpSpPr>
-            <a:xfrm>
-              <a:off x="187361" y="953636"/>
-              <a:ext cx="5254483" cy="2862322"/>
-              <a:chOff x="3767652" y="704045"/>
-              <a:chExt cx="5601821" cy="2324678"/>
-            </a:xfrm>
-          </p:grpSpPr>
-          <p:sp>
-            <p:nvSpPr>
-              <p:cNvPr id="34" name="TextBox 33">
-                <a:extLst>
-                  <a:ext uri="{FF2B5EF4-FFF2-40B4-BE49-F238E27FC236}">
-                    <a16:creationId xmlns:a16="http://schemas.microsoft.com/office/drawing/2014/main" id="{09DE73E1-2FC5-4694-83EA-935D377FEE77}"/>
-                  </a:ext>
-                </a:extLst>
-              </p:cNvPr>
-              <p:cNvSpPr txBox="1"/>
-              <p:nvPr/>
-            </p:nvSpPr>
-            <p:spPr>
-              <a:xfrm>
-                <a:off x="3767652" y="704045"/>
-                <a:ext cx="5601821" cy="2324678"/>
-              </a:xfrm>
-              <a:prstGeom prst="rect">
-                <a:avLst/>
-              </a:prstGeom>
-              <a:noFill/>
-            </p:spPr>
-            <p:txBody>
-              <a:bodyPr wrap="square" rtlCol="0">
-                <a:spAutoFit/>
-              </a:bodyPr>
-              <a:lstStyle/>
-              <a:p>
-                <a:r>
-                  <a:rPr lang="en-US" dirty="0"/>
-                  <a:t>                                  For each time step:</a:t>
-                </a:r>
-              </a:p>
-              <a:p>
-                <a:r>
-                  <a:rPr lang="en-US" dirty="0"/>
-                  <a:t>“Pull” electron with the time step                 in the gcs;</a:t>
-                </a:r>
-              </a:p>
-              <a:p>
-                <a:r>
-                  <a:rPr lang="en-US" dirty="0"/>
-                  <a:t>“Pull” ion with the time step                in the drift gap;</a:t>
-                </a:r>
-              </a:p>
-              <a:p>
-                <a:r>
-                  <a:rPr lang="en-US" dirty="0"/>
-                  <a:t>Calculation of the changing of momenta for ion and electron for the time step            in the gcs;</a:t>
-                </a:r>
-              </a:p>
-              <a:p>
-                <a:r>
-                  <a:rPr lang="en-US" dirty="0"/>
-                  <a:t>Change in the ion and electron momenta for this time step;</a:t>
-                </a:r>
-              </a:p>
-              <a:p>
-                <a:r>
-                  <a:rPr lang="en-US" dirty="0"/>
-                  <a:t>“Pull” electron with the time step                 in the gcs;</a:t>
-                </a:r>
-              </a:p>
-              <a:p>
-                <a:r>
-                  <a:rPr lang="en-US" dirty="0"/>
-                  <a:t>“Pull” ion with the time step                 in the drift gap.</a:t>
-                </a:r>
-              </a:p>
-              <a:p>
-                <a:endParaRPr lang="en-US" dirty="0"/>
-              </a:p>
-            </p:txBody>
-          </p:sp>
-          <p:grpSp>
-            <p:nvGrpSpPr>
-              <p:cNvPr id="35" name="Group 34">
-                <a:extLst>
-                  <a:ext uri="{FF2B5EF4-FFF2-40B4-BE49-F238E27FC236}">
-                    <a16:creationId xmlns:a16="http://schemas.microsoft.com/office/drawing/2014/main" id="{9635FD26-44AF-483D-BB61-B463E6CFE4E4}"/>
-                  </a:ext>
-                </a:extLst>
-              </p:cNvPr>
-              <p:cNvGrpSpPr/>
-              <p:nvPr/>
-            </p:nvGrpSpPr>
-            <p:grpSpPr>
-              <a:xfrm>
-                <a:off x="6467179" y="917589"/>
-                <a:ext cx="1524827" cy="929730"/>
-                <a:chOff x="6467179" y="917589"/>
-                <a:chExt cx="1524827" cy="929730"/>
-              </a:xfrm>
-            </p:grpSpPr>
-            <p:graphicFrame>
-              <p:nvGraphicFramePr>
-                <p:cNvPr id="36" name="Object 35">
-                  <a:extLst>
-                    <a:ext uri="{FF2B5EF4-FFF2-40B4-BE49-F238E27FC236}">
-                      <a16:creationId xmlns:a16="http://schemas.microsoft.com/office/drawing/2014/main" id="{D3843BB1-4C84-4A4C-82CA-34C908E82943}"/>
-                    </a:ext>
-                  </a:extLst>
-                </p:cNvPr>
-                <p:cNvGraphicFramePr>
-                  <a:graphicFrameLocks noChangeAspect="1"/>
-                </p:cNvGraphicFramePr>
-                <p:nvPr>
-                  <p:extLst>
-                    <p:ext uri="{D42A27DB-BD31-4B8C-83A1-F6EECF244321}">
-                      <p14:modId xmlns:p14="http://schemas.microsoft.com/office/powerpoint/2010/main" val="608722221"/>
-                    </p:ext>
-                  </p:extLst>
-                </p:nvPr>
-              </p:nvGraphicFramePr>
-              <p:xfrm>
-                <a:off x="6759659" y="1183524"/>
-                <a:ext cx="722672" cy="268177"/>
-              </p:xfrm>
-              <a:graphic>
-                <a:graphicData uri="http://schemas.openxmlformats.org/presentationml/2006/ole">
-                  <mc:AlternateContent xmlns:mc="http://schemas.openxmlformats.org/markup-compatibility/2006">
-                    <mc:Choice xmlns:v="urn:schemas-microsoft-com:vml" Requires="v">
-                      <p:oleObj spid="_x0000_s4264" name="Equation" r:id="rId9" imgW="419040" imgH="177480" progId="Equation.DSMT4">
-                        <p:embed/>
-                      </p:oleObj>
-                    </mc:Choice>
-                    <mc:Fallback>
-                      <p:oleObj name="Equation" r:id="rId9" imgW="419040" imgH="177480" progId="Equation.DSMT4">
-                        <p:embed/>
-                        <p:pic>
-                          <p:nvPicPr>
-                            <p:cNvPr id="9" name="Object 8">
-                              <a:extLst>
-                                <a:ext uri="{FF2B5EF4-FFF2-40B4-BE49-F238E27FC236}">
-                                  <a16:creationId xmlns:a16="http://schemas.microsoft.com/office/drawing/2014/main" id="{512CDA0E-6C4C-4CF3-847B-EED676320993}"/>
-                                </a:ext>
-                              </a:extLst>
-                            </p:cNvPr>
-                            <p:cNvPicPr/>
-                            <p:nvPr/>
-                          </p:nvPicPr>
-                          <p:blipFill>
-                            <a:blip r:embed="rId10"/>
-                            <a:stretch>
-                              <a:fillRect/>
-                            </a:stretch>
-                          </p:blipFill>
-                          <p:spPr>
-                            <a:xfrm>
-                              <a:off x="6759659" y="1183524"/>
-                              <a:ext cx="722672" cy="268177"/>
-                            </a:xfrm>
-                            <a:prstGeom prst="rect">
-                              <a:avLst/>
-                            </a:prstGeom>
-                          </p:spPr>
-                        </p:pic>
-                      </p:oleObj>
-                    </mc:Fallback>
-                  </mc:AlternateContent>
-                </a:graphicData>
-              </a:graphic>
-            </p:graphicFrame>
-            <p:graphicFrame>
-              <p:nvGraphicFramePr>
-                <p:cNvPr id="37" name="Object 36">
-                  <a:extLst>
-                    <a:ext uri="{FF2B5EF4-FFF2-40B4-BE49-F238E27FC236}">
-                      <a16:creationId xmlns:a16="http://schemas.microsoft.com/office/drawing/2014/main" id="{CDBABE97-50BD-420C-A3E0-D82A99296831}"/>
-                    </a:ext>
-                  </a:extLst>
-                </p:cNvPr>
-                <p:cNvGraphicFramePr>
-                  <a:graphicFrameLocks noChangeAspect="1"/>
-                </p:cNvGraphicFramePr>
-                <p:nvPr>
-                  <p:extLst>
-                    <p:ext uri="{D42A27DB-BD31-4B8C-83A1-F6EECF244321}">
-                      <p14:modId xmlns:p14="http://schemas.microsoft.com/office/powerpoint/2010/main" val="3082187056"/>
-                    </p:ext>
-                  </p:extLst>
-                </p:nvPr>
-              </p:nvGraphicFramePr>
-              <p:xfrm>
-                <a:off x="7272719" y="917589"/>
-                <a:ext cx="719287" cy="305567"/>
-              </p:xfrm>
-              <a:graphic>
-                <a:graphicData uri="http://schemas.openxmlformats.org/presentationml/2006/ole">
-                  <mc:AlternateContent xmlns:mc="http://schemas.openxmlformats.org/markup-compatibility/2006">
-                    <mc:Choice xmlns:v="urn:schemas-microsoft-com:vml" Requires="v">
-                      <p:oleObj spid="_x0000_s4265" name="Equation" r:id="rId11" imgW="419040" imgH="177480" progId="Equation.DSMT4">
-                        <p:embed/>
-                      </p:oleObj>
-                    </mc:Choice>
-                    <mc:Fallback>
-                      <p:oleObj name="Equation" r:id="rId11" imgW="419040" imgH="177480" progId="Equation.DSMT4">
-                        <p:embed/>
-                        <p:pic>
-                          <p:nvPicPr>
-                            <p:cNvPr id="10" name="Object 9">
-                              <a:extLst>
-                                <a:ext uri="{FF2B5EF4-FFF2-40B4-BE49-F238E27FC236}">
-                                  <a16:creationId xmlns:a16="http://schemas.microsoft.com/office/drawing/2014/main" id="{4242D80A-E46A-4E6B-BCA2-20D3F9A37E06}"/>
-                                </a:ext>
-                              </a:extLst>
-                            </p:cNvPr>
-                            <p:cNvPicPr/>
-                            <p:nvPr/>
-                          </p:nvPicPr>
-                          <p:blipFill>
-                            <a:blip r:embed="rId12"/>
-                            <a:stretch>
-                              <a:fillRect/>
-                            </a:stretch>
-                          </p:blipFill>
-                          <p:spPr>
-                            <a:xfrm>
-                              <a:off x="7272719" y="917589"/>
-                              <a:ext cx="719287" cy="305567"/>
-                            </a:xfrm>
-                            <a:prstGeom prst="rect">
-                              <a:avLst/>
-                            </a:prstGeom>
-                          </p:spPr>
-                        </p:pic>
-                      </p:oleObj>
-                    </mc:Fallback>
-                  </mc:AlternateContent>
-                </a:graphicData>
-              </a:graphic>
-            </p:graphicFrame>
-            <p:graphicFrame>
-              <p:nvGraphicFramePr>
-                <p:cNvPr id="38" name="Object 37">
-                  <a:extLst>
-                    <a:ext uri="{FF2B5EF4-FFF2-40B4-BE49-F238E27FC236}">
-                      <a16:creationId xmlns:a16="http://schemas.microsoft.com/office/drawing/2014/main" id="{98BC38E8-0BAA-4211-A772-56C6BD08EB04}"/>
-                    </a:ext>
-                  </a:extLst>
-                </p:cNvPr>
-                <p:cNvGraphicFramePr>
-                  <a:graphicFrameLocks noChangeAspect="1"/>
-                </p:cNvGraphicFramePr>
-                <p:nvPr>
-                  <p:extLst>
-                    <p:ext uri="{D42A27DB-BD31-4B8C-83A1-F6EECF244321}">
-                      <p14:modId xmlns:p14="http://schemas.microsoft.com/office/powerpoint/2010/main" val="1963028012"/>
-                    </p:ext>
-                  </p:extLst>
-                </p:nvPr>
-              </p:nvGraphicFramePr>
-              <p:xfrm>
-                <a:off x="6467179" y="1563156"/>
-                <a:ext cx="414647" cy="284163"/>
-              </p:xfrm>
-              <a:graphic>
-                <a:graphicData uri="http://schemas.openxmlformats.org/presentationml/2006/ole">
-                  <mc:AlternateContent xmlns:mc="http://schemas.openxmlformats.org/markup-compatibility/2006">
-                    <mc:Choice xmlns:v="urn:schemas-microsoft-com:vml" Requires="v">
-                      <p:oleObj spid="_x0000_s4266" name="Equation" r:id="rId13" imgW="241200" imgH="164880" progId="Equation.DSMT4">
-                        <p:embed/>
-                      </p:oleObj>
-                    </mc:Choice>
-                    <mc:Fallback>
-                      <p:oleObj name="Equation" r:id="rId13" imgW="241200" imgH="164880" progId="Equation.DSMT4">
-                        <p:embed/>
-                        <p:pic>
-                          <p:nvPicPr>
-                            <p:cNvPr id="13" name="Object 12">
-                              <a:extLst>
-                                <a:ext uri="{FF2B5EF4-FFF2-40B4-BE49-F238E27FC236}">
-                                  <a16:creationId xmlns:a16="http://schemas.microsoft.com/office/drawing/2014/main" id="{4C969482-EF8C-41AD-B4FD-7571907FAA99}"/>
-                                </a:ext>
-                              </a:extLst>
-                            </p:cNvPr>
-                            <p:cNvPicPr/>
-                            <p:nvPr/>
-                          </p:nvPicPr>
-                          <p:blipFill>
-                            <a:blip r:embed="rId14"/>
-                            <a:stretch>
-                              <a:fillRect/>
-                            </a:stretch>
-                          </p:blipFill>
-                          <p:spPr>
-                            <a:xfrm>
-                              <a:off x="6467179" y="1563156"/>
-                              <a:ext cx="414647" cy="284163"/>
-                            </a:xfrm>
-                            <a:prstGeom prst="rect">
-                              <a:avLst/>
-                            </a:prstGeom>
-                          </p:spPr>
-                        </p:pic>
-                      </p:oleObj>
-                    </mc:Fallback>
-                  </mc:AlternateContent>
-                </a:graphicData>
-              </a:graphic>
-            </p:graphicFrame>
-          </p:grpSp>
-        </p:grpSp>
+            <p:cNvGraphicFramePr>
+              <a:graphicFrameLocks noChangeAspect="1"/>
+            </p:cNvGraphicFramePr>
+            <p:nvPr>
+              <p:extLst>
+                <p:ext uri="{D42A27DB-BD31-4B8C-83A1-F6EECF244321}">
+                  <p14:modId xmlns:p14="http://schemas.microsoft.com/office/powerpoint/2010/main" val="1451094796"/>
+                </p:ext>
+              </p:extLst>
+            </p:nvPr>
+          </p:nvGraphicFramePr>
+          <p:xfrm>
+            <a:off x="9295473" y="1847485"/>
+            <a:ext cx="674688" cy="376238"/>
+          </p:xfrm>
+          <a:graphic>
+            <a:graphicData uri="http://schemas.openxmlformats.org/presentationml/2006/ole">
+              <mc:AlternateContent xmlns:mc="http://schemas.openxmlformats.org/markup-compatibility/2006">
+                <mc:Choice xmlns:v="urn:schemas-microsoft-com:vml" Requires="v">
+                  <p:oleObj spid="_x0000_s4316" name="Equation" r:id="rId17" imgW="419040" imgH="177480" progId="Equation.DSMT4">
+                    <p:embed/>
+                  </p:oleObj>
+                </mc:Choice>
+                <mc:Fallback>
+                  <p:oleObj name="Equation" r:id="rId17" imgW="419040" imgH="177480" progId="Equation.DSMT4">
+                    <p:embed/>
+                    <p:pic>
+                      <p:nvPicPr>
+                        <p:cNvPr id="39" name="Object 38">
+                          <a:extLst>
+                            <a:ext uri="{FF2B5EF4-FFF2-40B4-BE49-F238E27FC236}">
+                              <a16:creationId xmlns:a16="http://schemas.microsoft.com/office/drawing/2014/main" id="{27C34878-1310-4808-A0FD-0C9F3449B87C}"/>
+                            </a:ext>
+                          </a:extLst>
+                        </p:cNvPr>
+                        <p:cNvPicPr/>
+                        <p:nvPr/>
+                      </p:nvPicPr>
+                      <p:blipFill>
+                        <a:blip r:embed="rId16"/>
+                        <a:stretch>
+                          <a:fillRect/>
+                        </a:stretch>
+                      </p:blipFill>
+                      <p:spPr>
+                        <a:xfrm>
+                          <a:off x="9295473" y="1847485"/>
+                          <a:ext cx="674688" cy="376238"/>
+                        </a:xfrm>
+                        <a:prstGeom prst="rect">
+                          <a:avLst/>
+                        </a:prstGeom>
+                      </p:spPr>
+                    </p:pic>
+                  </p:oleObj>
+                </mc:Fallback>
+              </mc:AlternateContent>
+            </a:graphicData>
+          </a:graphic>
+        </p:graphicFrame>
       </p:grpSp>
-      <p:graphicFrame>
-        <p:nvGraphicFramePr>
-          <p:cNvPr id="39" name="Object 38">
-            <a:extLst>
-              <a:ext uri="{FF2B5EF4-FFF2-40B4-BE49-F238E27FC236}">
-                <a16:creationId xmlns:a16="http://schemas.microsoft.com/office/drawing/2014/main" id="{27C34878-1310-4808-A0FD-0C9F3449B87C}"/>
-              </a:ext>
-            </a:extLst>
-          </p:cNvPr>
-          <p:cNvGraphicFramePr>
-            <a:graphicFrameLocks noChangeAspect="1"/>
-          </p:cNvGraphicFramePr>
-          <p:nvPr>
-            <p:extLst>
-              <p:ext uri="{D42A27DB-BD31-4B8C-83A1-F6EECF244321}">
-                <p14:modId xmlns:p14="http://schemas.microsoft.com/office/powerpoint/2010/main" val="3961698130"/>
-              </p:ext>
-            </p:extLst>
-          </p:nvPr>
-        </p:nvGraphicFramePr>
-        <p:xfrm>
-          <a:off x="8772501" y="2690254"/>
-          <a:ext cx="674688" cy="376238"/>
-        </p:xfrm>
-        <a:graphic>
-          <a:graphicData uri="http://schemas.openxmlformats.org/presentationml/2006/ole">
-            <mc:AlternateContent xmlns:mc="http://schemas.openxmlformats.org/markup-compatibility/2006">
-              <mc:Choice xmlns:v="urn:schemas-microsoft-com:vml" Requires="v">
-                <p:oleObj spid="_x0000_s4267" name="Equation" r:id="rId15" imgW="419040" imgH="177480" progId="Equation.DSMT4">
-                  <p:embed/>
-                </p:oleObj>
-              </mc:Choice>
-              <mc:Fallback>
-                <p:oleObj name="Equation" r:id="rId15" imgW="419040" imgH="177480" progId="Equation.DSMT4">
-                  <p:embed/>
-                  <p:pic>
-                    <p:nvPicPr>
-                      <p:cNvPr id="37" name="Object 36">
-                        <a:extLst>
-                          <a:ext uri="{FF2B5EF4-FFF2-40B4-BE49-F238E27FC236}">
-                            <a16:creationId xmlns:a16="http://schemas.microsoft.com/office/drawing/2014/main" id="{CDBABE97-50BD-420C-A3E0-D82A99296831}"/>
-                          </a:ext>
-                        </a:extLst>
-                      </p:cNvPr>
-                      <p:cNvPicPr/>
-                      <p:nvPr/>
-                    </p:nvPicPr>
-                    <p:blipFill>
-                      <a:blip r:embed="rId16"/>
-                      <a:stretch>
-                        <a:fillRect/>
-                      </a:stretch>
-                    </p:blipFill>
-                    <p:spPr>
-                      <a:xfrm>
-                        <a:off x="8772501" y="2690254"/>
-                        <a:ext cx="674688" cy="376238"/>
-                      </a:xfrm>
-                      <a:prstGeom prst="rect">
-                        <a:avLst/>
-                      </a:prstGeom>
-                    </p:spPr>
-                  </p:pic>
-                </p:oleObj>
-              </mc:Fallback>
-            </mc:AlternateContent>
-          </a:graphicData>
-        </a:graphic>
-      </p:graphicFrame>
-      <p:graphicFrame>
-        <p:nvGraphicFramePr>
-          <p:cNvPr id="40" name="Object 39">
-            <a:extLst>
-              <a:ext uri="{FF2B5EF4-FFF2-40B4-BE49-F238E27FC236}">
-                <a16:creationId xmlns:a16="http://schemas.microsoft.com/office/drawing/2014/main" id="{D842BF90-105B-4233-9FBC-A5133358ED76}"/>
-              </a:ext>
-            </a:extLst>
-          </p:cNvPr>
-          <p:cNvGraphicFramePr>
-            <a:graphicFrameLocks noChangeAspect="1"/>
-          </p:cNvGraphicFramePr>
-          <p:nvPr>
-            <p:extLst>
-              <p:ext uri="{D42A27DB-BD31-4B8C-83A1-F6EECF244321}">
-                <p14:modId xmlns:p14="http://schemas.microsoft.com/office/powerpoint/2010/main" val="4080660250"/>
-              </p:ext>
-            </p:extLst>
-          </p:nvPr>
-        </p:nvGraphicFramePr>
-        <p:xfrm>
-          <a:off x="9233082" y="2399968"/>
-          <a:ext cx="674688" cy="376238"/>
-        </p:xfrm>
-        <a:graphic>
-          <a:graphicData uri="http://schemas.openxmlformats.org/presentationml/2006/ole">
-            <mc:AlternateContent xmlns:mc="http://schemas.openxmlformats.org/markup-compatibility/2006">
-              <mc:Choice xmlns:v="urn:schemas-microsoft-com:vml" Requires="v">
-                <p:oleObj spid="_x0000_s4268" name="Equation" r:id="rId17" imgW="419040" imgH="177480" progId="Equation.DSMT4">
-                  <p:embed/>
-                </p:oleObj>
-              </mc:Choice>
-              <mc:Fallback>
-                <p:oleObj name="Equation" r:id="rId17" imgW="419040" imgH="177480" progId="Equation.DSMT4">
-                  <p:embed/>
-                  <p:pic>
-                    <p:nvPicPr>
-                      <p:cNvPr id="39" name="Object 38">
-                        <a:extLst>
-                          <a:ext uri="{FF2B5EF4-FFF2-40B4-BE49-F238E27FC236}">
-                            <a16:creationId xmlns:a16="http://schemas.microsoft.com/office/drawing/2014/main" id="{27C34878-1310-4808-A0FD-0C9F3449B87C}"/>
-                          </a:ext>
-                        </a:extLst>
-                      </p:cNvPr>
-                      <p:cNvPicPr/>
-                      <p:nvPr/>
-                    </p:nvPicPr>
-                    <p:blipFill>
-                      <a:blip r:embed="rId16"/>
-                      <a:stretch>
-                        <a:fillRect/>
-                      </a:stretch>
-                    </p:blipFill>
-                    <p:spPr>
-                      <a:xfrm>
-                        <a:off x="9233082" y="2399968"/>
-                        <a:ext cx="674688" cy="376238"/>
-                      </a:xfrm>
-                      <a:prstGeom prst="rect">
-                        <a:avLst/>
-                      </a:prstGeom>
-                    </p:spPr>
-                  </p:pic>
-                </p:oleObj>
-              </mc:Fallback>
-            </mc:AlternateContent>
-          </a:graphicData>
-        </a:graphic>
-      </p:graphicFrame>
     </p:spTree>
     <p:extLst>
       <p:ext uri="{BB962C8B-B14F-4D97-AF65-F5344CB8AC3E}">
@@ -12837,7 +12741,7 @@
           <a:graphicData uri="http://schemas.openxmlformats.org/presentationml/2006/ole">
             <mc:AlternateContent xmlns:mc="http://schemas.openxmlformats.org/markup-compatibility/2006">
               <mc:Choice xmlns:v="urn:schemas-microsoft-com:vml" Requires="v">
-                <p:oleObj spid="_x0000_s5368" name="Equation" r:id="rId3" imgW="558720" imgH="228600" progId="Equation.DSMT4">
+                <p:oleObj spid="_x0000_s5573" name="Equation" r:id="rId3" imgW="558720" imgH="228600" progId="Equation.DSMT4">
                   <p:embed/>
                 </p:oleObj>
               </mc:Choice>
@@ -12900,7 +12804,7 @@
           <a:graphicData uri="http://schemas.openxmlformats.org/presentationml/2006/ole">
             <mc:AlternateContent xmlns:mc="http://schemas.openxmlformats.org/markup-compatibility/2006">
               <mc:Choice xmlns:v="urn:schemas-microsoft-com:vml" Requires="v">
-                <p:oleObj spid="_x0000_s5369" name="Equation" r:id="rId5" imgW="545760" imgH="228600" progId="Equation.DSMT4">
+                <p:oleObj spid="_x0000_s5574" name="Equation" r:id="rId5" imgW="545760" imgH="228600" progId="Equation.DSMT4">
                   <p:embed/>
                 </p:oleObj>
               </mc:Choice>
@@ -12969,7 +12873,7 @@
           <a:graphicData uri="http://schemas.openxmlformats.org/presentationml/2006/ole">
             <mc:AlternateContent xmlns:mc="http://schemas.openxmlformats.org/markup-compatibility/2006">
               <mc:Choice xmlns:v="urn:schemas-microsoft-com:vml" Requires="v">
-                <p:oleObj spid="_x0000_s5370" name="Equation" r:id="rId7" imgW="152280" imgH="228600" progId="Equation.DSMT4">
+                <p:oleObj spid="_x0000_s5575" name="Equation" r:id="rId7" imgW="152280" imgH="228600" progId="Equation.DSMT4">
                   <p:embed/>
                 </p:oleObj>
               </mc:Choice>
@@ -13038,7 +12942,7 @@
           <a:graphicData uri="http://schemas.openxmlformats.org/presentationml/2006/ole">
             <mc:AlternateContent xmlns:mc="http://schemas.openxmlformats.org/markup-compatibility/2006">
               <mc:Choice xmlns:v="urn:schemas-microsoft-com:vml" Requires="v">
-                <p:oleObj spid="_x0000_s5371" name="Equation" r:id="rId9" imgW="126720" imgH="139680" progId="Equation.DSMT4">
+                <p:oleObj spid="_x0000_s5576" name="Equation" r:id="rId9" imgW="126720" imgH="139680" progId="Equation.DSMT4">
                   <p:embed/>
                 </p:oleObj>
               </mc:Choice>
@@ -13107,7 +13011,7 @@
           <a:graphicData uri="http://schemas.openxmlformats.org/presentationml/2006/ole">
             <mc:AlternateContent xmlns:mc="http://schemas.openxmlformats.org/markup-compatibility/2006">
               <mc:Choice xmlns:v="urn:schemas-microsoft-com:vml" Requires="v">
-                <p:oleObj spid="_x0000_s5372" name="Equation" r:id="rId11" imgW="774360" imgH="228600" progId="Equation.DSMT4">
+                <p:oleObj spid="_x0000_s5577" name="Equation" r:id="rId11" imgW="774360" imgH="228600" progId="Equation.DSMT4">
                   <p:embed/>
                 </p:oleObj>
               </mc:Choice>
@@ -13176,7 +13080,7 @@
           <a:graphicData uri="http://schemas.openxmlformats.org/presentationml/2006/ole">
             <mc:AlternateContent xmlns:mc="http://schemas.openxmlformats.org/markup-compatibility/2006">
               <mc:Choice xmlns:v="urn:schemas-microsoft-com:vml" Requires="v">
-                <p:oleObj spid="_x0000_s5373" name="Equation" r:id="rId13" imgW="482400" imgH="228600" progId="Equation.DSMT4">
+                <p:oleObj spid="_x0000_s5578" name="Equation" r:id="rId13" imgW="482400" imgH="228600" progId="Equation.DSMT4">
                   <p:embed/>
                 </p:oleObj>
               </mc:Choice>
@@ -13245,7 +13149,7 @@
           <a:graphicData uri="http://schemas.openxmlformats.org/presentationml/2006/ole">
             <mc:AlternateContent xmlns:mc="http://schemas.openxmlformats.org/markup-compatibility/2006">
               <mc:Choice xmlns:v="urn:schemas-microsoft-com:vml" Requires="v">
-                <p:oleObj spid="_x0000_s5374" name="Equation" r:id="rId15" imgW="482400" imgH="228600" progId="Equation.DSMT4">
+                <p:oleObj spid="_x0000_s5579" name="Equation" r:id="rId15" imgW="482400" imgH="228600" progId="Equation.DSMT4">
                   <p:embed/>
                 </p:oleObj>
               </mc:Choice>
@@ -13314,7 +13218,7 @@
           <a:graphicData uri="http://schemas.openxmlformats.org/presentationml/2006/ole">
             <mc:AlternateContent xmlns:mc="http://schemas.openxmlformats.org/markup-compatibility/2006">
               <mc:Choice xmlns:v="urn:schemas-microsoft-com:vml" Requires="v">
-                <p:oleObj spid="_x0000_s5375" name="Equation" r:id="rId17" imgW="469800" imgH="228600" progId="Equation.DSMT4">
+                <p:oleObj spid="_x0000_s5580" name="Equation" r:id="rId17" imgW="469800" imgH="228600" progId="Equation.DSMT4">
                   <p:embed/>
                 </p:oleObj>
               </mc:Choice>
@@ -13383,7 +13287,7 @@
           <a:graphicData uri="http://schemas.openxmlformats.org/presentationml/2006/ole">
             <mc:AlternateContent xmlns:mc="http://schemas.openxmlformats.org/markup-compatibility/2006">
               <mc:Choice xmlns:v="urn:schemas-microsoft-com:vml" Requires="v">
-                <p:oleObj spid="_x0000_s5376" name="Equation" r:id="rId19" imgW="482400" imgH="228600" progId="Equation.DSMT4">
+                <p:oleObj spid="_x0000_s5581" name="Equation" r:id="rId19" imgW="482400" imgH="228600" progId="Equation.DSMT4">
                   <p:embed/>
                 </p:oleObj>
               </mc:Choice>
@@ -13452,7 +13356,7 @@
           <a:graphicData uri="http://schemas.openxmlformats.org/presentationml/2006/ole">
             <mc:AlternateContent xmlns:mc="http://schemas.openxmlformats.org/markup-compatibility/2006">
               <mc:Choice xmlns:v="urn:schemas-microsoft-com:vml" Requires="v">
-                <p:oleObj spid="_x0000_s5377" name="Equation" r:id="rId21" imgW="457200" imgH="228600" progId="Equation.DSMT4">
+                <p:oleObj spid="_x0000_s5582" name="Equation" r:id="rId21" imgW="457200" imgH="228600" progId="Equation.DSMT4">
                   <p:embed/>
                 </p:oleObj>
               </mc:Choice>
@@ -13521,7 +13425,7 @@
           <a:graphicData uri="http://schemas.openxmlformats.org/presentationml/2006/ole">
             <mc:AlternateContent xmlns:mc="http://schemas.openxmlformats.org/markup-compatibility/2006">
               <mc:Choice xmlns:v="urn:schemas-microsoft-com:vml" Requires="v">
-                <p:oleObj spid="_x0000_s5378" name="Equation" r:id="rId23" imgW="558720" imgH="228600" progId="Equation.DSMT4">
+                <p:oleObj spid="_x0000_s5583" name="Equation" r:id="rId23" imgW="558720" imgH="228600" progId="Equation.DSMT4">
                   <p:embed/>
                 </p:oleObj>
               </mc:Choice>
@@ -13590,7 +13494,7 @@
           <a:graphicData uri="http://schemas.openxmlformats.org/presentationml/2006/ole">
             <mc:AlternateContent xmlns:mc="http://schemas.openxmlformats.org/markup-compatibility/2006">
               <mc:Choice xmlns:v="urn:schemas-microsoft-com:vml" Requires="v">
-                <p:oleObj spid="_x0000_s5379" name="Equation" r:id="rId25" imgW="482400" imgH="228600" progId="Equation.DSMT4">
+                <p:oleObj spid="_x0000_s5584" name="Equation" r:id="rId25" imgW="482400" imgH="228600" progId="Equation.DSMT4">
                   <p:embed/>
                 </p:oleObj>
               </mc:Choice>
@@ -13659,7 +13563,7 @@
           <a:graphicData uri="http://schemas.openxmlformats.org/presentationml/2006/ole">
             <mc:AlternateContent xmlns:mc="http://schemas.openxmlformats.org/markup-compatibility/2006">
               <mc:Choice xmlns:v="urn:schemas-microsoft-com:vml" Requires="v">
-                <p:oleObj spid="_x0000_s5380" name="Equation" r:id="rId27" imgW="469800" imgH="228600" progId="Equation.DSMT4">
+                <p:oleObj spid="_x0000_s5585" name="Equation" r:id="rId27" imgW="469800" imgH="228600" progId="Equation.DSMT4">
                   <p:embed/>
                 </p:oleObj>
               </mc:Choice>
@@ -13728,7 +13632,7 @@
           <a:graphicData uri="http://schemas.openxmlformats.org/presentationml/2006/ole">
             <mc:AlternateContent xmlns:mc="http://schemas.openxmlformats.org/markup-compatibility/2006">
               <mc:Choice xmlns:v="urn:schemas-microsoft-com:vml" Requires="v">
-                <p:oleObj spid="_x0000_s5381" name="Equation" r:id="rId29" imgW="482400" imgH="228600" progId="Equation.DSMT4">
+                <p:oleObj spid="_x0000_s5586" name="Equation" r:id="rId29" imgW="482400" imgH="228600" progId="Equation.DSMT4">
                   <p:embed/>
                 </p:oleObj>
               </mc:Choice>
@@ -13797,7 +13701,7 @@
           <a:graphicData uri="http://schemas.openxmlformats.org/presentationml/2006/ole">
             <mc:AlternateContent xmlns:mc="http://schemas.openxmlformats.org/markup-compatibility/2006">
               <mc:Choice xmlns:v="urn:schemas-microsoft-com:vml" Requires="v">
-                <p:oleObj spid="_x0000_s5382" name="Equation" r:id="rId31" imgW="482400" imgH="228600" progId="Equation.DSMT4">
+                <p:oleObj spid="_x0000_s5587" name="Equation" r:id="rId31" imgW="482400" imgH="228600" progId="Equation.DSMT4">
                   <p:embed/>
                 </p:oleObj>
               </mc:Choice>
@@ -13866,7 +13770,7 @@
           <a:graphicData uri="http://schemas.openxmlformats.org/presentationml/2006/ole">
             <mc:AlternateContent xmlns:mc="http://schemas.openxmlformats.org/markup-compatibility/2006">
               <mc:Choice xmlns:v="urn:schemas-microsoft-com:vml" Requires="v">
-                <p:oleObj spid="_x0000_s5383" name="Equation" r:id="rId33" imgW="164880" imgH="228600" progId="Equation.DSMT4">
+                <p:oleObj spid="_x0000_s5588" name="Equation" r:id="rId33" imgW="164880" imgH="228600" progId="Equation.DSMT4">
                   <p:embed/>
                 </p:oleObj>
               </mc:Choice>
@@ -13935,7 +13839,7 @@
           <a:graphicData uri="http://schemas.openxmlformats.org/presentationml/2006/ole">
             <mc:AlternateContent xmlns:mc="http://schemas.openxmlformats.org/markup-compatibility/2006">
               <mc:Choice xmlns:v="urn:schemas-microsoft-com:vml" Requires="v">
-                <p:oleObj spid="_x0000_s5384" name="Equation" r:id="rId35" imgW="164880" imgH="228600" progId="Equation.DSMT4">
+                <p:oleObj spid="_x0000_s5589" name="Equation" r:id="rId35" imgW="164880" imgH="228600" progId="Equation.DSMT4">
                   <p:embed/>
                 </p:oleObj>
               </mc:Choice>
@@ -14004,7 +13908,7 @@
           <a:graphicData uri="http://schemas.openxmlformats.org/presentationml/2006/ole">
             <mc:AlternateContent xmlns:mc="http://schemas.openxmlformats.org/markup-compatibility/2006">
               <mc:Choice xmlns:v="urn:schemas-microsoft-com:vml" Requires="v">
-                <p:oleObj spid="_x0000_s5385" name="Equation" r:id="rId37" imgW="152280" imgH="228600" progId="Equation.DSMT4">
+                <p:oleObj spid="_x0000_s5590" name="Equation" r:id="rId37" imgW="152280" imgH="228600" progId="Equation.DSMT4">
                   <p:embed/>
                 </p:oleObj>
               </mc:Choice>
@@ -14073,7 +13977,7 @@
           <a:graphicData uri="http://schemas.openxmlformats.org/presentationml/2006/ole">
             <mc:AlternateContent xmlns:mc="http://schemas.openxmlformats.org/markup-compatibility/2006">
               <mc:Choice xmlns:v="urn:schemas-microsoft-com:vml" Requires="v">
-                <p:oleObj spid="_x0000_s5386" name="Equation" r:id="rId39" imgW="164880" imgH="228600" progId="Equation.DSMT4">
+                <p:oleObj spid="_x0000_s5591" name="Equation" r:id="rId39" imgW="164880" imgH="228600" progId="Equation.DSMT4">
                   <p:embed/>
                 </p:oleObj>
               </mc:Choice>
@@ -14142,7 +14046,7 @@
           <a:graphicData uri="http://schemas.openxmlformats.org/presentationml/2006/ole">
             <mc:AlternateContent xmlns:mc="http://schemas.openxmlformats.org/markup-compatibility/2006">
               <mc:Choice xmlns:v="urn:schemas-microsoft-com:vml" Requires="v">
-                <p:oleObj spid="_x0000_s5387" name="Equation" r:id="rId41" imgW="203040" imgH="228600" progId="Equation.DSMT4">
+                <p:oleObj spid="_x0000_s5592" name="Equation" r:id="rId41" imgW="203040" imgH="228600" progId="Equation.DSMT4">
                   <p:embed/>
                 </p:oleObj>
               </mc:Choice>
@@ -14211,7 +14115,7 @@
           <a:graphicData uri="http://schemas.openxmlformats.org/presentationml/2006/ole">
             <mc:AlternateContent xmlns:mc="http://schemas.openxmlformats.org/markup-compatibility/2006">
               <mc:Choice xmlns:v="urn:schemas-microsoft-com:vml" Requires="v">
-                <p:oleObj spid="_x0000_s5388" name="Equation" r:id="rId43" imgW="164880" imgH="228600" progId="Equation.DSMT4">
+                <p:oleObj spid="_x0000_s5593" name="Equation" r:id="rId43" imgW="164880" imgH="228600" progId="Equation.DSMT4">
                   <p:embed/>
                 </p:oleObj>
               </mc:Choice>
@@ -14280,7 +14184,7 @@
           <a:graphicData uri="http://schemas.openxmlformats.org/presentationml/2006/ole">
             <mc:AlternateContent xmlns:mc="http://schemas.openxmlformats.org/markup-compatibility/2006">
               <mc:Choice xmlns:v="urn:schemas-microsoft-com:vml" Requires="v">
-                <p:oleObj spid="_x0000_s5389" name="Equation" r:id="rId45" imgW="152280" imgH="228600" progId="Equation.DSMT4">
+                <p:oleObj spid="_x0000_s5594" name="Equation" r:id="rId45" imgW="152280" imgH="228600" progId="Equation.DSMT4">
                   <p:embed/>
                 </p:oleObj>
               </mc:Choice>
@@ -14349,7 +14253,7 @@
           <a:graphicData uri="http://schemas.openxmlformats.org/presentationml/2006/ole">
             <mc:AlternateContent xmlns:mc="http://schemas.openxmlformats.org/markup-compatibility/2006">
               <mc:Choice xmlns:v="urn:schemas-microsoft-com:vml" Requires="v">
-                <p:oleObj spid="_x0000_s5390" name="Equation" r:id="rId47" imgW="164880" imgH="228600" progId="Equation.DSMT4">
+                <p:oleObj spid="_x0000_s5595" name="Equation" r:id="rId47" imgW="164880" imgH="228600" progId="Equation.DSMT4">
                   <p:embed/>
                 </p:oleObj>
               </mc:Choice>
@@ -14418,7 +14322,7 @@
           <a:graphicData uri="http://schemas.openxmlformats.org/presentationml/2006/ole">
             <mc:AlternateContent xmlns:mc="http://schemas.openxmlformats.org/markup-compatibility/2006">
               <mc:Choice xmlns:v="urn:schemas-microsoft-com:vml" Requires="v">
-                <p:oleObj spid="_x0000_s5391" name="Equation" r:id="rId49" imgW="164880" imgH="228600" progId="Equation.DSMT4">
+                <p:oleObj spid="_x0000_s5596" name="Equation" r:id="rId49" imgW="164880" imgH="228600" progId="Equation.DSMT4">
                   <p:embed/>
                 </p:oleObj>
               </mc:Choice>
@@ -14487,7 +14391,7 @@
           <a:graphicData uri="http://schemas.openxmlformats.org/presentationml/2006/ole">
             <mc:AlternateContent xmlns:mc="http://schemas.openxmlformats.org/markup-compatibility/2006">
               <mc:Choice xmlns:v="urn:schemas-microsoft-com:vml" Requires="v">
-                <p:oleObj spid="_x0000_s5392" name="Equation" r:id="rId51" imgW="190440" imgH="228600" progId="Equation.DSMT4">
+                <p:oleObj spid="_x0000_s5597" name="Equation" r:id="rId51" imgW="190440" imgH="228600" progId="Equation.DSMT4">
                   <p:embed/>
                 </p:oleObj>
               </mc:Choice>
@@ -14556,7 +14460,7 @@
           <a:graphicData uri="http://schemas.openxmlformats.org/presentationml/2006/ole">
             <mc:AlternateContent xmlns:mc="http://schemas.openxmlformats.org/markup-compatibility/2006">
               <mc:Choice xmlns:v="urn:schemas-microsoft-com:vml" Requires="v">
-                <p:oleObj spid="_x0000_s5393" name="Equation" r:id="rId53" imgW="203040" imgH="228600" progId="Equation.DSMT4">
+                <p:oleObj spid="_x0000_s5598" name="Equation" r:id="rId53" imgW="203040" imgH="228600" progId="Equation.DSMT4">
                   <p:embed/>
                 </p:oleObj>
               </mc:Choice>
@@ -14625,7 +14529,7 @@
           <a:graphicData uri="http://schemas.openxmlformats.org/presentationml/2006/ole">
             <mc:AlternateContent xmlns:mc="http://schemas.openxmlformats.org/markup-compatibility/2006">
               <mc:Choice xmlns:v="urn:schemas-microsoft-com:vml" Requires="v">
-                <p:oleObj spid="_x0000_s5394" name="Equation" r:id="rId55" imgW="393480" imgH="228600" progId="Equation.DSMT4">
+                <p:oleObj spid="_x0000_s5599" name="Equation" r:id="rId55" imgW="393480" imgH="228600" progId="Equation.DSMT4">
                   <p:embed/>
                 </p:oleObj>
               </mc:Choice>
@@ -14694,7 +14598,7 @@
           <a:graphicData uri="http://schemas.openxmlformats.org/presentationml/2006/ole">
             <mc:AlternateContent xmlns:mc="http://schemas.openxmlformats.org/markup-compatibility/2006">
               <mc:Choice xmlns:v="urn:schemas-microsoft-com:vml" Requires="v">
-                <p:oleObj spid="_x0000_s5395" name="Equation" r:id="rId57" imgW="304560" imgH="177480" progId="Equation.DSMT4">
+                <p:oleObj spid="_x0000_s5600" name="Equation" r:id="rId57" imgW="304560" imgH="177480" progId="Equation.DSMT4">
                   <p:embed/>
                 </p:oleObj>
               </mc:Choice>
@@ -14763,7 +14667,7 @@
           <a:graphicData uri="http://schemas.openxmlformats.org/presentationml/2006/ole">
             <mc:AlternateContent xmlns:mc="http://schemas.openxmlformats.org/markup-compatibility/2006">
               <mc:Choice xmlns:v="urn:schemas-microsoft-com:vml" Requires="v">
-                <p:oleObj spid="_x0000_s5396" name="Equation" r:id="rId59" imgW="164880" imgH="139680" progId="Equation.DSMT4">
+                <p:oleObj spid="_x0000_s5601" name="Equation" r:id="rId59" imgW="164880" imgH="139680" progId="Equation.DSMT4">
                   <p:embed/>
                 </p:oleObj>
               </mc:Choice>
@@ -14832,7 +14736,7 @@
           <a:graphicData uri="http://schemas.openxmlformats.org/presentationml/2006/ole">
             <mc:AlternateContent xmlns:mc="http://schemas.openxmlformats.org/markup-compatibility/2006">
               <mc:Choice xmlns:v="urn:schemas-microsoft-com:vml" Requires="v">
-                <p:oleObj spid="_x0000_s5397" name="Equation" r:id="rId61" imgW="342720" imgH="177480" progId="Equation.DSMT4">
+                <p:oleObj spid="_x0000_s5602" name="Equation" r:id="rId61" imgW="342720" imgH="177480" progId="Equation.DSMT4">
                   <p:embed/>
                 </p:oleObj>
               </mc:Choice>
@@ -14901,7 +14805,7 @@
           <a:graphicData uri="http://schemas.openxmlformats.org/presentationml/2006/ole">
             <mc:AlternateContent xmlns:mc="http://schemas.openxmlformats.org/markup-compatibility/2006">
               <mc:Choice xmlns:v="urn:schemas-microsoft-com:vml" Requires="v">
-                <p:oleObj spid="_x0000_s5398" name="Equation" r:id="rId63" imgW="126720" imgH="139680" progId="Equation.DSMT4">
+                <p:oleObj spid="_x0000_s5603" name="Equation" r:id="rId63" imgW="126720" imgH="139680" progId="Equation.DSMT4">
                   <p:embed/>
                 </p:oleObj>
               </mc:Choice>
@@ -14970,7 +14874,7 @@
           <a:graphicData uri="http://schemas.openxmlformats.org/presentationml/2006/ole">
             <mc:AlternateContent xmlns:mc="http://schemas.openxmlformats.org/markup-compatibility/2006">
               <mc:Choice xmlns:v="urn:schemas-microsoft-com:vml" Requires="v">
-                <p:oleObj spid="_x0000_s5399" name="Equation" r:id="rId65" imgW="304560" imgH="177480" progId="Equation.DSMT4">
+                <p:oleObj spid="_x0000_s5604" name="Equation" r:id="rId65" imgW="304560" imgH="177480" progId="Equation.DSMT4">
                   <p:embed/>
                 </p:oleObj>
               </mc:Choice>
@@ -15039,7 +14943,7 @@
           <a:graphicData uri="http://schemas.openxmlformats.org/presentationml/2006/ole">
             <mc:AlternateContent xmlns:mc="http://schemas.openxmlformats.org/markup-compatibility/2006">
               <mc:Choice xmlns:v="urn:schemas-microsoft-com:vml" Requires="v">
-                <p:oleObj spid="_x0000_s5400" name="Equation" r:id="rId59" imgW="164880" imgH="139680" progId="Equation.DSMT4">
+                <p:oleObj spid="_x0000_s5605" name="Equation" r:id="rId59" imgW="164880" imgH="139680" progId="Equation.DSMT4">
                   <p:embed/>
                 </p:oleObj>
               </mc:Choice>
@@ -15108,7 +15012,7 @@
           <a:graphicData uri="http://schemas.openxmlformats.org/presentationml/2006/ole">
             <mc:AlternateContent xmlns:mc="http://schemas.openxmlformats.org/markup-compatibility/2006">
               <mc:Choice xmlns:v="urn:schemas-microsoft-com:vml" Requires="v">
-                <p:oleObj spid="_x0000_s5401" name="Equation" r:id="rId67" imgW="342720" imgH="177480" progId="Equation.DSMT4">
+                <p:oleObj spid="_x0000_s5606" name="Equation" r:id="rId67" imgW="342720" imgH="177480" progId="Equation.DSMT4">
                   <p:embed/>
                 </p:oleObj>
               </mc:Choice>
@@ -15259,7 +15163,7 @@
           <a:graphicData uri="http://schemas.openxmlformats.org/presentationml/2006/ole">
             <mc:AlternateContent xmlns:mc="http://schemas.openxmlformats.org/markup-compatibility/2006">
               <mc:Choice xmlns:v="urn:schemas-microsoft-com:vml" Requires="v">
-                <p:oleObj spid="_x0000_s5402" name="Equation" r:id="rId69" imgW="787320" imgH="228600" progId="Equation.DSMT4">
+                <p:oleObj spid="_x0000_s5607" name="Equation" r:id="rId69" imgW="787320" imgH="228600" progId="Equation.DSMT4">
                   <p:embed/>
                 </p:oleObj>
               </mc:Choice>
@@ -15328,7 +15232,7 @@
           <a:graphicData uri="http://schemas.openxmlformats.org/presentationml/2006/ole">
             <mc:AlternateContent xmlns:mc="http://schemas.openxmlformats.org/markup-compatibility/2006">
               <mc:Choice xmlns:v="urn:schemas-microsoft-com:vml" Requires="v">
-                <p:oleObj spid="_x0000_s5403" name="Equation" r:id="rId71" imgW="126720" imgH="126720" progId="Equation.DSMT4">
+                <p:oleObj spid="_x0000_s5608" name="Equation" r:id="rId71" imgW="126720" imgH="126720" progId="Equation.DSMT4">
                   <p:embed/>
                 </p:oleObj>
               </mc:Choice>
@@ -15397,7 +15301,7 @@
           <a:graphicData uri="http://schemas.openxmlformats.org/presentationml/2006/ole">
             <mc:AlternateContent xmlns:mc="http://schemas.openxmlformats.org/markup-compatibility/2006">
               <mc:Choice xmlns:v="urn:schemas-microsoft-com:vml" Requires="v">
-                <p:oleObj spid="_x0000_s5404" name="Equation" r:id="rId73" imgW="126720" imgH="139680" progId="Equation.DSMT4">
+                <p:oleObj spid="_x0000_s5609" name="Equation" r:id="rId73" imgW="126720" imgH="139680" progId="Equation.DSMT4">
                   <p:embed/>
                 </p:oleObj>
               </mc:Choice>
@@ -15466,7 +15370,7 @@
           <a:graphicData uri="http://schemas.openxmlformats.org/presentationml/2006/ole">
             <mc:AlternateContent xmlns:mc="http://schemas.openxmlformats.org/markup-compatibility/2006">
               <mc:Choice xmlns:v="urn:schemas-microsoft-com:vml" Requires="v">
-                <p:oleObj spid="_x0000_s5405" name="Equation" r:id="rId75" imgW="126720" imgH="126720" progId="Equation.DSMT4">
+                <p:oleObj spid="_x0000_s5610" name="Equation" r:id="rId75" imgW="126720" imgH="126720" progId="Equation.DSMT4">
                   <p:embed/>
                 </p:oleObj>
               </mc:Choice>
@@ -15535,7 +15439,7 @@
           <a:graphicData uri="http://schemas.openxmlformats.org/presentationml/2006/ole">
             <mc:AlternateContent xmlns:mc="http://schemas.openxmlformats.org/markup-compatibility/2006">
               <mc:Choice xmlns:v="urn:schemas-microsoft-com:vml" Requires="v">
-                <p:oleObj spid="_x0000_s5406" name="Equation" r:id="rId77" imgW="139680" imgH="164880" progId="Equation.DSMT4">
+                <p:oleObj spid="_x0000_s5611" name="Equation" r:id="rId77" imgW="139680" imgH="164880" progId="Equation.DSMT4">
                   <p:embed/>
                 </p:oleObj>
               </mc:Choice>
@@ -15604,7 +15508,7 @@
           <a:graphicData uri="http://schemas.openxmlformats.org/presentationml/2006/ole">
             <mc:AlternateContent xmlns:mc="http://schemas.openxmlformats.org/markup-compatibility/2006">
               <mc:Choice xmlns:v="urn:schemas-microsoft-com:vml" Requires="v">
-                <p:oleObj spid="_x0000_s5407" name="Equation" r:id="rId79" imgW="139680" imgH="164880" progId="Equation.DSMT4">
+                <p:oleObj spid="_x0000_s5612" name="Equation" r:id="rId79" imgW="139680" imgH="164880" progId="Equation.DSMT4">
                   <p:embed/>
                 </p:oleObj>
               </mc:Choice>
@@ -15673,7 +15577,7 @@
           <a:graphicData uri="http://schemas.openxmlformats.org/presentationml/2006/ole">
             <mc:AlternateContent xmlns:mc="http://schemas.openxmlformats.org/markup-compatibility/2006">
               <mc:Choice xmlns:v="urn:schemas-microsoft-com:vml" Requires="v">
-                <p:oleObj spid="_x0000_s5408" name="Equation" r:id="rId81" imgW="126720" imgH="139680" progId="Equation.DSMT4">
+                <p:oleObj spid="_x0000_s5613" name="Equation" r:id="rId81" imgW="126720" imgH="139680" progId="Equation.DSMT4">
                   <p:embed/>
                 </p:oleObj>
               </mc:Choice>

</xml_diff>